<commit_message>
final (hopefully) rank powerpoint
</commit_message>
<xml_diff>
--- a/module_8/part_3/rank_example/rank_example.pptx
+++ b/module_8/part_3/rank_example/rank_example.pptx
@@ -8,15 +8,17 @@
     <p:sldId id="265" r:id="rId2"/>
     <p:sldId id="257" r:id="rId3"/>
     <p:sldId id="258" r:id="rId4"/>
-    <p:sldId id="259" r:id="rId5"/>
-    <p:sldId id="260" r:id="rId6"/>
-    <p:sldId id="261" r:id="rId7"/>
-    <p:sldId id="262" r:id="rId8"/>
-    <p:sldId id="263" r:id="rId9"/>
-    <p:sldId id="267" r:id="rId10"/>
-    <p:sldId id="268" r:id="rId11"/>
-    <p:sldId id="269" r:id="rId12"/>
-    <p:sldId id="270" r:id="rId13"/>
+    <p:sldId id="271" r:id="rId5"/>
+    <p:sldId id="272" r:id="rId6"/>
+    <p:sldId id="259" r:id="rId7"/>
+    <p:sldId id="260" r:id="rId8"/>
+    <p:sldId id="261" r:id="rId9"/>
+    <p:sldId id="262" r:id="rId10"/>
+    <p:sldId id="263" r:id="rId11"/>
+    <p:sldId id="267" r:id="rId12"/>
+    <p:sldId id="268" r:id="rId13"/>
+    <p:sldId id="269" r:id="rId14"/>
+    <p:sldId id="270" r:id="rId15"/>
   </p:sldIdLst>
   <p:sldSz cx="12192000" cy="6858000"/>
   <p:notesSz cx="6858000" cy="9144000"/>
@@ -115,6 +117,11 @@
       </a:defRPr>
     </a:lvl9pPr>
   </p:defaultTextStyle>
+  <p:extLst>
+    <p:ext uri="{EFAFB233-063F-42B5-8137-9DF3F51BA10A}">
+      <p15:sldGuideLst xmlns:p15="http://schemas.microsoft.com/office/powerpoint/2012/main"/>
+    </p:ext>
+  </p:extLst>
 </p:presentation>
 </file>
 
@@ -3018,10 +3025,221 @@
   <p:clrMapOvr>
     <a:masterClrMapping/>
   </p:clrMapOvr>
+  <p:timing>
+    <p:tnLst>
+      <p:par>
+        <p:cTn id="1" dur="indefinite" restart="never" nodeType="tmRoot"/>
+      </p:par>
+    </p:tnLst>
+  </p:timing>
 </p:sld>
 </file>
 
 <file path=ppt/slides/slide10.xml><?xml version="1.0" encoding="utf-8"?>
+<p:sld xmlns:a="http://schemas.openxmlformats.org/drawingml/2006/main" xmlns:r="http://schemas.openxmlformats.org/officeDocument/2006/relationships" xmlns:p="http://schemas.openxmlformats.org/presentationml/2006/main">
+  <p:cSld>
+    <p:spTree>
+      <p:nvGrpSpPr>
+        <p:cNvPr id="1" name=""/>
+        <p:cNvGrpSpPr/>
+        <p:nvPr/>
+      </p:nvGrpSpPr>
+      <p:grpSpPr>
+        <a:xfrm>
+          <a:off x="0" y="0"/>
+          <a:ext cx="0" cy="0"/>
+          <a:chOff x="0" y="0"/>
+          <a:chExt cx="0" cy="0"/>
+        </a:xfrm>
+      </p:grpSpPr>
+      <p:sp>
+        <p:nvSpPr>
+          <p:cNvPr id="2" name="Title 1"/>
+          <p:cNvSpPr>
+            <a:spLocks noGrp="1"/>
+          </p:cNvSpPr>
+          <p:nvPr>
+            <p:ph type="title"/>
+          </p:nvPr>
+        </p:nvSpPr>
+        <p:spPr>
+          <a:xfrm>
+            <a:off x="838200" y="365125"/>
+            <a:ext cx="9425940" cy="1097915"/>
+          </a:xfrm>
+        </p:spPr>
+        <p:txBody>
+          <a:bodyPr>
+            <a:normAutofit/>
+          </a:bodyPr>
+          <a:lstStyle/>
+          <a:p>
+            <a:r>
+              <a:rPr lang="en-US" sz="3600" dirty="0" smtClean="0"/>
+              <a:t>Predicting at 0 </a:t>
+            </a:r>
+            <a:r>
+              <a:rPr lang="en-US" sz="3600" dirty="0" err="1" smtClean="0"/>
+              <a:t>yrs.since.phd</a:t>
+            </a:r>
+            <a:r>
+              <a:rPr lang="en-US" sz="3600" dirty="0" smtClean="0"/>
+              <a:t>: </a:t>
+            </a:r>
+            <a:r>
+              <a:rPr lang="en-US" sz="3600" b="1" dirty="0" smtClean="0"/>
+              <a:t>Assistant Professors</a:t>
+            </a:r>
+            <a:endParaRPr lang="en-US" sz="3600" dirty="0"/>
+          </a:p>
+        </p:txBody>
+      </p:sp>
+      <p:pic>
+        <p:nvPicPr>
+          <p:cNvPr id="4" name="Picture 3"/>
+          <p:cNvPicPr>
+            <a:picLocks noChangeAspect="1"/>
+          </p:cNvPicPr>
+          <p:nvPr/>
+        </p:nvPicPr>
+        <p:blipFill>
+          <a:blip r:embed="rId2">
+            <a:extLst>
+              <a:ext uri="{28A0092B-C50C-407E-A947-70E740481C1C}">
+                <a14:useLocalDpi xmlns:a14="http://schemas.microsoft.com/office/drawing/2010/main" val="0"/>
+              </a:ext>
+            </a:extLst>
+          </a:blip>
+          <a:stretch>
+            <a:fillRect/>
+          </a:stretch>
+        </p:blipFill>
+        <p:spPr>
+          <a:xfrm>
+            <a:off x="3104014" y="2851784"/>
+            <a:ext cx="6128751" cy="1331595"/>
+          </a:xfrm>
+          <a:prstGeom prst="rect">
+            <a:avLst/>
+          </a:prstGeom>
+        </p:spPr>
+      </p:pic>
+    </p:spTree>
+    <p:extLst>
+      <p:ext uri="{BB962C8B-B14F-4D97-AF65-F5344CB8AC3E}">
+        <p14:creationId xmlns:p14="http://schemas.microsoft.com/office/powerpoint/2010/main" val="2845756888"/>
+      </p:ext>
+    </p:extLst>
+  </p:cSld>
+  <p:clrMapOvr>
+    <a:masterClrMapping/>
+  </p:clrMapOvr>
+</p:sld>
+</file>
+
+<file path=ppt/slides/slide11.xml><?xml version="1.0" encoding="utf-8"?>
+<p:sld xmlns:a="http://schemas.openxmlformats.org/drawingml/2006/main" xmlns:r="http://schemas.openxmlformats.org/officeDocument/2006/relationships" xmlns:p="http://schemas.openxmlformats.org/presentationml/2006/main">
+  <p:cSld>
+    <p:spTree>
+      <p:nvGrpSpPr>
+        <p:cNvPr id="1" name=""/>
+        <p:cNvGrpSpPr/>
+        <p:nvPr/>
+      </p:nvGrpSpPr>
+      <p:grpSpPr>
+        <a:xfrm>
+          <a:off x="0" y="0"/>
+          <a:ext cx="0" cy="0"/>
+          <a:chOff x="0" y="0"/>
+          <a:chExt cx="0" cy="0"/>
+        </a:xfrm>
+      </p:grpSpPr>
+      <p:sp>
+        <p:nvSpPr>
+          <p:cNvPr id="2" name="Title 1"/>
+          <p:cNvSpPr>
+            <a:spLocks noGrp="1"/>
+          </p:cNvSpPr>
+          <p:nvPr>
+            <p:ph type="title"/>
+          </p:nvPr>
+        </p:nvSpPr>
+        <p:spPr>
+          <a:xfrm>
+            <a:off x="838200" y="365125"/>
+            <a:ext cx="9425940" cy="1097915"/>
+          </a:xfrm>
+        </p:spPr>
+        <p:txBody>
+          <a:bodyPr>
+            <a:normAutofit/>
+          </a:bodyPr>
+          <a:lstStyle/>
+          <a:p>
+            <a:r>
+              <a:rPr lang="en-US" sz="3600" dirty="0" smtClean="0"/>
+              <a:t>Predicting at 0 </a:t>
+            </a:r>
+            <a:r>
+              <a:rPr lang="en-US" sz="3600" dirty="0" err="1" smtClean="0"/>
+              <a:t>yrs.since.phd</a:t>
+            </a:r>
+            <a:r>
+              <a:rPr lang="en-US" sz="3600" dirty="0" smtClean="0"/>
+              <a:t>: </a:t>
+            </a:r>
+            <a:r>
+              <a:rPr lang="en-US" sz="3600" b="1" dirty="0" smtClean="0"/>
+              <a:t>Associate Professors</a:t>
+            </a:r>
+            <a:endParaRPr lang="en-US" sz="3600" dirty="0"/>
+          </a:p>
+        </p:txBody>
+      </p:sp>
+      <p:pic>
+        <p:nvPicPr>
+          <p:cNvPr id="3" name="Picture 2"/>
+          <p:cNvPicPr>
+            <a:picLocks noChangeAspect="1"/>
+          </p:cNvPicPr>
+          <p:nvPr/>
+        </p:nvPicPr>
+        <p:blipFill>
+          <a:blip r:embed="rId2">
+            <a:extLst>
+              <a:ext uri="{28A0092B-C50C-407E-A947-70E740481C1C}">
+                <a14:useLocalDpi xmlns:a14="http://schemas.microsoft.com/office/drawing/2010/main" val="0"/>
+              </a:ext>
+            </a:extLst>
+          </a:blip>
+          <a:stretch>
+            <a:fillRect/>
+          </a:stretch>
+        </p:blipFill>
+        <p:spPr>
+          <a:xfrm>
+            <a:off x="2276067" y="2877501"/>
+            <a:ext cx="7418886" cy="1331595"/>
+          </a:xfrm>
+          <a:prstGeom prst="rect">
+            <a:avLst/>
+          </a:prstGeom>
+        </p:spPr>
+      </p:pic>
+    </p:spTree>
+    <p:extLst>
+      <p:ext uri="{BB962C8B-B14F-4D97-AF65-F5344CB8AC3E}">
+        <p14:creationId xmlns:p14="http://schemas.microsoft.com/office/powerpoint/2010/main" val="690624115"/>
+      </p:ext>
+    </p:extLst>
+  </p:cSld>
+  <p:clrMapOvr>
+    <a:masterClrMapping/>
+  </p:clrMapOvr>
+</p:sld>
+</file>
+
+<file path=ppt/slides/slide12.xml><?xml version="1.0" encoding="utf-8"?>
 <p:sld xmlns:a="http://schemas.openxmlformats.org/drawingml/2006/main" xmlns:r="http://schemas.openxmlformats.org/officeDocument/2006/relationships" xmlns:p="http://schemas.openxmlformats.org/presentationml/2006/main">
   <p:cSld>
     <p:spTree>
@@ -3123,7 +3341,7 @@
 </p:sld>
 </file>
 
-<file path=ppt/slides/slide11.xml><?xml version="1.0" encoding="utf-8"?>
+<file path=ppt/slides/slide13.xml><?xml version="1.0" encoding="utf-8"?>
 <p:sld xmlns:a="http://schemas.openxmlformats.org/drawingml/2006/main" xmlns:r="http://schemas.openxmlformats.org/officeDocument/2006/relationships" xmlns:p="http://schemas.openxmlformats.org/presentationml/2006/main">
   <p:cSld>
     <p:spTree>
@@ -3213,7 +3431,7 @@
 </p:sld>
 </file>
 
-<file path=ppt/slides/slide12.xml><?xml version="1.0" encoding="utf-8"?>
+<file path=ppt/slides/slide14.xml><?xml version="1.0" encoding="utf-8"?>
 <p:sld xmlns:a="http://schemas.openxmlformats.org/drawingml/2006/main" xmlns:r="http://schemas.openxmlformats.org/officeDocument/2006/relationships" xmlns:p="http://schemas.openxmlformats.org/presentationml/2006/main">
   <p:cSld>
     <p:spTree>
@@ -3361,6 +3579,13 @@
   <p:clrMapOvr>
     <a:masterClrMapping/>
   </p:clrMapOvr>
+  <p:timing>
+    <p:tnLst>
+      <p:par>
+        <p:cTn id="1" dur="indefinite" restart="never" nodeType="tmRoot"/>
+      </p:par>
+    </p:tnLst>
+  </p:timing>
 </p:sld>
 </file>
 
@@ -3459,6 +3684,13 @@
   <p:clrMapOvr>
     <a:masterClrMapping/>
   </p:clrMapOvr>
+  <p:timing>
+    <p:tnLst>
+      <p:par>
+        <p:cTn id="1" dur="indefinite" restart="never" nodeType="tmRoot"/>
+      </p:par>
+    </p:tnLst>
+  </p:timing>
 </p:sld>
 </file>
 
@@ -3492,7 +3724,7 @@
         <p:spPr>
           <a:xfrm>
             <a:off x="838200" y="365125"/>
-            <a:ext cx="6868886" cy="1097915"/>
+            <a:ext cx="9425940" cy="1097915"/>
           </a:xfrm>
         </p:spPr>
         <p:txBody>
@@ -3503,46 +3735,147 @@
           <a:p>
             <a:r>
               <a:rPr lang="en-US" sz="3600" dirty="0" smtClean="0"/>
-              <a:t>Our original dataset looks like this:</a:t>
+              <a:t>You might think:</a:t>
             </a:r>
             <a:endParaRPr lang="en-US" sz="3600" dirty="0"/>
           </a:p>
         </p:txBody>
       </p:sp>
-      <p:pic>
-        <p:nvPicPr>
-          <p:cNvPr id="4" name="Picture 3"/>
-          <p:cNvPicPr>
-            <a:picLocks noChangeAspect="1"/>
-          </p:cNvPicPr>
+      <p:sp>
+        <p:nvSpPr>
+          <p:cNvPr id="5" name="TextBox 4"/>
+          <p:cNvSpPr txBox="1"/>
           <p:nvPr/>
-        </p:nvPicPr>
-        <p:blipFill>
-          <a:blip r:embed="rId2">
-            <a:extLst>
-              <a:ext uri="{28A0092B-C50C-407E-A947-70E740481C1C}">
-                <a14:useLocalDpi xmlns:a14="http://schemas.microsoft.com/office/drawing/2010/main" val="0"/>
-              </a:ext>
-            </a:extLst>
-          </a:blip>
-          <a:stretch>
-            <a:fillRect/>
-          </a:stretch>
-        </p:blipFill>
+        </p:nvSpPr>
         <p:spPr>
           <a:xfrm>
-            <a:off x="2603863" y="2325925"/>
-            <a:ext cx="6705600" cy="2905125"/>
+            <a:off x="2379617" y="1625175"/>
+            <a:ext cx="7182394" cy="830997"/>
+          </a:xfrm>
+          <a:prstGeom prst="rect">
+            <a:avLst/>
+          </a:prstGeom>
+          <a:noFill/>
+        </p:spPr>
+        <p:txBody>
+          <a:bodyPr wrap="square" rtlCol="0">
+            <a:spAutoFit/>
+          </a:bodyPr>
+          <a:lstStyle/>
+          <a:p>
+            <a:r>
+              <a:rPr lang="en-US" sz="4800" dirty="0" smtClean="0">
+                <a:sym typeface="Wingdings" panose="05000000000000000000" pitchFamily="2" charset="2"/>
+              </a:rPr>
+              <a:t>Female, Male  0, 1 </a:t>
+            </a:r>
+            <a:endParaRPr lang="en-US" sz="4800" dirty="0"/>
+          </a:p>
+        </p:txBody>
+      </p:sp>
+      <p:sp>
+        <p:nvSpPr>
+          <p:cNvPr id="6" name="Title 1"/>
+          <p:cNvSpPr txBox="1">
+            <a:spLocks/>
+          </p:cNvSpPr>
+          <p:nvPr/>
+        </p:nvSpPr>
+        <p:spPr>
+          <a:xfrm>
+            <a:off x="838200" y="2934154"/>
+            <a:ext cx="9425940" cy="1097915"/>
           </a:xfrm>
           <a:prstGeom prst="rect">
             <a:avLst/>
           </a:prstGeom>
         </p:spPr>
-      </p:pic>
+        <p:txBody>
+          <a:bodyPr vert="horz" lIns="91440" tIns="45720" rIns="91440" bIns="45720" rtlCol="0" anchor="ctr">
+            <a:normAutofit/>
+          </a:bodyPr>
+          <a:lstStyle>
+            <a:lvl1pPr algn="l" defTabSz="914400" rtl="0" eaLnBrk="1" latinLnBrk="0" hangingPunct="1">
+              <a:lnSpc>
+                <a:spcPct val="90000"/>
+              </a:lnSpc>
+              <a:spcBef>
+                <a:spcPct val="0"/>
+              </a:spcBef>
+              <a:buNone/>
+              <a:defRPr sz="4400" kern="1200">
+                <a:solidFill>
+                  <a:schemeClr val="tx1"/>
+                </a:solidFill>
+                <a:latin typeface="+mj-lt"/>
+                <a:ea typeface="+mj-ea"/>
+                <a:cs typeface="+mj-cs"/>
+              </a:defRPr>
+            </a:lvl1pPr>
+          </a:lstStyle>
+          <a:p>
+            <a:r>
+              <a:rPr lang="en-US" sz="3600" dirty="0" smtClean="0"/>
+              <a:t>Therefore:</a:t>
+            </a:r>
+            <a:endParaRPr lang="en-US" sz="3600" dirty="0"/>
+          </a:p>
+        </p:txBody>
+      </p:sp>
+      <p:sp>
+        <p:nvSpPr>
+          <p:cNvPr id="7" name="TextBox 6"/>
+          <p:cNvSpPr txBox="1"/>
+          <p:nvPr/>
+        </p:nvSpPr>
+        <p:spPr>
+          <a:xfrm>
+            <a:off x="1503589" y="4188861"/>
+            <a:ext cx="8934450" cy="830997"/>
+          </a:xfrm>
+          <a:prstGeom prst="rect">
+            <a:avLst/>
+          </a:prstGeom>
+          <a:noFill/>
+        </p:spPr>
+        <p:txBody>
+          <a:bodyPr wrap="square" rtlCol="0">
+            <a:spAutoFit/>
+          </a:bodyPr>
+          <a:lstStyle/>
+          <a:p>
+            <a:r>
+              <a:rPr lang="en-US" sz="4800" dirty="0" err="1" smtClean="0">
+                <a:sym typeface="Wingdings" panose="05000000000000000000" pitchFamily="2" charset="2"/>
+              </a:rPr>
+              <a:t>AsstProf</a:t>
+            </a:r>
+            <a:r>
+              <a:rPr lang="en-US" sz="4800" dirty="0" smtClean="0">
+                <a:sym typeface="Wingdings" panose="05000000000000000000" pitchFamily="2" charset="2"/>
+              </a:rPr>
+              <a:t>, </a:t>
+            </a:r>
+            <a:r>
+              <a:rPr lang="en-US" sz="4800" dirty="0" err="1" smtClean="0">
+                <a:sym typeface="Wingdings" panose="05000000000000000000" pitchFamily="2" charset="2"/>
+              </a:rPr>
+              <a:t>AssocProf</a:t>
+            </a:r>
+            <a:r>
+              <a:rPr lang="en-US" sz="4800" dirty="0" smtClean="0">
+                <a:sym typeface="Wingdings" panose="05000000000000000000" pitchFamily="2" charset="2"/>
+              </a:rPr>
+              <a:t>, Prof  0, 1, 2 </a:t>
+            </a:r>
+            <a:endParaRPr lang="en-US" sz="4800" dirty="0"/>
+          </a:p>
+        </p:txBody>
+      </p:sp>
     </p:spTree>
     <p:extLst>
       <p:ext uri="{BB962C8B-B14F-4D97-AF65-F5344CB8AC3E}">
-        <p14:creationId xmlns:p14="http://schemas.microsoft.com/office/powerpoint/2010/main" val="1519486644"/>
+        <p14:creationId xmlns:p14="http://schemas.microsoft.com/office/powerpoint/2010/main" val="2453405932"/>
       </p:ext>
     </p:extLst>
   </p:cSld>
@@ -3582,7 +3915,7 @@
         <p:spPr>
           <a:xfrm>
             <a:off x="838200" y="365125"/>
-            <a:ext cx="9906000" cy="1097915"/>
+            <a:ext cx="9425940" cy="1097915"/>
           </a:xfrm>
         </p:spPr>
         <p:txBody>
@@ -3593,7 +3926,246 @@
           <a:p>
             <a:r>
               <a:rPr lang="en-US" sz="3600" dirty="0" smtClean="0"/>
-              <a:t>But we should conceptualize a dataset like this:</a:t>
+              <a:t>You might think:</a:t>
+            </a:r>
+            <a:endParaRPr lang="en-US" sz="3600" dirty="0"/>
+          </a:p>
+        </p:txBody>
+      </p:sp>
+      <p:sp>
+        <p:nvSpPr>
+          <p:cNvPr id="5" name="TextBox 4"/>
+          <p:cNvSpPr txBox="1"/>
+          <p:nvPr/>
+        </p:nvSpPr>
+        <p:spPr>
+          <a:xfrm>
+            <a:off x="2379617" y="1625175"/>
+            <a:ext cx="7182394" cy="830997"/>
+          </a:xfrm>
+          <a:prstGeom prst="rect">
+            <a:avLst/>
+          </a:prstGeom>
+          <a:noFill/>
+        </p:spPr>
+        <p:txBody>
+          <a:bodyPr wrap="square" rtlCol="0">
+            <a:spAutoFit/>
+          </a:bodyPr>
+          <a:lstStyle/>
+          <a:p>
+            <a:r>
+              <a:rPr lang="en-US" sz="4800" dirty="0" smtClean="0">
+                <a:sym typeface="Wingdings" panose="05000000000000000000" pitchFamily="2" charset="2"/>
+              </a:rPr>
+              <a:t>Female, Male  0, 1 </a:t>
+            </a:r>
+            <a:endParaRPr lang="en-US" sz="4800" dirty="0"/>
+          </a:p>
+        </p:txBody>
+      </p:sp>
+      <p:sp>
+        <p:nvSpPr>
+          <p:cNvPr id="6" name="Title 1"/>
+          <p:cNvSpPr txBox="1">
+            <a:spLocks/>
+          </p:cNvSpPr>
+          <p:nvPr/>
+        </p:nvSpPr>
+        <p:spPr>
+          <a:xfrm>
+            <a:off x="838200" y="2934154"/>
+            <a:ext cx="9425940" cy="1097915"/>
+          </a:xfrm>
+          <a:prstGeom prst="rect">
+            <a:avLst/>
+          </a:prstGeom>
+        </p:spPr>
+        <p:txBody>
+          <a:bodyPr vert="horz" lIns="91440" tIns="45720" rIns="91440" bIns="45720" rtlCol="0" anchor="ctr">
+            <a:normAutofit/>
+          </a:bodyPr>
+          <a:lstStyle>
+            <a:lvl1pPr algn="l" defTabSz="914400" rtl="0" eaLnBrk="1" latinLnBrk="0" hangingPunct="1">
+              <a:lnSpc>
+                <a:spcPct val="90000"/>
+              </a:lnSpc>
+              <a:spcBef>
+                <a:spcPct val="0"/>
+              </a:spcBef>
+              <a:buNone/>
+              <a:defRPr sz="4400" kern="1200">
+                <a:solidFill>
+                  <a:schemeClr val="tx1"/>
+                </a:solidFill>
+                <a:latin typeface="+mj-lt"/>
+                <a:ea typeface="+mj-ea"/>
+                <a:cs typeface="+mj-cs"/>
+              </a:defRPr>
+            </a:lvl1pPr>
+          </a:lstStyle>
+          <a:p>
+            <a:r>
+              <a:rPr lang="en-US" sz="3600" dirty="0" smtClean="0"/>
+              <a:t>Therefore:</a:t>
+            </a:r>
+            <a:endParaRPr lang="en-US" sz="3600" dirty="0"/>
+          </a:p>
+        </p:txBody>
+      </p:sp>
+      <p:sp>
+        <p:nvSpPr>
+          <p:cNvPr id="7" name="TextBox 6"/>
+          <p:cNvSpPr txBox="1"/>
+          <p:nvPr/>
+        </p:nvSpPr>
+        <p:spPr>
+          <a:xfrm>
+            <a:off x="1503589" y="4188861"/>
+            <a:ext cx="8934450" cy="830997"/>
+          </a:xfrm>
+          <a:prstGeom prst="rect">
+            <a:avLst/>
+          </a:prstGeom>
+          <a:noFill/>
+        </p:spPr>
+        <p:txBody>
+          <a:bodyPr wrap="square" rtlCol="0">
+            <a:spAutoFit/>
+          </a:bodyPr>
+          <a:lstStyle/>
+          <a:p>
+            <a:r>
+              <a:rPr lang="en-US" sz="4800" dirty="0" err="1" smtClean="0">
+                <a:sym typeface="Wingdings" panose="05000000000000000000" pitchFamily="2" charset="2"/>
+              </a:rPr>
+              <a:t>AsstProf</a:t>
+            </a:r>
+            <a:r>
+              <a:rPr lang="en-US" sz="4800" dirty="0" smtClean="0">
+                <a:sym typeface="Wingdings" panose="05000000000000000000" pitchFamily="2" charset="2"/>
+              </a:rPr>
+              <a:t>, </a:t>
+            </a:r>
+            <a:r>
+              <a:rPr lang="en-US" sz="4800" dirty="0" err="1" smtClean="0">
+                <a:sym typeface="Wingdings" panose="05000000000000000000" pitchFamily="2" charset="2"/>
+              </a:rPr>
+              <a:t>AssocProf</a:t>
+            </a:r>
+            <a:r>
+              <a:rPr lang="en-US" sz="4800" dirty="0" smtClean="0">
+                <a:sym typeface="Wingdings" panose="05000000000000000000" pitchFamily="2" charset="2"/>
+              </a:rPr>
+              <a:t>, Prof  0, 1, 2 </a:t>
+            </a:r>
+            <a:endParaRPr lang="en-US" sz="4800" dirty="0"/>
+          </a:p>
+        </p:txBody>
+      </p:sp>
+      <p:sp>
+        <p:nvSpPr>
+          <p:cNvPr id="4" name="Multiply 3"/>
+          <p:cNvSpPr/>
+          <p:nvPr/>
+        </p:nvSpPr>
+        <p:spPr>
+          <a:xfrm>
+            <a:off x="2834640" y="2279170"/>
+            <a:ext cx="4905810" cy="4885509"/>
+          </a:xfrm>
+          <a:prstGeom prst="mathMultiply">
+            <a:avLst/>
+          </a:prstGeom>
+          <a:solidFill>
+            <a:srgbClr val="FF0000"/>
+          </a:solidFill>
+          <a:ln>
+            <a:solidFill>
+              <a:srgbClr val="C00000"/>
+            </a:solidFill>
+          </a:ln>
+        </p:spPr>
+        <p:style>
+          <a:lnRef idx="2">
+            <a:schemeClr val="accent1">
+              <a:shade val="50000"/>
+            </a:schemeClr>
+          </a:lnRef>
+          <a:fillRef idx="1">
+            <a:schemeClr val="accent1"/>
+          </a:fillRef>
+          <a:effectRef idx="0">
+            <a:schemeClr val="accent1"/>
+          </a:effectRef>
+          <a:fontRef idx="minor">
+            <a:schemeClr val="lt1"/>
+          </a:fontRef>
+        </p:style>
+        <p:txBody>
+          <a:bodyPr rtlCol="0" anchor="ctr"/>
+          <a:lstStyle/>
+          <a:p>
+            <a:pPr algn="ctr"/>
+            <a:endParaRPr lang="en-US"/>
+          </a:p>
+        </p:txBody>
+      </p:sp>
+    </p:spTree>
+    <p:extLst>
+      <p:ext uri="{BB962C8B-B14F-4D97-AF65-F5344CB8AC3E}">
+        <p14:creationId xmlns:p14="http://schemas.microsoft.com/office/powerpoint/2010/main" val="1251485152"/>
+      </p:ext>
+    </p:extLst>
+  </p:cSld>
+  <p:clrMapOvr>
+    <a:masterClrMapping/>
+  </p:clrMapOvr>
+</p:sld>
+</file>
+
+<file path=ppt/slides/slide6.xml><?xml version="1.0" encoding="utf-8"?>
+<p:sld xmlns:a="http://schemas.openxmlformats.org/drawingml/2006/main" xmlns:r="http://schemas.openxmlformats.org/officeDocument/2006/relationships" xmlns:p="http://schemas.openxmlformats.org/presentationml/2006/main">
+  <p:cSld>
+    <p:spTree>
+      <p:nvGrpSpPr>
+        <p:cNvPr id="1" name=""/>
+        <p:cNvGrpSpPr/>
+        <p:nvPr/>
+      </p:nvGrpSpPr>
+      <p:grpSpPr>
+        <a:xfrm>
+          <a:off x="0" y="0"/>
+          <a:ext cx="0" cy="0"/>
+          <a:chOff x="0" y="0"/>
+          <a:chExt cx="0" cy="0"/>
+        </a:xfrm>
+      </p:grpSpPr>
+      <p:sp>
+        <p:nvSpPr>
+          <p:cNvPr id="2" name="Title 1"/>
+          <p:cNvSpPr>
+            <a:spLocks noGrp="1"/>
+          </p:cNvSpPr>
+          <p:nvPr>
+            <p:ph type="title"/>
+          </p:nvPr>
+        </p:nvSpPr>
+        <p:spPr>
+          <a:xfrm>
+            <a:off x="838200" y="365125"/>
+            <a:ext cx="6868886" cy="1097915"/>
+          </a:xfrm>
+        </p:spPr>
+        <p:txBody>
+          <a:bodyPr>
+            <a:normAutofit/>
+          </a:bodyPr>
+          <a:lstStyle/>
+          <a:p>
+            <a:r>
+              <a:rPr lang="en-US" sz="3600" dirty="0" smtClean="0"/>
+              <a:t>Our original dataset looks like this:</a:t>
             </a:r>
             <a:endParaRPr lang="en-US" sz="3600" dirty="0"/>
           </a:p>
@@ -3621,8 +4193,105 @@
         </p:blipFill>
         <p:spPr>
           <a:xfrm>
-            <a:off x="2527934" y="2057400"/>
-            <a:ext cx="7883387" cy="3428045"/>
+            <a:off x="2264229" y="1986291"/>
+            <a:ext cx="8048788" cy="3487046"/>
+          </a:xfrm>
+          <a:prstGeom prst="rect">
+            <a:avLst/>
+          </a:prstGeom>
+        </p:spPr>
+      </p:pic>
+    </p:spTree>
+    <p:extLst>
+      <p:ext uri="{BB962C8B-B14F-4D97-AF65-F5344CB8AC3E}">
+        <p14:creationId xmlns:p14="http://schemas.microsoft.com/office/powerpoint/2010/main" val="1519486644"/>
+      </p:ext>
+    </p:extLst>
+  </p:cSld>
+  <p:clrMapOvr>
+    <a:masterClrMapping/>
+  </p:clrMapOvr>
+  <p:timing>
+    <p:tnLst>
+      <p:par>
+        <p:cTn id="1" dur="indefinite" restart="never" nodeType="tmRoot"/>
+      </p:par>
+    </p:tnLst>
+  </p:timing>
+</p:sld>
+</file>
+
+<file path=ppt/slides/slide7.xml><?xml version="1.0" encoding="utf-8"?>
+<p:sld xmlns:a="http://schemas.openxmlformats.org/drawingml/2006/main" xmlns:r="http://schemas.openxmlformats.org/officeDocument/2006/relationships" xmlns:p="http://schemas.openxmlformats.org/presentationml/2006/main">
+  <p:cSld>
+    <p:spTree>
+      <p:nvGrpSpPr>
+        <p:cNvPr id="1" name=""/>
+        <p:cNvGrpSpPr/>
+        <p:nvPr/>
+      </p:nvGrpSpPr>
+      <p:grpSpPr>
+        <a:xfrm>
+          <a:off x="0" y="0"/>
+          <a:ext cx="0" cy="0"/>
+          <a:chOff x="0" y="0"/>
+          <a:chExt cx="0" cy="0"/>
+        </a:xfrm>
+      </p:grpSpPr>
+      <p:sp>
+        <p:nvSpPr>
+          <p:cNvPr id="2" name="Title 1"/>
+          <p:cNvSpPr>
+            <a:spLocks noGrp="1"/>
+          </p:cNvSpPr>
+          <p:nvPr>
+            <p:ph type="title"/>
+          </p:nvPr>
+        </p:nvSpPr>
+        <p:spPr>
+          <a:xfrm>
+            <a:off x="838200" y="365125"/>
+            <a:ext cx="9906000" cy="1097915"/>
+          </a:xfrm>
+        </p:spPr>
+        <p:txBody>
+          <a:bodyPr>
+            <a:normAutofit/>
+          </a:bodyPr>
+          <a:lstStyle/>
+          <a:p>
+            <a:r>
+              <a:rPr lang="en-US" sz="3600" dirty="0" smtClean="0"/>
+              <a:t>But we should conceptualize a dataset like this:</a:t>
+            </a:r>
+            <a:endParaRPr lang="en-US" sz="3600" dirty="0"/>
+          </a:p>
+        </p:txBody>
+      </p:sp>
+      <p:pic>
+        <p:nvPicPr>
+          <p:cNvPr id="4" name="Picture 3"/>
+          <p:cNvPicPr>
+            <a:picLocks noChangeAspect="1"/>
+          </p:cNvPicPr>
+          <p:nvPr/>
+        </p:nvPicPr>
+        <p:blipFill>
+          <a:blip r:embed="rId2">
+            <a:extLst>
+              <a:ext uri="{28A0092B-C50C-407E-A947-70E740481C1C}">
+                <a14:useLocalDpi xmlns:a14="http://schemas.microsoft.com/office/drawing/2010/main" val="0"/>
+              </a:ext>
+            </a:extLst>
+          </a:blip>
+          <a:stretch>
+            <a:fillRect/>
+          </a:stretch>
+        </p:blipFill>
+        <p:spPr>
+          <a:xfrm>
+            <a:off x="2305866" y="1965960"/>
+            <a:ext cx="8246066" cy="3585754"/>
           </a:xfrm>
           <a:prstGeom prst="rect">
             <a:avLst/>
@@ -3642,7 +4311,7 @@
 </p:sld>
 </file>
 
-<file path=ppt/slides/slide6.xml><?xml version="1.0" encoding="utf-8"?>
+<file path=ppt/slides/slide8.xml><?xml version="1.0" encoding="utf-8"?>
 <p:sld xmlns:a="http://schemas.openxmlformats.org/drawingml/2006/main" xmlns:r="http://schemas.openxmlformats.org/officeDocument/2006/relationships" xmlns:p="http://schemas.openxmlformats.org/presentationml/2006/main">
   <p:cSld>
     <p:spTree>
@@ -3732,347 +4401,6 @@
 </p:sld>
 </file>
 
-<file path=ppt/slides/slide7.xml><?xml version="1.0" encoding="utf-8"?>
-<p:sld xmlns:a="http://schemas.openxmlformats.org/drawingml/2006/main" xmlns:r="http://schemas.openxmlformats.org/officeDocument/2006/relationships" xmlns:p="http://schemas.openxmlformats.org/presentationml/2006/main">
-  <p:cSld>
-    <p:spTree>
-      <p:nvGrpSpPr>
-        <p:cNvPr id="1" name=""/>
-        <p:cNvGrpSpPr/>
-        <p:nvPr/>
-      </p:nvGrpSpPr>
-      <p:grpSpPr>
-        <a:xfrm>
-          <a:off x="0" y="0"/>
-          <a:ext cx="0" cy="0"/>
-          <a:chOff x="0" y="0"/>
-          <a:chExt cx="0" cy="0"/>
-        </a:xfrm>
-      </p:grpSpPr>
-      <p:sp>
-        <p:nvSpPr>
-          <p:cNvPr id="2" name="Title 1"/>
-          <p:cNvSpPr>
-            <a:spLocks noGrp="1"/>
-          </p:cNvSpPr>
-          <p:nvPr>
-            <p:ph type="title"/>
-          </p:nvPr>
-        </p:nvSpPr>
-        <p:spPr>
-          <a:xfrm>
-            <a:off x="838200" y="365125"/>
-            <a:ext cx="9654540" cy="1097915"/>
-          </a:xfrm>
-        </p:spPr>
-        <p:txBody>
-          <a:bodyPr>
-            <a:normAutofit/>
-          </a:bodyPr>
-          <a:lstStyle/>
-          <a:p>
-            <a:r>
-              <a:rPr lang="en-US" sz="3600" dirty="0" smtClean="0"/>
-              <a:t>Let’s say we come up with these coefficients:</a:t>
-            </a:r>
-            <a:endParaRPr lang="en-US" sz="3600" dirty="0"/>
-          </a:p>
-        </p:txBody>
-      </p:sp>
-      <p:graphicFrame>
-        <p:nvGraphicFramePr>
-          <p:cNvPr id="4" name="Table 3"/>
-          <p:cNvGraphicFramePr>
-            <a:graphicFrameLocks noGrp="1"/>
-          </p:cNvGraphicFramePr>
-          <p:nvPr>
-            <p:extLst>
-              <p:ext uri="{D42A27DB-BD31-4B8C-83A1-F6EECF244321}">
-                <p14:modId xmlns:p14="http://schemas.microsoft.com/office/powerpoint/2010/main" val="387427696"/>
-              </p:ext>
-            </p:extLst>
-          </p:nvPr>
-        </p:nvGraphicFramePr>
-        <p:xfrm>
-          <a:off x="1601470" y="2708486"/>
-          <a:ext cx="8128000" cy="1854200"/>
-        </p:xfrm>
-        <a:graphic>
-          <a:graphicData uri="http://schemas.openxmlformats.org/drawingml/2006/table">
-            <a:tbl>
-              <a:tblPr firstRow="1" bandRow="1">
-                <a:tableStyleId>{5C22544A-7EE6-4342-B048-85BDC9FD1C3A}</a:tableStyleId>
-              </a:tblPr>
-              <a:tblGrid>
-                <a:gridCol w="4064000">
-                  <a:extLst>
-                    <a:ext uri="{9D8B030D-6E8A-4147-A177-3AD203B41FA5}">
-                      <a16:colId xmlns:a16="http://schemas.microsoft.com/office/drawing/2014/main" val="3802769981"/>
-                    </a:ext>
-                  </a:extLst>
-                </a:gridCol>
-                <a:gridCol w="4064000">
-                  <a:extLst>
-                    <a:ext uri="{9D8B030D-6E8A-4147-A177-3AD203B41FA5}">
-                      <a16:colId xmlns:a16="http://schemas.microsoft.com/office/drawing/2014/main" val="2042402367"/>
-                    </a:ext>
-                  </a:extLst>
-                </a:gridCol>
-              </a:tblGrid>
-              <a:tr h="370840">
-                <a:tc>
-                  <a:txBody>
-                    <a:bodyPr/>
-                    <a:lstStyle/>
-                    <a:p>
-                      <a:endParaRPr lang="en-US" dirty="0"/>
-                    </a:p>
-                  </a:txBody>
-                  <a:tcPr/>
-                </a:tc>
-                <a:tc>
-                  <a:txBody>
-                    <a:bodyPr/>
-                    <a:lstStyle/>
-                    <a:p>
-                      <a:endParaRPr lang="en-US"/>
-                    </a:p>
-                  </a:txBody>
-                  <a:tcPr/>
-                </a:tc>
-                <a:extLst>
-                  <a:ext uri="{0D108BD9-81ED-4DB2-BD59-A6C34878D82A}">
-                    <a16:rowId xmlns:a16="http://schemas.microsoft.com/office/drawing/2014/main" val="390419479"/>
-                  </a:ext>
-                </a:extLst>
-              </a:tr>
-              <a:tr h="370840">
-                <a:tc>
-                  <a:txBody>
-                    <a:bodyPr/>
-                    <a:lstStyle/>
-                    <a:p>
-                      <a:endParaRPr lang="en-US"/>
-                    </a:p>
-                  </a:txBody>
-                  <a:tcPr/>
-                </a:tc>
-                <a:tc>
-                  <a:txBody>
-                    <a:bodyPr/>
-                    <a:lstStyle/>
-                    <a:p>
-                      <a:endParaRPr lang="en-US"/>
-                    </a:p>
-                  </a:txBody>
-                  <a:tcPr/>
-                </a:tc>
-                <a:extLst>
-                  <a:ext uri="{0D108BD9-81ED-4DB2-BD59-A6C34878D82A}">
-                    <a16:rowId xmlns:a16="http://schemas.microsoft.com/office/drawing/2014/main" val="291366966"/>
-                  </a:ext>
-                </a:extLst>
-              </a:tr>
-              <a:tr h="370840">
-                <a:tc>
-                  <a:txBody>
-                    <a:bodyPr/>
-                    <a:lstStyle/>
-                    <a:p>
-                      <a:endParaRPr lang="en-US"/>
-                    </a:p>
-                  </a:txBody>
-                  <a:tcPr/>
-                </a:tc>
-                <a:tc>
-                  <a:txBody>
-                    <a:bodyPr/>
-                    <a:lstStyle/>
-                    <a:p>
-                      <a:endParaRPr lang="en-US"/>
-                    </a:p>
-                  </a:txBody>
-                  <a:tcPr/>
-                </a:tc>
-                <a:extLst>
-                  <a:ext uri="{0D108BD9-81ED-4DB2-BD59-A6C34878D82A}">
-                    <a16:rowId xmlns:a16="http://schemas.microsoft.com/office/drawing/2014/main" val="402487520"/>
-                  </a:ext>
-                </a:extLst>
-              </a:tr>
-              <a:tr h="370840">
-                <a:tc>
-                  <a:txBody>
-                    <a:bodyPr/>
-                    <a:lstStyle/>
-                    <a:p>
-                      <a:endParaRPr lang="en-US"/>
-                    </a:p>
-                  </a:txBody>
-                  <a:tcPr/>
-                </a:tc>
-                <a:tc>
-                  <a:txBody>
-                    <a:bodyPr/>
-                    <a:lstStyle/>
-                    <a:p>
-                      <a:endParaRPr lang="en-US"/>
-                    </a:p>
-                  </a:txBody>
-                  <a:tcPr/>
-                </a:tc>
-                <a:extLst>
-                  <a:ext uri="{0D108BD9-81ED-4DB2-BD59-A6C34878D82A}">
-                    <a16:rowId xmlns:a16="http://schemas.microsoft.com/office/drawing/2014/main" val="678565980"/>
-                  </a:ext>
-                </a:extLst>
-              </a:tr>
-              <a:tr h="370840">
-                <a:tc>
-                  <a:txBody>
-                    <a:bodyPr/>
-                    <a:lstStyle/>
-                    <a:p>
-                      <a:endParaRPr lang="en-US"/>
-                    </a:p>
-                  </a:txBody>
-                  <a:tcPr/>
-                </a:tc>
-                <a:tc>
-                  <a:txBody>
-                    <a:bodyPr/>
-                    <a:lstStyle/>
-                    <a:p>
-                      <a:endParaRPr lang="en-US" dirty="0"/>
-                    </a:p>
-                  </a:txBody>
-                  <a:tcPr/>
-                </a:tc>
-                <a:extLst>
-                  <a:ext uri="{0D108BD9-81ED-4DB2-BD59-A6C34878D82A}">
-                    <a16:rowId xmlns:a16="http://schemas.microsoft.com/office/drawing/2014/main" val="1400199756"/>
-                  </a:ext>
-                </a:extLst>
-              </a:tr>
-            </a:tbl>
-          </a:graphicData>
-        </a:graphic>
-      </p:graphicFrame>
-    </p:spTree>
-    <p:extLst>
-      <p:ext uri="{BB962C8B-B14F-4D97-AF65-F5344CB8AC3E}">
-        <p14:creationId xmlns:p14="http://schemas.microsoft.com/office/powerpoint/2010/main" val="33071646"/>
-      </p:ext>
-    </p:extLst>
-  </p:cSld>
-  <p:clrMapOvr>
-    <a:masterClrMapping/>
-  </p:clrMapOvr>
-</p:sld>
-</file>
-
-<file path=ppt/slides/slide8.xml><?xml version="1.0" encoding="utf-8"?>
-<p:sld xmlns:a="http://schemas.openxmlformats.org/drawingml/2006/main" xmlns:r="http://schemas.openxmlformats.org/officeDocument/2006/relationships" xmlns:p="http://schemas.openxmlformats.org/presentationml/2006/main">
-  <p:cSld>
-    <p:spTree>
-      <p:nvGrpSpPr>
-        <p:cNvPr id="1" name=""/>
-        <p:cNvGrpSpPr/>
-        <p:nvPr/>
-      </p:nvGrpSpPr>
-      <p:grpSpPr>
-        <a:xfrm>
-          <a:off x="0" y="0"/>
-          <a:ext cx="0" cy="0"/>
-          <a:chOff x="0" y="0"/>
-          <a:chExt cx="0" cy="0"/>
-        </a:xfrm>
-      </p:grpSpPr>
-      <p:sp>
-        <p:nvSpPr>
-          <p:cNvPr id="2" name="Title 1"/>
-          <p:cNvSpPr>
-            <a:spLocks noGrp="1"/>
-          </p:cNvSpPr>
-          <p:nvPr>
-            <p:ph type="title"/>
-          </p:nvPr>
-        </p:nvSpPr>
-        <p:spPr>
-          <a:xfrm>
-            <a:off x="838200" y="365125"/>
-            <a:ext cx="9425940" cy="1097915"/>
-          </a:xfrm>
-        </p:spPr>
-        <p:txBody>
-          <a:bodyPr>
-            <a:normAutofit/>
-          </a:bodyPr>
-          <a:lstStyle/>
-          <a:p>
-            <a:r>
-              <a:rPr lang="en-US" sz="3600" dirty="0" smtClean="0"/>
-              <a:t>Predicting at 0 </a:t>
-            </a:r>
-            <a:r>
-              <a:rPr lang="en-US" sz="3600" dirty="0" err="1" smtClean="0"/>
-              <a:t>yrs.since.phd</a:t>
-            </a:r>
-            <a:r>
-              <a:rPr lang="en-US" sz="3600" dirty="0" smtClean="0"/>
-              <a:t>: </a:t>
-            </a:r>
-            <a:r>
-              <a:rPr lang="en-US" sz="3600" b="1" dirty="0" smtClean="0"/>
-              <a:t>Assistant Professors</a:t>
-            </a:r>
-            <a:endParaRPr lang="en-US" sz="3600" dirty="0"/>
-          </a:p>
-        </p:txBody>
-      </p:sp>
-      <p:pic>
-        <p:nvPicPr>
-          <p:cNvPr id="4" name="Picture 3"/>
-          <p:cNvPicPr>
-            <a:picLocks noChangeAspect="1"/>
-          </p:cNvPicPr>
-          <p:nvPr/>
-        </p:nvPicPr>
-        <p:blipFill>
-          <a:blip r:embed="rId2">
-            <a:extLst>
-              <a:ext uri="{28A0092B-C50C-407E-A947-70E740481C1C}">
-                <a14:useLocalDpi xmlns:a14="http://schemas.microsoft.com/office/drawing/2010/main" val="0"/>
-              </a:ext>
-            </a:extLst>
-          </a:blip>
-          <a:stretch>
-            <a:fillRect/>
-          </a:stretch>
-        </p:blipFill>
-        <p:spPr>
-          <a:xfrm>
-            <a:off x="3104014" y="2851784"/>
-            <a:ext cx="6128751" cy="1331595"/>
-          </a:xfrm>
-          <a:prstGeom prst="rect">
-            <a:avLst/>
-          </a:prstGeom>
-        </p:spPr>
-      </p:pic>
-    </p:spTree>
-    <p:extLst>
-      <p:ext uri="{BB962C8B-B14F-4D97-AF65-F5344CB8AC3E}">
-        <p14:creationId xmlns:p14="http://schemas.microsoft.com/office/powerpoint/2010/main" val="2845756888"/>
-      </p:ext>
-    </p:extLst>
-  </p:cSld>
-  <p:clrMapOvr>
-    <a:masterClrMapping/>
-  </p:clrMapOvr>
-</p:sld>
-</file>
-
 <file path=ppt/slides/slide9.xml><?xml version="1.0" encoding="utf-8"?>
 <p:sld xmlns:a="http://schemas.openxmlformats.org/drawingml/2006/main" xmlns:r="http://schemas.openxmlformats.org/officeDocument/2006/relationships" xmlns:p="http://schemas.openxmlformats.org/presentationml/2006/main">
   <p:cSld>
@@ -4103,7 +4431,7 @@
         <p:spPr>
           <a:xfrm>
             <a:off x="838200" y="365125"/>
-            <a:ext cx="9425940" cy="1097915"/>
+            <a:ext cx="9654540" cy="1097915"/>
           </a:xfrm>
         </p:spPr>
         <p:txBody>
@@ -4114,58 +4442,744 @@
           <a:p>
             <a:r>
               <a:rPr lang="en-US" sz="3600" dirty="0" smtClean="0"/>
-              <a:t>Predicting at 0 </a:t>
-            </a:r>
-            <a:r>
-              <a:rPr lang="en-US" sz="3600" dirty="0" err="1" smtClean="0"/>
-              <a:t>yrs.since.phd</a:t>
-            </a:r>
-            <a:r>
-              <a:rPr lang="en-US" sz="3600" dirty="0" smtClean="0"/>
-              <a:t>: </a:t>
-            </a:r>
-            <a:r>
-              <a:rPr lang="en-US" sz="3600" b="1" dirty="0" smtClean="0"/>
-              <a:t>Associate Professors</a:t>
+              <a:t>Let’s say we come up with these coefficients:</a:t>
             </a:r>
             <a:endParaRPr lang="en-US" sz="3600" dirty="0"/>
           </a:p>
         </p:txBody>
       </p:sp>
-      <p:pic>
-        <p:nvPicPr>
-          <p:cNvPr id="3" name="Picture 2"/>
-          <p:cNvPicPr>
-            <a:picLocks noChangeAspect="1"/>
-          </p:cNvPicPr>
-          <p:nvPr/>
-        </p:nvPicPr>
-        <p:blipFill>
-          <a:blip r:embed="rId2">
-            <a:extLst>
-              <a:ext uri="{28A0092B-C50C-407E-A947-70E740481C1C}">
-                <a14:useLocalDpi xmlns:a14="http://schemas.microsoft.com/office/drawing/2010/main" val="0"/>
-              </a:ext>
-            </a:extLst>
-          </a:blip>
-          <a:stretch>
-            <a:fillRect/>
-          </a:stretch>
-        </p:blipFill>
-        <p:spPr>
-          <a:xfrm>
-            <a:off x="2276067" y="2877501"/>
-            <a:ext cx="7418886" cy="1331595"/>
-          </a:xfrm>
-          <a:prstGeom prst="rect">
-            <a:avLst/>
-          </a:prstGeom>
-        </p:spPr>
-      </p:pic>
+      <mc:AlternateContent xmlns:mc="http://schemas.openxmlformats.org/markup-compatibility/2006">
+        <mc:Choice xmlns:a14="http://schemas.microsoft.com/office/drawing/2010/main" Requires="a14">
+          <p:graphicFrame>
+            <p:nvGraphicFramePr>
+              <p:cNvPr id="4" name="Table 3"/>
+              <p:cNvGraphicFramePr>
+                <a:graphicFrameLocks noGrp="1"/>
+              </p:cNvGraphicFramePr>
+              <p:nvPr>
+                <p:extLst>
+                  <p:ext uri="{D42A27DB-BD31-4B8C-83A1-F6EECF244321}">
+                    <p14:modId xmlns:p14="http://schemas.microsoft.com/office/powerpoint/2010/main" val="830646405"/>
+                  </p:ext>
+                </p:extLst>
+              </p:nvPr>
+            </p:nvGraphicFramePr>
+            <p:xfrm>
+              <a:off x="2377441" y="2238224"/>
+              <a:ext cx="6217918" cy="2286000"/>
+            </p:xfrm>
+            <a:graphic>
+              <a:graphicData uri="http://schemas.openxmlformats.org/drawingml/2006/table">
+                <a:tbl>
+                  <a:tblPr firstRow="1" bandRow="1">
+                    <a:tableStyleId>{5C22544A-7EE6-4342-B048-85BDC9FD1C3A}</a:tableStyleId>
+                  </a:tblPr>
+                  <a:tblGrid>
+                    <a:gridCol w="2285999">
+                      <a:extLst>
+                        <a:ext uri="{9D8B030D-6E8A-4147-A177-3AD203B41FA5}">
+                          <a16:colId xmlns:a16="http://schemas.microsoft.com/office/drawing/2014/main" val="3802769981"/>
+                        </a:ext>
+                      </a:extLst>
+                    </a:gridCol>
+                    <a:gridCol w="1697105">
+                      <a:extLst>
+                        <a:ext uri="{9D8B030D-6E8A-4147-A177-3AD203B41FA5}">
+                          <a16:colId xmlns:a16="http://schemas.microsoft.com/office/drawing/2014/main" val="899919064"/>
+                        </a:ext>
+                      </a:extLst>
+                    </a:gridCol>
+                    <a:gridCol w="2234814">
+                      <a:extLst>
+                        <a:ext uri="{9D8B030D-6E8A-4147-A177-3AD203B41FA5}">
+                          <a16:colId xmlns:a16="http://schemas.microsoft.com/office/drawing/2014/main" val="2042402367"/>
+                        </a:ext>
+                      </a:extLst>
+                    </a:gridCol>
+                  </a:tblGrid>
+                  <a:tr h="370840">
+                    <a:tc>
+                      <a:txBody>
+                        <a:bodyPr/>
+                        <a:lstStyle/>
+                        <a:p>
+                          <a:r>
+                            <a:rPr lang="en-US" sz="2400" dirty="0" smtClean="0"/>
+                            <a:t>Covariate</a:t>
+                          </a:r>
+                          <a:endParaRPr lang="en-US" sz="2400" dirty="0"/>
+                        </a:p>
+                      </a:txBody>
+                      <a:tcPr/>
+                    </a:tc>
+                    <a:tc>
+                      <a:txBody>
+                        <a:bodyPr/>
+                        <a:lstStyle/>
+                        <a:p>
+                          <a:r>
+                            <a:rPr lang="en-US" sz="2400" dirty="0" smtClean="0"/>
+                            <a:t>Symbol</a:t>
+                          </a:r>
+                        </a:p>
+                      </a:txBody>
+                      <a:tcPr/>
+                    </a:tc>
+                    <a:tc>
+                      <a:txBody>
+                        <a:bodyPr/>
+                        <a:lstStyle/>
+                        <a:p>
+                          <a:r>
+                            <a:rPr lang="en-US" sz="2400" dirty="0" smtClean="0"/>
+                            <a:t>Coefficient</a:t>
+                          </a:r>
+                          <a:endParaRPr lang="en-US" sz="2400" dirty="0"/>
+                        </a:p>
+                      </a:txBody>
+                      <a:tcPr/>
+                    </a:tc>
+                    <a:extLst>
+                      <a:ext uri="{0D108BD9-81ED-4DB2-BD59-A6C34878D82A}">
+                        <a16:rowId xmlns:a16="http://schemas.microsoft.com/office/drawing/2014/main" val="390419479"/>
+                      </a:ext>
+                    </a:extLst>
+                  </a:tr>
+                  <a:tr h="370840">
+                    <a:tc>
+                      <a:txBody>
+                        <a:bodyPr/>
+                        <a:lstStyle/>
+                        <a:p>
+                          <a:r>
+                            <a:rPr lang="en-US" sz="2400" dirty="0" smtClean="0"/>
+                            <a:t>Intercept</a:t>
+                          </a:r>
+                          <a:endParaRPr lang="en-US" sz="2400" dirty="0"/>
+                        </a:p>
+                      </a:txBody>
+                      <a:tcPr/>
+                    </a:tc>
+                    <a:tc>
+                      <a:txBody>
+                        <a:bodyPr/>
+                        <a:lstStyle/>
+                        <a:p>
+                          <a14:m>
+                            <m:oMathPara xmlns:m="http://schemas.openxmlformats.org/officeDocument/2006/math">
+                              <m:oMathParaPr>
+                                <m:jc m:val="centerGroup"/>
+                              </m:oMathParaPr>
+                              <m:oMath xmlns:m="http://schemas.openxmlformats.org/officeDocument/2006/math">
+                                <m:sSub>
+                                  <m:sSubPr>
+                                    <m:ctrlPr>
+                                      <a:rPr lang="en-US" sz="2400" b="0" i="1" smtClean="0">
+                                        <a:latin typeface="Cambria Math" panose="02040503050406030204" pitchFamily="18" charset="0"/>
+                                      </a:rPr>
+                                    </m:ctrlPr>
+                                  </m:sSubPr>
+                                  <m:e>
+                                    <m:r>
+                                      <a:rPr lang="en-US" sz="2400" b="0" i="1" smtClean="0">
+                                        <a:latin typeface="Cambria Math" panose="02040503050406030204" pitchFamily="18" charset="0"/>
+                                      </a:rPr>
+                                      <m:t>𝛽</m:t>
+                                    </m:r>
+                                  </m:e>
+                                  <m:sub>
+                                    <m:r>
+                                      <a:rPr lang="en-US" sz="2400" b="0" i="1" smtClean="0">
+                                        <a:latin typeface="Cambria Math" panose="02040503050406030204" pitchFamily="18" charset="0"/>
+                                      </a:rPr>
+                                      <m:t>0</m:t>
+                                    </m:r>
+                                  </m:sub>
+                                </m:sSub>
+                              </m:oMath>
+                            </m:oMathPara>
+                          </a14:m>
+                          <a:endParaRPr lang="en-US" sz="2400" dirty="0"/>
+                        </a:p>
+                      </a:txBody>
+                      <a:tcPr/>
+                    </a:tc>
+                    <a:tc>
+                      <a:txBody>
+                        <a:bodyPr/>
+                        <a:lstStyle/>
+                        <a:p>
+                          <a:r>
+                            <a:rPr lang="en-US" sz="2400" dirty="0" smtClean="0"/>
+                            <a:t>81,000</a:t>
+                          </a:r>
+                          <a:endParaRPr lang="en-US" sz="2400" dirty="0"/>
+                        </a:p>
+                      </a:txBody>
+                      <a:tcPr/>
+                    </a:tc>
+                    <a:extLst>
+                      <a:ext uri="{0D108BD9-81ED-4DB2-BD59-A6C34878D82A}">
+                        <a16:rowId xmlns:a16="http://schemas.microsoft.com/office/drawing/2014/main" val="291366966"/>
+                      </a:ext>
+                    </a:extLst>
+                  </a:tr>
+                  <a:tr h="370840">
+                    <a:tc>
+                      <a:txBody>
+                        <a:bodyPr/>
+                        <a:lstStyle/>
+                        <a:p>
+                          <a:r>
+                            <a:rPr lang="en-US" sz="2400" dirty="0" err="1" smtClean="0"/>
+                            <a:t>yrs.since.phd</a:t>
+                          </a:r>
+                          <a:endParaRPr lang="en-US" sz="2400" dirty="0"/>
+                        </a:p>
+                      </a:txBody>
+                      <a:tcPr/>
+                    </a:tc>
+                    <a:tc>
+                      <a:txBody>
+                        <a:bodyPr/>
+                        <a:lstStyle/>
+                        <a:p>
+                          <a14:m>
+                            <m:oMathPara xmlns:m="http://schemas.openxmlformats.org/officeDocument/2006/math">
+                              <m:oMathParaPr>
+                                <m:jc m:val="centerGroup"/>
+                              </m:oMathParaPr>
+                              <m:oMath xmlns:m="http://schemas.openxmlformats.org/officeDocument/2006/math">
+                                <m:sSub>
+                                  <m:sSubPr>
+                                    <m:ctrlPr>
+                                      <a:rPr lang="en-US" sz="2400" b="0" i="1" smtClean="0">
+                                        <a:latin typeface="Cambria Math" panose="02040503050406030204" pitchFamily="18" charset="0"/>
+                                      </a:rPr>
+                                    </m:ctrlPr>
+                                  </m:sSubPr>
+                                  <m:e>
+                                    <m:r>
+                                      <a:rPr lang="en-US" sz="2400" b="0" i="1" smtClean="0">
+                                        <a:latin typeface="Cambria Math" panose="02040503050406030204" pitchFamily="18" charset="0"/>
+                                      </a:rPr>
+                                      <m:t>𝛽</m:t>
+                                    </m:r>
+                                  </m:e>
+                                  <m:sub>
+                                    <m:r>
+                                      <a:rPr lang="en-US" sz="2400" b="0" i="1" smtClean="0">
+                                        <a:latin typeface="Cambria Math" panose="02040503050406030204" pitchFamily="18" charset="0"/>
+                                      </a:rPr>
+                                      <m:t>1</m:t>
+                                    </m:r>
+                                  </m:sub>
+                                </m:sSub>
+                              </m:oMath>
+                            </m:oMathPara>
+                          </a14:m>
+                          <a:endParaRPr lang="en-US" sz="2400" dirty="0"/>
+                        </a:p>
+                      </a:txBody>
+                      <a:tcPr/>
+                    </a:tc>
+                    <a:tc>
+                      <a:txBody>
+                        <a:bodyPr/>
+                        <a:lstStyle/>
+                        <a:p>
+                          <a:r>
+                            <a:rPr lang="en-US" sz="2400" dirty="0" smtClean="0"/>
+                            <a:t>1,000</a:t>
+                          </a:r>
+                          <a:endParaRPr lang="en-US" sz="2400" dirty="0"/>
+                        </a:p>
+                      </a:txBody>
+                      <a:tcPr/>
+                    </a:tc>
+                    <a:extLst>
+                      <a:ext uri="{0D108BD9-81ED-4DB2-BD59-A6C34878D82A}">
+                        <a16:rowId xmlns:a16="http://schemas.microsoft.com/office/drawing/2014/main" val="402487520"/>
+                      </a:ext>
+                    </a:extLst>
+                  </a:tr>
+                  <a:tr h="370840">
+                    <a:tc>
+                      <a:txBody>
+                        <a:bodyPr/>
+                        <a:lstStyle/>
+                        <a:p>
+                          <a:r>
+                            <a:rPr lang="en-US" sz="2400" dirty="0" err="1" smtClean="0"/>
+                            <a:t>is.assoc</a:t>
+                          </a:r>
+                          <a:endParaRPr lang="en-US" sz="2400" dirty="0"/>
+                        </a:p>
+                      </a:txBody>
+                      <a:tcPr/>
+                    </a:tc>
+                    <a:tc>
+                      <a:txBody>
+                        <a:bodyPr/>
+                        <a:lstStyle/>
+                        <a:p>
+                          <a14:m>
+                            <m:oMathPara xmlns:m="http://schemas.openxmlformats.org/officeDocument/2006/math">
+                              <m:oMathParaPr>
+                                <m:jc m:val="centerGroup"/>
+                              </m:oMathParaPr>
+                              <m:oMath xmlns:m="http://schemas.openxmlformats.org/officeDocument/2006/math">
+                                <m:sSub>
+                                  <m:sSubPr>
+                                    <m:ctrlPr>
+                                      <a:rPr lang="en-US" sz="2400" b="0" i="1" smtClean="0">
+                                        <a:latin typeface="Cambria Math" panose="02040503050406030204" pitchFamily="18" charset="0"/>
+                                      </a:rPr>
+                                    </m:ctrlPr>
+                                  </m:sSubPr>
+                                  <m:e>
+                                    <m:r>
+                                      <a:rPr lang="en-US" sz="2400" b="0" i="1" smtClean="0">
+                                        <a:latin typeface="Cambria Math" panose="02040503050406030204" pitchFamily="18" charset="0"/>
+                                      </a:rPr>
+                                      <m:t>𝛽</m:t>
+                                    </m:r>
+                                  </m:e>
+                                  <m:sub>
+                                    <m:r>
+                                      <a:rPr lang="en-US" sz="2400" b="0" i="1" smtClean="0">
+                                        <a:latin typeface="Cambria Math" panose="02040503050406030204" pitchFamily="18" charset="0"/>
+                                      </a:rPr>
+                                      <m:t>2</m:t>
+                                    </m:r>
+                                  </m:sub>
+                                </m:sSub>
+                              </m:oMath>
+                            </m:oMathPara>
+                          </a14:m>
+                          <a:endParaRPr lang="en-US" sz="2400" dirty="0"/>
+                        </a:p>
+                      </a:txBody>
+                      <a:tcPr/>
+                    </a:tc>
+                    <a:tc>
+                      <a:txBody>
+                        <a:bodyPr/>
+                        <a:lstStyle/>
+                        <a:p>
+                          <a:r>
+                            <a:rPr lang="en-US" sz="2400" dirty="0" smtClean="0"/>
+                            <a:t>14,000</a:t>
+                          </a:r>
+                          <a:endParaRPr lang="en-US" sz="2400" dirty="0"/>
+                        </a:p>
+                      </a:txBody>
+                      <a:tcPr/>
+                    </a:tc>
+                    <a:extLst>
+                      <a:ext uri="{0D108BD9-81ED-4DB2-BD59-A6C34878D82A}">
+                        <a16:rowId xmlns:a16="http://schemas.microsoft.com/office/drawing/2014/main" val="678565980"/>
+                      </a:ext>
+                    </a:extLst>
+                  </a:tr>
+                  <a:tr h="370840">
+                    <a:tc>
+                      <a:txBody>
+                        <a:bodyPr/>
+                        <a:lstStyle/>
+                        <a:p>
+                          <a:r>
+                            <a:rPr lang="en-US" sz="2400" dirty="0" err="1" smtClean="0"/>
+                            <a:t>is.fullprof</a:t>
+                          </a:r>
+                          <a:endParaRPr lang="en-US" sz="2400" dirty="0"/>
+                        </a:p>
+                      </a:txBody>
+                      <a:tcPr/>
+                    </a:tc>
+                    <a:tc>
+                      <a:txBody>
+                        <a:bodyPr/>
+                        <a:lstStyle/>
+                        <a:p>
+                          <a14:m>
+                            <m:oMathPara xmlns:m="http://schemas.openxmlformats.org/officeDocument/2006/math">
+                              <m:oMathParaPr>
+                                <m:jc m:val="centerGroup"/>
+                              </m:oMathParaPr>
+                              <m:oMath xmlns:m="http://schemas.openxmlformats.org/officeDocument/2006/math">
+                                <m:sSub>
+                                  <m:sSubPr>
+                                    <m:ctrlPr>
+                                      <a:rPr lang="en-US" sz="2400" b="0" i="1" smtClean="0">
+                                        <a:latin typeface="Cambria Math" panose="02040503050406030204" pitchFamily="18" charset="0"/>
+                                      </a:rPr>
+                                    </m:ctrlPr>
+                                  </m:sSubPr>
+                                  <m:e>
+                                    <m:r>
+                                      <a:rPr lang="en-US" sz="2400" b="0" i="1" smtClean="0">
+                                        <a:latin typeface="Cambria Math" panose="02040503050406030204" pitchFamily="18" charset="0"/>
+                                      </a:rPr>
+                                      <m:t>𝛽</m:t>
+                                    </m:r>
+                                  </m:e>
+                                  <m:sub>
+                                    <m:r>
+                                      <a:rPr lang="en-US" sz="2400" b="0" i="1" smtClean="0">
+                                        <a:latin typeface="Cambria Math" panose="02040503050406030204" pitchFamily="18" charset="0"/>
+                                      </a:rPr>
+                                      <m:t>3</m:t>
+                                    </m:r>
+                                  </m:sub>
+                                </m:sSub>
+                              </m:oMath>
+                            </m:oMathPara>
+                          </a14:m>
+                          <a:endParaRPr lang="en-US" sz="2400" dirty="0"/>
+                        </a:p>
+                      </a:txBody>
+                      <a:tcPr/>
+                    </a:tc>
+                    <a:tc>
+                      <a:txBody>
+                        <a:bodyPr/>
+                        <a:lstStyle/>
+                        <a:p>
+                          <a:r>
+                            <a:rPr lang="en-US" sz="2400" dirty="0" smtClean="0"/>
+                            <a:t>49,000</a:t>
+                          </a:r>
+                          <a:endParaRPr lang="en-US" sz="2400" dirty="0"/>
+                        </a:p>
+                      </a:txBody>
+                      <a:tcPr/>
+                    </a:tc>
+                    <a:extLst>
+                      <a:ext uri="{0D108BD9-81ED-4DB2-BD59-A6C34878D82A}">
+                        <a16:rowId xmlns:a16="http://schemas.microsoft.com/office/drawing/2014/main" val="1400199756"/>
+                      </a:ext>
+                    </a:extLst>
+                  </a:tr>
+                </a:tbl>
+              </a:graphicData>
+            </a:graphic>
+          </p:graphicFrame>
+        </mc:Choice>
+        <mc:Fallback>
+          <p:graphicFrame>
+            <p:nvGraphicFramePr>
+              <p:cNvPr id="4" name="Table 3"/>
+              <p:cNvGraphicFramePr>
+                <a:graphicFrameLocks noGrp="1"/>
+              </p:cNvGraphicFramePr>
+              <p:nvPr>
+                <p:extLst>
+                  <p:ext uri="{D42A27DB-BD31-4B8C-83A1-F6EECF244321}">
+                    <p14:modId xmlns:p14="http://schemas.microsoft.com/office/powerpoint/2010/main" val="830646405"/>
+                  </p:ext>
+                </p:extLst>
+              </p:nvPr>
+            </p:nvGraphicFramePr>
+            <p:xfrm>
+              <a:off x="2377441" y="2238224"/>
+              <a:ext cx="6217918" cy="2286000"/>
+            </p:xfrm>
+            <a:graphic>
+              <a:graphicData uri="http://schemas.openxmlformats.org/drawingml/2006/table">
+                <a:tbl>
+                  <a:tblPr firstRow="1" bandRow="1">
+                    <a:tableStyleId>{5C22544A-7EE6-4342-B048-85BDC9FD1C3A}</a:tableStyleId>
+                  </a:tblPr>
+                  <a:tblGrid>
+                    <a:gridCol w="2285999">
+                      <a:extLst>
+                        <a:ext uri="{9D8B030D-6E8A-4147-A177-3AD203B41FA5}">
+                          <a16:colId xmlns:a16="http://schemas.microsoft.com/office/drawing/2014/main" val="3802769981"/>
+                        </a:ext>
+                      </a:extLst>
+                    </a:gridCol>
+                    <a:gridCol w="1697105">
+                      <a:extLst>
+                        <a:ext uri="{9D8B030D-6E8A-4147-A177-3AD203B41FA5}">
+                          <a16:colId xmlns:a16="http://schemas.microsoft.com/office/drawing/2014/main" val="899919064"/>
+                        </a:ext>
+                      </a:extLst>
+                    </a:gridCol>
+                    <a:gridCol w="2234814">
+                      <a:extLst>
+                        <a:ext uri="{9D8B030D-6E8A-4147-A177-3AD203B41FA5}">
+                          <a16:colId xmlns:a16="http://schemas.microsoft.com/office/drawing/2014/main" val="2042402367"/>
+                        </a:ext>
+                      </a:extLst>
+                    </a:gridCol>
+                  </a:tblGrid>
+                  <a:tr h="457200">
+                    <a:tc>
+                      <a:txBody>
+                        <a:bodyPr/>
+                        <a:lstStyle/>
+                        <a:p>
+                          <a:r>
+                            <a:rPr lang="en-US" sz="2400" dirty="0" smtClean="0"/>
+                            <a:t>Covariate</a:t>
+                          </a:r>
+                          <a:endParaRPr lang="en-US" sz="2400" dirty="0"/>
+                        </a:p>
+                      </a:txBody>
+                      <a:tcPr/>
+                    </a:tc>
+                    <a:tc>
+                      <a:txBody>
+                        <a:bodyPr/>
+                        <a:lstStyle/>
+                        <a:p>
+                          <a:r>
+                            <a:rPr lang="en-US" sz="2400" dirty="0" smtClean="0"/>
+                            <a:t>Symbol</a:t>
+                          </a:r>
+                        </a:p>
+                      </a:txBody>
+                      <a:tcPr/>
+                    </a:tc>
+                    <a:tc>
+                      <a:txBody>
+                        <a:bodyPr/>
+                        <a:lstStyle/>
+                        <a:p>
+                          <a:r>
+                            <a:rPr lang="en-US" sz="2400" dirty="0" smtClean="0"/>
+                            <a:t>Coefficient</a:t>
+                          </a:r>
+                          <a:endParaRPr lang="en-US" sz="2400" dirty="0"/>
+                        </a:p>
+                      </a:txBody>
+                      <a:tcPr/>
+                    </a:tc>
+                    <a:extLst>
+                      <a:ext uri="{0D108BD9-81ED-4DB2-BD59-A6C34878D82A}">
+                        <a16:rowId xmlns:a16="http://schemas.microsoft.com/office/drawing/2014/main" val="390419479"/>
+                      </a:ext>
+                    </a:extLst>
+                  </a:tr>
+                  <a:tr h="457200">
+                    <a:tc>
+                      <a:txBody>
+                        <a:bodyPr/>
+                        <a:lstStyle/>
+                        <a:p>
+                          <a:r>
+                            <a:rPr lang="en-US" sz="2400" dirty="0" smtClean="0"/>
+                            <a:t>Intercept</a:t>
+                          </a:r>
+                          <a:endParaRPr lang="en-US" sz="2400" dirty="0"/>
+                        </a:p>
+                      </a:txBody>
+                      <a:tcPr/>
+                    </a:tc>
+                    <a:tc>
+                      <a:txBody>
+                        <a:bodyPr/>
+                        <a:lstStyle/>
+                        <a:p>
+                          <a:endParaRPr lang="en-US"/>
+                        </a:p>
+                      </a:txBody>
+                      <a:tcPr>
+                        <a:blipFill>
+                          <a:blip r:embed="rId2"/>
+                          <a:stretch>
+                            <a:fillRect l="-135612" t="-110667" r="-133813" b="-330667"/>
+                          </a:stretch>
+                        </a:blipFill>
+                      </a:tcPr>
+                    </a:tc>
+                    <a:tc>
+                      <a:txBody>
+                        <a:bodyPr/>
+                        <a:lstStyle/>
+                        <a:p>
+                          <a:r>
+                            <a:rPr lang="en-US" sz="2400" dirty="0" smtClean="0"/>
+                            <a:t>81,000</a:t>
+                          </a:r>
+                          <a:endParaRPr lang="en-US" sz="2400" dirty="0"/>
+                        </a:p>
+                      </a:txBody>
+                      <a:tcPr/>
+                    </a:tc>
+                    <a:extLst>
+                      <a:ext uri="{0D108BD9-81ED-4DB2-BD59-A6C34878D82A}">
+                        <a16:rowId xmlns:a16="http://schemas.microsoft.com/office/drawing/2014/main" val="291366966"/>
+                      </a:ext>
+                    </a:extLst>
+                  </a:tr>
+                  <a:tr h="457200">
+                    <a:tc>
+                      <a:txBody>
+                        <a:bodyPr/>
+                        <a:lstStyle/>
+                        <a:p>
+                          <a:r>
+                            <a:rPr lang="en-US" sz="2400" dirty="0" err="1" smtClean="0"/>
+                            <a:t>yrs.since.phd</a:t>
+                          </a:r>
+                          <a:endParaRPr lang="en-US" sz="2400" dirty="0"/>
+                        </a:p>
+                      </a:txBody>
+                      <a:tcPr/>
+                    </a:tc>
+                    <a:tc>
+                      <a:txBody>
+                        <a:bodyPr/>
+                        <a:lstStyle/>
+                        <a:p>
+                          <a:endParaRPr lang="en-US"/>
+                        </a:p>
+                      </a:txBody>
+                      <a:tcPr>
+                        <a:blipFill>
+                          <a:blip r:embed="rId2"/>
+                          <a:stretch>
+                            <a:fillRect l="-135612" t="-207895" r="-133813" b="-226316"/>
+                          </a:stretch>
+                        </a:blipFill>
+                      </a:tcPr>
+                    </a:tc>
+                    <a:tc>
+                      <a:txBody>
+                        <a:bodyPr/>
+                        <a:lstStyle/>
+                        <a:p>
+                          <a:r>
+                            <a:rPr lang="en-US" sz="2400" dirty="0" smtClean="0"/>
+                            <a:t>1,000</a:t>
+                          </a:r>
+                          <a:endParaRPr lang="en-US" sz="2400" dirty="0"/>
+                        </a:p>
+                      </a:txBody>
+                      <a:tcPr/>
+                    </a:tc>
+                    <a:extLst>
+                      <a:ext uri="{0D108BD9-81ED-4DB2-BD59-A6C34878D82A}">
+                        <a16:rowId xmlns:a16="http://schemas.microsoft.com/office/drawing/2014/main" val="402487520"/>
+                      </a:ext>
+                    </a:extLst>
+                  </a:tr>
+                  <a:tr h="457200">
+                    <a:tc>
+                      <a:txBody>
+                        <a:bodyPr/>
+                        <a:lstStyle/>
+                        <a:p>
+                          <a:r>
+                            <a:rPr lang="en-US" sz="2400" dirty="0" err="1" smtClean="0"/>
+                            <a:t>is.assoc</a:t>
+                          </a:r>
+                          <a:endParaRPr lang="en-US" sz="2400" dirty="0"/>
+                        </a:p>
+                      </a:txBody>
+                      <a:tcPr/>
+                    </a:tc>
+                    <a:tc>
+                      <a:txBody>
+                        <a:bodyPr/>
+                        <a:lstStyle/>
+                        <a:p>
+                          <a:endParaRPr lang="en-US"/>
+                        </a:p>
+                      </a:txBody>
+                      <a:tcPr>
+                        <a:blipFill>
+                          <a:blip r:embed="rId2"/>
+                          <a:stretch>
+                            <a:fillRect l="-135612" t="-312000" r="-133813" b="-129333"/>
+                          </a:stretch>
+                        </a:blipFill>
+                      </a:tcPr>
+                    </a:tc>
+                    <a:tc>
+                      <a:txBody>
+                        <a:bodyPr/>
+                        <a:lstStyle/>
+                        <a:p>
+                          <a:r>
+                            <a:rPr lang="en-US" sz="2400" dirty="0" smtClean="0"/>
+                            <a:t>14,000</a:t>
+                          </a:r>
+                          <a:endParaRPr lang="en-US" sz="2400" dirty="0"/>
+                        </a:p>
+                      </a:txBody>
+                      <a:tcPr/>
+                    </a:tc>
+                    <a:extLst>
+                      <a:ext uri="{0D108BD9-81ED-4DB2-BD59-A6C34878D82A}">
+                        <a16:rowId xmlns:a16="http://schemas.microsoft.com/office/drawing/2014/main" val="678565980"/>
+                      </a:ext>
+                    </a:extLst>
+                  </a:tr>
+                  <a:tr h="457200">
+                    <a:tc>
+                      <a:txBody>
+                        <a:bodyPr/>
+                        <a:lstStyle/>
+                        <a:p>
+                          <a:r>
+                            <a:rPr lang="en-US" sz="2400" dirty="0" err="1" smtClean="0"/>
+                            <a:t>is.fullprof</a:t>
+                          </a:r>
+                          <a:endParaRPr lang="en-US" sz="2400" dirty="0"/>
+                        </a:p>
+                      </a:txBody>
+                      <a:tcPr/>
+                    </a:tc>
+                    <a:tc>
+                      <a:txBody>
+                        <a:bodyPr/>
+                        <a:lstStyle/>
+                        <a:p>
+                          <a:endParaRPr lang="en-US"/>
+                        </a:p>
+                      </a:txBody>
+                      <a:tcPr>
+                        <a:blipFill>
+                          <a:blip r:embed="rId2"/>
+                          <a:stretch>
+                            <a:fillRect l="-135612" t="-412000" r="-133813" b="-29333"/>
+                          </a:stretch>
+                        </a:blipFill>
+                      </a:tcPr>
+                    </a:tc>
+                    <a:tc>
+                      <a:txBody>
+                        <a:bodyPr/>
+                        <a:lstStyle/>
+                        <a:p>
+                          <a:r>
+                            <a:rPr lang="en-US" sz="2400" dirty="0" smtClean="0"/>
+                            <a:t>49,000</a:t>
+                          </a:r>
+                          <a:endParaRPr lang="en-US" sz="2400" dirty="0"/>
+                        </a:p>
+                      </a:txBody>
+                      <a:tcPr/>
+                    </a:tc>
+                    <a:extLst>
+                      <a:ext uri="{0D108BD9-81ED-4DB2-BD59-A6C34878D82A}">
+                        <a16:rowId xmlns:a16="http://schemas.microsoft.com/office/drawing/2014/main" val="1400199756"/>
+                      </a:ext>
+                    </a:extLst>
+                  </a:tr>
+                </a:tbl>
+              </a:graphicData>
+            </a:graphic>
+          </p:graphicFrame>
+        </mc:Fallback>
+      </mc:AlternateContent>
     </p:spTree>
     <p:extLst>
       <p:ext uri="{BB962C8B-B14F-4D97-AF65-F5344CB8AC3E}">
-        <p14:creationId xmlns:p14="http://schemas.microsoft.com/office/powerpoint/2010/main" val="690624115"/>
+        <p14:creationId xmlns:p14="http://schemas.microsoft.com/office/powerpoint/2010/main" val="33071646"/>
       </p:ext>
     </p:extLst>
   </p:cSld>

</xml_diff>

<commit_message>
final rank ppt for this quarter, includes typo
</commit_message>
<xml_diff>
--- a/module_8/part_3/rank_example/rank_example.pptx
+++ b/module_8/part_3/rank_example/rank_example.pptx
@@ -3076,15 +3076,7 @@
           <a:p>
             <a:r>
               <a:rPr lang="en-US" sz="3600" dirty="0" smtClean="0"/>
-              <a:t>Predicting at 0 </a:t>
-            </a:r>
-            <a:r>
-              <a:rPr lang="en-US" sz="3600" dirty="0" err="1" smtClean="0"/>
-              <a:t>yrs.since.phd</a:t>
-            </a:r>
-            <a:r>
-              <a:rPr lang="en-US" sz="3600" dirty="0" smtClean="0"/>
-              <a:t>: </a:t>
+              <a:t>Predicting at 0 yrs.since.phd: </a:t>
             </a:r>
             <a:r>
               <a:rPr lang="en-US" sz="3600" b="1" dirty="0" smtClean="0"/>
@@ -3124,738 +3116,30 @@
           </a:prstGeom>
         </p:spPr>
       </p:pic>
-      <mc:AlternateContent xmlns:mc="http://schemas.openxmlformats.org/markup-compatibility/2006">
-        <mc:Choice xmlns:a14="http://schemas.microsoft.com/office/drawing/2010/main" Requires="a14">
-          <p:graphicFrame>
-            <p:nvGraphicFramePr>
-              <p:cNvPr id="5" name="Table 4"/>
-              <p:cNvGraphicFramePr>
-                <a:graphicFrameLocks noGrp="1"/>
-              </p:cNvGraphicFramePr>
-              <p:nvPr>
-                <p:extLst>
-                  <p:ext uri="{D42A27DB-BD31-4B8C-83A1-F6EECF244321}">
-                    <p14:modId xmlns:p14="http://schemas.microsoft.com/office/powerpoint/2010/main" val="2915175915"/>
-                  </p:ext>
-                </p:extLst>
-              </p:nvPr>
-            </p:nvGraphicFramePr>
-            <p:xfrm>
-              <a:off x="557844" y="4655045"/>
-              <a:ext cx="5092339" cy="1834155"/>
-            </p:xfrm>
-            <a:graphic>
-              <a:graphicData uri="http://schemas.openxmlformats.org/drawingml/2006/table">
-                <a:tbl>
-                  <a:tblPr firstRow="1" bandRow="1">
-                    <a:tableStyleId>{5C22544A-7EE6-4342-B048-85BDC9FD1C3A}</a:tableStyleId>
-                  </a:tblPr>
-                  <a:tblGrid>
-                    <a:gridCol w="1438503">
-                      <a:extLst>
-                        <a:ext uri="{9D8B030D-6E8A-4147-A177-3AD203B41FA5}">
-                          <a16:colId xmlns:a16="http://schemas.microsoft.com/office/drawing/2014/main" val="3802769981"/>
-                        </a:ext>
-                      </a:extLst>
-                    </a:gridCol>
-                    <a:gridCol w="1053991">
-                      <a:extLst>
-                        <a:ext uri="{9D8B030D-6E8A-4147-A177-3AD203B41FA5}">
-                          <a16:colId xmlns:a16="http://schemas.microsoft.com/office/drawing/2014/main" val="899919064"/>
-                        </a:ext>
-                      </a:extLst>
-                    </a:gridCol>
-                    <a:gridCol w="2599845">
-                      <a:extLst>
-                        <a:ext uri="{9D8B030D-6E8A-4147-A177-3AD203B41FA5}">
-                          <a16:colId xmlns:a16="http://schemas.microsoft.com/office/drawing/2014/main" val="2042402367"/>
-                        </a:ext>
-                      </a:extLst>
-                    </a:gridCol>
-                  </a:tblGrid>
-                  <a:tr h="366831">
-                    <a:tc>
-                      <a:txBody>
-                        <a:bodyPr/>
-                        <a:lstStyle/>
-                        <a:p>
-                          <a:r>
-                            <a:rPr lang="en-US" sz="1800" dirty="0" smtClean="0"/>
-                            <a:t>Covariate</a:t>
-                          </a:r>
-                          <a:endParaRPr lang="en-US" sz="1800" dirty="0"/>
-                        </a:p>
-                      </a:txBody>
-                      <a:tcPr/>
-                    </a:tc>
-                    <a:tc>
-                      <a:txBody>
-                        <a:bodyPr/>
-                        <a:lstStyle/>
-                        <a:p>
-                          <a:r>
-                            <a:rPr lang="en-US" sz="1800" dirty="0" smtClean="0"/>
-                            <a:t>Symbol</a:t>
-                          </a:r>
-                        </a:p>
-                      </a:txBody>
-                      <a:tcPr/>
-                    </a:tc>
-                    <a:tc>
-                      <a:txBody>
-                        <a:bodyPr/>
-                        <a:lstStyle/>
-                        <a:p>
-                          <a:r>
-                            <a:rPr lang="en-US" sz="1800" dirty="0" smtClean="0"/>
-                            <a:t>Coefficient</a:t>
-                          </a:r>
-                          <a:endParaRPr lang="en-US" sz="1800" dirty="0"/>
-                        </a:p>
-                      </a:txBody>
-                      <a:tcPr/>
-                    </a:tc>
-                    <a:extLst>
-                      <a:ext uri="{0D108BD9-81ED-4DB2-BD59-A6C34878D82A}">
-                        <a16:rowId xmlns:a16="http://schemas.microsoft.com/office/drawing/2014/main" val="390419479"/>
-                      </a:ext>
-                    </a:extLst>
-                  </a:tr>
-                  <a:tr h="366831">
-                    <a:tc>
-                      <a:txBody>
-                        <a:bodyPr/>
-                        <a:lstStyle/>
-                        <a:p>
-                          <a:r>
-                            <a:rPr lang="en-US" sz="1800" dirty="0" smtClean="0"/>
-                            <a:t>Intercept</a:t>
-                          </a:r>
-                          <a:endParaRPr lang="en-US" sz="1800" dirty="0"/>
-                        </a:p>
-                      </a:txBody>
-                      <a:tcPr/>
-                    </a:tc>
-                    <a:tc>
-                      <a:txBody>
-                        <a:bodyPr/>
-                        <a:lstStyle/>
-                        <a:p>
-                          <a:pPr/>
-                          <a14:m>
-                            <m:oMathPara xmlns:m="http://schemas.openxmlformats.org/officeDocument/2006/math">
-                              <m:oMathParaPr>
-                                <m:jc m:val="centerGroup"/>
-                              </m:oMathParaPr>
-                              <m:oMath xmlns:m="http://schemas.openxmlformats.org/officeDocument/2006/math">
-                                <m:sSub>
-                                  <m:sSubPr>
-                                    <m:ctrlPr>
-                                      <a:rPr lang="en-US" sz="1800" b="0" i="1" smtClean="0">
-                                        <a:latin typeface="Cambria Math" panose="02040503050406030204" pitchFamily="18" charset="0"/>
-                                      </a:rPr>
-                                    </m:ctrlPr>
-                                  </m:sSubPr>
-                                  <m:e>
-                                    <m:r>
-                                      <a:rPr lang="en-US" sz="1800" b="0" i="1" smtClean="0">
-                                        <a:latin typeface="Cambria Math" panose="02040503050406030204" pitchFamily="18" charset="0"/>
-                                      </a:rPr>
-                                      <m:t>𝛽</m:t>
-                                    </m:r>
-                                  </m:e>
-                                  <m:sub>
-                                    <m:r>
-                                      <a:rPr lang="en-US" sz="1800" b="0" i="1" smtClean="0">
-                                        <a:latin typeface="Cambria Math" panose="02040503050406030204" pitchFamily="18" charset="0"/>
-                                      </a:rPr>
-                                      <m:t>0</m:t>
-                                    </m:r>
-                                  </m:sub>
-                                </m:sSub>
-                              </m:oMath>
-                            </m:oMathPara>
-                          </a14:m>
-                          <a:endParaRPr lang="en-US" sz="1800" dirty="0"/>
-                        </a:p>
-                      </a:txBody>
-                      <a:tcPr/>
-                    </a:tc>
-                    <a:tc>
-                      <a:txBody>
-                        <a:bodyPr/>
-                        <a:lstStyle/>
-                        <a:p>
-                          <a:r>
-                            <a:rPr lang="en-US" sz="1800" dirty="0" smtClean="0"/>
-                            <a:t>81,000</a:t>
-                          </a:r>
-                          <a:endParaRPr lang="en-US" sz="1800" dirty="0"/>
-                        </a:p>
-                      </a:txBody>
-                      <a:tcPr/>
-                    </a:tc>
-                    <a:extLst>
-                      <a:ext uri="{0D108BD9-81ED-4DB2-BD59-A6C34878D82A}">
-                        <a16:rowId xmlns:a16="http://schemas.microsoft.com/office/drawing/2014/main" val="291366966"/>
-                      </a:ext>
-                    </a:extLst>
-                  </a:tr>
-                  <a:tr h="366831">
-                    <a:tc>
-                      <a:txBody>
-                        <a:bodyPr/>
-                        <a:lstStyle/>
-                        <a:p>
-                          <a:r>
-                            <a:rPr lang="en-US" sz="1800" dirty="0" err="1" smtClean="0"/>
-                            <a:t>yrs.since.phd</a:t>
-                          </a:r>
-                          <a:endParaRPr lang="en-US" sz="1800" dirty="0"/>
-                        </a:p>
-                      </a:txBody>
-                      <a:tcPr/>
-                    </a:tc>
-                    <a:tc>
-                      <a:txBody>
-                        <a:bodyPr/>
-                        <a:lstStyle/>
-                        <a:p>
-                          <a:pPr/>
-                          <a14:m>
-                            <m:oMathPara xmlns:m="http://schemas.openxmlformats.org/officeDocument/2006/math">
-                              <m:oMathParaPr>
-                                <m:jc m:val="centerGroup"/>
-                              </m:oMathParaPr>
-                              <m:oMath xmlns:m="http://schemas.openxmlformats.org/officeDocument/2006/math">
-                                <m:sSub>
-                                  <m:sSubPr>
-                                    <m:ctrlPr>
-                                      <a:rPr lang="en-US" sz="1800" b="0" i="1" smtClean="0">
-                                        <a:latin typeface="Cambria Math" panose="02040503050406030204" pitchFamily="18" charset="0"/>
-                                      </a:rPr>
-                                    </m:ctrlPr>
-                                  </m:sSubPr>
-                                  <m:e>
-                                    <m:r>
-                                      <a:rPr lang="en-US" sz="1800" b="0" i="1" smtClean="0">
-                                        <a:latin typeface="Cambria Math" panose="02040503050406030204" pitchFamily="18" charset="0"/>
-                                      </a:rPr>
-                                      <m:t>𝛽</m:t>
-                                    </m:r>
-                                  </m:e>
-                                  <m:sub>
-                                    <m:r>
-                                      <a:rPr lang="en-US" sz="1800" b="0" i="1" smtClean="0">
-                                        <a:latin typeface="Cambria Math" panose="02040503050406030204" pitchFamily="18" charset="0"/>
-                                      </a:rPr>
-                                      <m:t>1</m:t>
-                                    </m:r>
-                                  </m:sub>
-                                </m:sSub>
-                              </m:oMath>
-                            </m:oMathPara>
-                          </a14:m>
-                          <a:endParaRPr lang="en-US" sz="1800" dirty="0"/>
-                        </a:p>
-                      </a:txBody>
-                      <a:tcPr/>
-                    </a:tc>
-                    <a:tc>
-                      <a:txBody>
-                        <a:bodyPr/>
-                        <a:lstStyle/>
-                        <a:p>
-                          <a:r>
-                            <a:rPr lang="en-US" sz="1800" dirty="0" smtClean="0"/>
-                            <a:t>1,000</a:t>
-                          </a:r>
-                          <a:endParaRPr lang="en-US" sz="1800" dirty="0"/>
-                        </a:p>
-                      </a:txBody>
-                      <a:tcPr/>
-                    </a:tc>
-                    <a:extLst>
-                      <a:ext uri="{0D108BD9-81ED-4DB2-BD59-A6C34878D82A}">
-                        <a16:rowId xmlns:a16="http://schemas.microsoft.com/office/drawing/2014/main" val="402487520"/>
-                      </a:ext>
-                    </a:extLst>
-                  </a:tr>
-                  <a:tr h="366831">
-                    <a:tc>
-                      <a:txBody>
-                        <a:bodyPr/>
-                        <a:lstStyle/>
-                        <a:p>
-                          <a:r>
-                            <a:rPr lang="en-US" sz="1800" dirty="0" err="1" smtClean="0"/>
-                            <a:t>is.assoc</a:t>
-                          </a:r>
-                          <a:endParaRPr lang="en-US" sz="1800" dirty="0"/>
-                        </a:p>
-                      </a:txBody>
-                      <a:tcPr/>
-                    </a:tc>
-                    <a:tc>
-                      <a:txBody>
-                        <a:bodyPr/>
-                        <a:lstStyle/>
-                        <a:p>
-                          <a:pPr/>
-                          <a14:m>
-                            <m:oMathPara xmlns:m="http://schemas.openxmlformats.org/officeDocument/2006/math">
-                              <m:oMathParaPr>
-                                <m:jc m:val="centerGroup"/>
-                              </m:oMathParaPr>
-                              <m:oMath xmlns:m="http://schemas.openxmlformats.org/officeDocument/2006/math">
-                                <m:sSub>
-                                  <m:sSubPr>
-                                    <m:ctrlPr>
-                                      <a:rPr lang="en-US" sz="1800" b="0" i="1" smtClean="0">
-                                        <a:latin typeface="Cambria Math" panose="02040503050406030204" pitchFamily="18" charset="0"/>
-                                      </a:rPr>
-                                    </m:ctrlPr>
-                                  </m:sSubPr>
-                                  <m:e>
-                                    <m:r>
-                                      <a:rPr lang="en-US" sz="1800" b="0" i="1" smtClean="0">
-                                        <a:latin typeface="Cambria Math" panose="02040503050406030204" pitchFamily="18" charset="0"/>
-                                      </a:rPr>
-                                      <m:t>𝛽</m:t>
-                                    </m:r>
-                                  </m:e>
-                                  <m:sub>
-                                    <m:r>
-                                      <a:rPr lang="en-US" sz="1800" b="0" i="1" smtClean="0">
-                                        <a:latin typeface="Cambria Math" panose="02040503050406030204" pitchFamily="18" charset="0"/>
-                                      </a:rPr>
-                                      <m:t>2</m:t>
-                                    </m:r>
-                                  </m:sub>
-                                </m:sSub>
-                              </m:oMath>
-                            </m:oMathPara>
-                          </a14:m>
-                          <a:endParaRPr lang="en-US" sz="1800" dirty="0"/>
-                        </a:p>
-                      </a:txBody>
-                      <a:tcPr/>
-                    </a:tc>
-                    <a:tc>
-                      <a:txBody>
-                        <a:bodyPr/>
-                        <a:lstStyle/>
-                        <a:p>
-                          <a:r>
-                            <a:rPr lang="en-US" sz="1800" dirty="0" smtClean="0"/>
-                            <a:t>14,000</a:t>
-                          </a:r>
-                          <a:endParaRPr lang="en-US" sz="1800" dirty="0"/>
-                        </a:p>
-                      </a:txBody>
-                      <a:tcPr/>
-                    </a:tc>
-                    <a:extLst>
-                      <a:ext uri="{0D108BD9-81ED-4DB2-BD59-A6C34878D82A}">
-                        <a16:rowId xmlns:a16="http://schemas.microsoft.com/office/drawing/2014/main" val="678565980"/>
-                      </a:ext>
-                    </a:extLst>
-                  </a:tr>
-                  <a:tr h="366831">
-                    <a:tc>
-                      <a:txBody>
-                        <a:bodyPr/>
-                        <a:lstStyle/>
-                        <a:p>
-                          <a:r>
-                            <a:rPr lang="en-US" sz="1800" dirty="0" err="1" smtClean="0"/>
-                            <a:t>is.fullprof</a:t>
-                          </a:r>
-                          <a:endParaRPr lang="en-US" sz="1800" dirty="0"/>
-                        </a:p>
-                      </a:txBody>
-                      <a:tcPr/>
-                    </a:tc>
-                    <a:tc>
-                      <a:txBody>
-                        <a:bodyPr/>
-                        <a:lstStyle/>
-                        <a:p>
-                          <a:pPr/>
-                          <a14:m>
-                            <m:oMathPara xmlns:m="http://schemas.openxmlformats.org/officeDocument/2006/math">
-                              <m:oMathParaPr>
-                                <m:jc m:val="centerGroup"/>
-                              </m:oMathParaPr>
-                              <m:oMath xmlns:m="http://schemas.openxmlformats.org/officeDocument/2006/math">
-                                <m:sSub>
-                                  <m:sSubPr>
-                                    <m:ctrlPr>
-                                      <a:rPr lang="en-US" sz="1800" b="0" i="1" smtClean="0">
-                                        <a:latin typeface="Cambria Math" panose="02040503050406030204" pitchFamily="18" charset="0"/>
-                                      </a:rPr>
-                                    </m:ctrlPr>
-                                  </m:sSubPr>
-                                  <m:e>
-                                    <m:r>
-                                      <a:rPr lang="en-US" sz="1800" b="0" i="1" smtClean="0">
-                                        <a:latin typeface="Cambria Math" panose="02040503050406030204" pitchFamily="18" charset="0"/>
-                                      </a:rPr>
-                                      <m:t>𝛽</m:t>
-                                    </m:r>
-                                  </m:e>
-                                  <m:sub>
-                                    <m:r>
-                                      <a:rPr lang="en-US" sz="1800" b="0" i="1" smtClean="0">
-                                        <a:latin typeface="Cambria Math" panose="02040503050406030204" pitchFamily="18" charset="0"/>
-                                      </a:rPr>
-                                      <m:t>3</m:t>
-                                    </m:r>
-                                  </m:sub>
-                                </m:sSub>
-                              </m:oMath>
-                            </m:oMathPara>
-                          </a14:m>
-                          <a:endParaRPr lang="en-US" sz="1800" dirty="0"/>
-                        </a:p>
-                      </a:txBody>
-                      <a:tcPr/>
-                    </a:tc>
-                    <a:tc>
-                      <a:txBody>
-                        <a:bodyPr/>
-                        <a:lstStyle/>
-                        <a:p>
-                          <a:r>
-                            <a:rPr lang="en-US" sz="1800" dirty="0" smtClean="0"/>
-                            <a:t>49,000</a:t>
-                          </a:r>
-                          <a:endParaRPr lang="en-US" sz="1800" dirty="0"/>
-                        </a:p>
-                      </a:txBody>
-                      <a:tcPr/>
-                    </a:tc>
-                    <a:extLst>
-                      <a:ext uri="{0D108BD9-81ED-4DB2-BD59-A6C34878D82A}">
-                        <a16:rowId xmlns:a16="http://schemas.microsoft.com/office/drawing/2014/main" val="1400199756"/>
-                      </a:ext>
-                    </a:extLst>
-                  </a:tr>
-                </a:tbl>
-              </a:graphicData>
-            </a:graphic>
-          </p:graphicFrame>
-        </mc:Choice>
-        <mc:Fallback>
-          <p:graphicFrame>
-            <p:nvGraphicFramePr>
-              <p:cNvPr id="5" name="Table 4"/>
-              <p:cNvGraphicFramePr>
-                <a:graphicFrameLocks noGrp="1"/>
-              </p:cNvGraphicFramePr>
-              <p:nvPr>
-                <p:extLst>
-                  <p:ext uri="{D42A27DB-BD31-4B8C-83A1-F6EECF244321}">
-                    <p14:modId xmlns:p14="http://schemas.microsoft.com/office/powerpoint/2010/main" val="2915175915"/>
-                  </p:ext>
-                </p:extLst>
-              </p:nvPr>
-            </p:nvGraphicFramePr>
-            <p:xfrm>
-              <a:off x="557844" y="4655045"/>
-              <a:ext cx="5092339" cy="1834155"/>
-            </p:xfrm>
-            <a:graphic>
-              <a:graphicData uri="http://schemas.openxmlformats.org/drawingml/2006/table">
-                <a:tbl>
-                  <a:tblPr firstRow="1" bandRow="1">
-                    <a:tableStyleId>{5C22544A-7EE6-4342-B048-85BDC9FD1C3A}</a:tableStyleId>
-                  </a:tblPr>
-                  <a:tblGrid>
-                    <a:gridCol w="1438503">
-                      <a:extLst>
-                        <a:ext uri="{9D8B030D-6E8A-4147-A177-3AD203B41FA5}">
-                          <a16:colId xmlns:a16="http://schemas.microsoft.com/office/drawing/2014/main" val="3802769981"/>
-                        </a:ext>
-                      </a:extLst>
-                    </a:gridCol>
-                    <a:gridCol w="1053991">
-                      <a:extLst>
-                        <a:ext uri="{9D8B030D-6E8A-4147-A177-3AD203B41FA5}">
-                          <a16:colId xmlns:a16="http://schemas.microsoft.com/office/drawing/2014/main" val="899919064"/>
-                        </a:ext>
-                      </a:extLst>
-                    </a:gridCol>
-                    <a:gridCol w="2599845">
-                      <a:extLst>
-                        <a:ext uri="{9D8B030D-6E8A-4147-A177-3AD203B41FA5}">
-                          <a16:colId xmlns:a16="http://schemas.microsoft.com/office/drawing/2014/main" val="2042402367"/>
-                        </a:ext>
-                      </a:extLst>
-                    </a:gridCol>
-                  </a:tblGrid>
-                  <a:tr h="366831">
-                    <a:tc>
-                      <a:txBody>
-                        <a:bodyPr/>
-                        <a:lstStyle/>
-                        <a:p>
-                          <a:r>
-                            <a:rPr lang="en-US" sz="1800" dirty="0" smtClean="0"/>
-                            <a:t>Covariate</a:t>
-                          </a:r>
-                          <a:endParaRPr lang="en-US" sz="1800" dirty="0"/>
-                        </a:p>
-                      </a:txBody>
-                      <a:tcPr/>
-                    </a:tc>
-                    <a:tc>
-                      <a:txBody>
-                        <a:bodyPr/>
-                        <a:lstStyle/>
-                        <a:p>
-                          <a:r>
-                            <a:rPr lang="en-US" sz="1800" dirty="0" smtClean="0"/>
-                            <a:t>Symbol</a:t>
-                          </a:r>
-                        </a:p>
-                      </a:txBody>
-                      <a:tcPr/>
-                    </a:tc>
-                    <a:tc>
-                      <a:txBody>
-                        <a:bodyPr/>
-                        <a:lstStyle/>
-                        <a:p>
-                          <a:r>
-                            <a:rPr lang="en-US" sz="1800" dirty="0" smtClean="0"/>
-                            <a:t>Coefficient</a:t>
-                          </a:r>
-                          <a:endParaRPr lang="en-US" sz="1800" dirty="0"/>
-                        </a:p>
-                      </a:txBody>
-                      <a:tcPr/>
-                    </a:tc>
-                    <a:extLst>
-                      <a:ext uri="{0D108BD9-81ED-4DB2-BD59-A6C34878D82A}">
-                        <a16:rowId xmlns:a16="http://schemas.microsoft.com/office/drawing/2014/main" val="390419479"/>
-                      </a:ext>
-                    </a:extLst>
-                  </a:tr>
-                  <a:tr h="366831">
-                    <a:tc>
-                      <a:txBody>
-                        <a:bodyPr/>
-                        <a:lstStyle/>
-                        <a:p>
-                          <a:r>
-                            <a:rPr lang="en-US" sz="1800" dirty="0" smtClean="0"/>
-                            <a:t>Intercept</a:t>
-                          </a:r>
-                          <a:endParaRPr lang="en-US" sz="1800" dirty="0"/>
-                        </a:p>
-                      </a:txBody>
-                      <a:tcPr/>
-                    </a:tc>
-                    <a:tc>
-                      <a:txBody>
-                        <a:bodyPr/>
-                        <a:lstStyle/>
-                        <a:p>
-                          <a:endParaRPr lang="en-US"/>
-                        </a:p>
-                      </a:txBody>
-                      <a:tcPr>
-                        <a:blipFill>
-                          <a:blip r:embed="rId3"/>
-                          <a:stretch>
-                            <a:fillRect l="-136994" t="-106557" r="-249711" b="-321311"/>
-                          </a:stretch>
-                        </a:blipFill>
-                      </a:tcPr>
-                    </a:tc>
-                    <a:tc>
-                      <a:txBody>
-                        <a:bodyPr/>
-                        <a:lstStyle/>
-                        <a:p>
-                          <a:r>
-                            <a:rPr lang="en-US" sz="1800" dirty="0" smtClean="0"/>
-                            <a:t>81,000</a:t>
-                          </a:r>
-                          <a:endParaRPr lang="en-US" sz="1800" dirty="0"/>
-                        </a:p>
-                      </a:txBody>
-                      <a:tcPr/>
-                    </a:tc>
-                    <a:extLst>
-                      <a:ext uri="{0D108BD9-81ED-4DB2-BD59-A6C34878D82A}">
-                        <a16:rowId xmlns:a16="http://schemas.microsoft.com/office/drawing/2014/main" val="291366966"/>
-                      </a:ext>
-                    </a:extLst>
-                  </a:tr>
-                  <a:tr h="366831">
-                    <a:tc>
-                      <a:txBody>
-                        <a:bodyPr/>
-                        <a:lstStyle/>
-                        <a:p>
-                          <a:r>
-                            <a:rPr lang="en-US" sz="1800" dirty="0" err="1" smtClean="0"/>
-                            <a:t>yrs.since.phd</a:t>
-                          </a:r>
-                          <a:endParaRPr lang="en-US" sz="1800" dirty="0"/>
-                        </a:p>
-                      </a:txBody>
-                      <a:tcPr/>
-                    </a:tc>
-                    <a:tc>
-                      <a:txBody>
-                        <a:bodyPr/>
-                        <a:lstStyle/>
-                        <a:p>
-                          <a:endParaRPr lang="en-US"/>
-                        </a:p>
-                      </a:txBody>
-                      <a:tcPr>
-                        <a:blipFill>
-                          <a:blip r:embed="rId3"/>
-                          <a:stretch>
-                            <a:fillRect l="-136994" t="-210000" r="-249711" b="-226667"/>
-                          </a:stretch>
-                        </a:blipFill>
-                      </a:tcPr>
-                    </a:tc>
-                    <a:tc>
-                      <a:txBody>
-                        <a:bodyPr/>
-                        <a:lstStyle/>
-                        <a:p>
-                          <a:r>
-                            <a:rPr lang="en-US" sz="1800" dirty="0" smtClean="0"/>
-                            <a:t>1,000</a:t>
-                          </a:r>
-                          <a:endParaRPr lang="en-US" sz="1800" dirty="0"/>
-                        </a:p>
-                      </a:txBody>
-                      <a:tcPr/>
-                    </a:tc>
-                    <a:extLst>
-                      <a:ext uri="{0D108BD9-81ED-4DB2-BD59-A6C34878D82A}">
-                        <a16:rowId xmlns:a16="http://schemas.microsoft.com/office/drawing/2014/main" val="402487520"/>
-                      </a:ext>
-                    </a:extLst>
-                  </a:tr>
-                  <a:tr h="366831">
-                    <a:tc>
-                      <a:txBody>
-                        <a:bodyPr/>
-                        <a:lstStyle/>
-                        <a:p>
-                          <a:r>
-                            <a:rPr lang="en-US" sz="1800" dirty="0" err="1" smtClean="0"/>
-                            <a:t>is.assoc</a:t>
-                          </a:r>
-                          <a:endParaRPr lang="en-US" sz="1800" dirty="0"/>
-                        </a:p>
-                      </a:txBody>
-                      <a:tcPr/>
-                    </a:tc>
-                    <a:tc>
-                      <a:txBody>
-                        <a:bodyPr/>
-                        <a:lstStyle/>
-                        <a:p>
-                          <a:endParaRPr lang="en-US"/>
-                        </a:p>
-                      </a:txBody>
-                      <a:tcPr>
-                        <a:blipFill>
-                          <a:blip r:embed="rId3"/>
-                          <a:stretch>
-                            <a:fillRect l="-136994" t="-304918" r="-249711" b="-122951"/>
-                          </a:stretch>
-                        </a:blipFill>
-                      </a:tcPr>
-                    </a:tc>
-                    <a:tc>
-                      <a:txBody>
-                        <a:bodyPr/>
-                        <a:lstStyle/>
-                        <a:p>
-                          <a:r>
-                            <a:rPr lang="en-US" sz="1800" dirty="0" smtClean="0"/>
-                            <a:t>14,000</a:t>
-                          </a:r>
-                          <a:endParaRPr lang="en-US" sz="1800" dirty="0"/>
-                        </a:p>
-                      </a:txBody>
-                      <a:tcPr/>
-                    </a:tc>
-                    <a:extLst>
-                      <a:ext uri="{0D108BD9-81ED-4DB2-BD59-A6C34878D82A}">
-                        <a16:rowId xmlns:a16="http://schemas.microsoft.com/office/drawing/2014/main" val="678565980"/>
-                      </a:ext>
-                    </a:extLst>
-                  </a:tr>
-                  <a:tr h="366831">
-                    <a:tc>
-                      <a:txBody>
-                        <a:bodyPr/>
-                        <a:lstStyle/>
-                        <a:p>
-                          <a:r>
-                            <a:rPr lang="en-US" sz="1800" dirty="0" err="1" smtClean="0"/>
-                            <a:t>is.fullprof</a:t>
-                          </a:r>
-                          <a:endParaRPr lang="en-US" sz="1800" dirty="0"/>
-                        </a:p>
-                      </a:txBody>
-                      <a:tcPr/>
-                    </a:tc>
-                    <a:tc>
-                      <a:txBody>
-                        <a:bodyPr/>
-                        <a:lstStyle/>
-                        <a:p>
-                          <a:endParaRPr lang="en-US"/>
-                        </a:p>
-                      </a:txBody>
-                      <a:tcPr>
-                        <a:blipFill>
-                          <a:blip r:embed="rId3"/>
-                          <a:stretch>
-                            <a:fillRect l="-136994" t="-411667" r="-249711" b="-25000"/>
-                          </a:stretch>
-                        </a:blipFill>
-                      </a:tcPr>
-                    </a:tc>
-                    <a:tc>
-                      <a:txBody>
-                        <a:bodyPr/>
-                        <a:lstStyle/>
-                        <a:p>
-                          <a:r>
-                            <a:rPr lang="en-US" sz="1800" dirty="0" smtClean="0"/>
-                            <a:t>49,000</a:t>
-                          </a:r>
-                          <a:endParaRPr lang="en-US" sz="1800" dirty="0"/>
-                        </a:p>
-                      </a:txBody>
-                      <a:tcPr/>
-                    </a:tc>
-                    <a:extLst>
-                      <a:ext uri="{0D108BD9-81ED-4DB2-BD59-A6C34878D82A}">
-                        <a16:rowId xmlns:a16="http://schemas.microsoft.com/office/drawing/2014/main" val="1400199756"/>
-                      </a:ext>
-                    </a:extLst>
-                  </a:tr>
-                </a:tbl>
-              </a:graphicData>
-            </a:graphic>
-          </p:graphicFrame>
-        </mc:Fallback>
-      </mc:AlternateContent>
+      <p:pic>
+        <p:nvPicPr>
+          <p:cNvPr id="6" name="Picture 5"/>
+          <p:cNvPicPr>
+            <a:picLocks noChangeAspect="1"/>
+          </p:cNvPicPr>
+          <p:nvPr/>
+        </p:nvPicPr>
+        <p:blipFill>
+          <a:blip r:embed="rId3"/>
+          <a:stretch>
+            <a:fillRect/>
+          </a:stretch>
+        </p:blipFill>
+        <p:spPr>
+          <a:xfrm>
+            <a:off x="650013" y="4729160"/>
+            <a:ext cx="4543425" cy="1685925"/>
+          </a:xfrm>
+          <a:prstGeom prst="rect">
+            <a:avLst/>
+          </a:prstGeom>
+        </p:spPr>
+      </p:pic>
     </p:spTree>
     <p:extLst>
       <p:ext uri="{BB962C8B-B14F-4D97-AF65-F5344CB8AC3E}">
@@ -3917,15 +3201,7 @@
           <a:p>
             <a:r>
               <a:rPr lang="en-US" sz="3600" dirty="0" smtClean="0"/>
-              <a:t>Predicting at 0 </a:t>
-            </a:r>
-            <a:r>
-              <a:rPr lang="en-US" sz="3600" dirty="0" err="1" smtClean="0"/>
-              <a:t>yrs.since.phd</a:t>
-            </a:r>
-            <a:r>
-              <a:rPr lang="en-US" sz="3600" dirty="0" smtClean="0"/>
-              <a:t>: </a:t>
+              <a:t>Predicting at 0 yrs.since.phd: </a:t>
             </a:r>
             <a:r>
               <a:rPr lang="en-US" sz="3600" b="1" dirty="0" smtClean="0"/>
@@ -3965,738 +3241,30 @@
           </a:prstGeom>
         </p:spPr>
       </p:pic>
-      <mc:AlternateContent xmlns:mc="http://schemas.openxmlformats.org/markup-compatibility/2006">
-        <mc:Choice xmlns:a14="http://schemas.microsoft.com/office/drawing/2010/main" Requires="a14">
-          <p:graphicFrame>
-            <p:nvGraphicFramePr>
-              <p:cNvPr id="4" name="Table 3"/>
-              <p:cNvGraphicFramePr>
-                <a:graphicFrameLocks noGrp="1"/>
-              </p:cNvGraphicFramePr>
-              <p:nvPr>
-                <p:extLst>
-                  <p:ext uri="{D42A27DB-BD31-4B8C-83A1-F6EECF244321}">
-                    <p14:modId xmlns:p14="http://schemas.microsoft.com/office/powerpoint/2010/main" val="2269036047"/>
-                  </p:ext>
-                </p:extLst>
-              </p:nvPr>
-            </p:nvGraphicFramePr>
-            <p:xfrm>
-              <a:off x="557844" y="4655045"/>
-              <a:ext cx="5092339" cy="1834155"/>
-            </p:xfrm>
-            <a:graphic>
-              <a:graphicData uri="http://schemas.openxmlformats.org/drawingml/2006/table">
-                <a:tbl>
-                  <a:tblPr firstRow="1" bandRow="1">
-                    <a:tableStyleId>{5C22544A-7EE6-4342-B048-85BDC9FD1C3A}</a:tableStyleId>
-                  </a:tblPr>
-                  <a:tblGrid>
-                    <a:gridCol w="1438503">
-                      <a:extLst>
-                        <a:ext uri="{9D8B030D-6E8A-4147-A177-3AD203B41FA5}">
-                          <a16:colId xmlns:a16="http://schemas.microsoft.com/office/drawing/2014/main" val="3802769981"/>
-                        </a:ext>
-                      </a:extLst>
-                    </a:gridCol>
-                    <a:gridCol w="1053991">
-                      <a:extLst>
-                        <a:ext uri="{9D8B030D-6E8A-4147-A177-3AD203B41FA5}">
-                          <a16:colId xmlns:a16="http://schemas.microsoft.com/office/drawing/2014/main" val="899919064"/>
-                        </a:ext>
-                      </a:extLst>
-                    </a:gridCol>
-                    <a:gridCol w="2599845">
-                      <a:extLst>
-                        <a:ext uri="{9D8B030D-6E8A-4147-A177-3AD203B41FA5}">
-                          <a16:colId xmlns:a16="http://schemas.microsoft.com/office/drawing/2014/main" val="2042402367"/>
-                        </a:ext>
-                      </a:extLst>
-                    </a:gridCol>
-                  </a:tblGrid>
-                  <a:tr h="366831">
-                    <a:tc>
-                      <a:txBody>
-                        <a:bodyPr/>
-                        <a:lstStyle/>
-                        <a:p>
-                          <a:r>
-                            <a:rPr lang="en-US" sz="1800" dirty="0" smtClean="0"/>
-                            <a:t>Covariate</a:t>
-                          </a:r>
-                          <a:endParaRPr lang="en-US" sz="1800" dirty="0"/>
-                        </a:p>
-                      </a:txBody>
-                      <a:tcPr/>
-                    </a:tc>
-                    <a:tc>
-                      <a:txBody>
-                        <a:bodyPr/>
-                        <a:lstStyle/>
-                        <a:p>
-                          <a:r>
-                            <a:rPr lang="en-US" sz="1800" dirty="0" smtClean="0"/>
-                            <a:t>Symbol</a:t>
-                          </a:r>
-                        </a:p>
-                      </a:txBody>
-                      <a:tcPr/>
-                    </a:tc>
-                    <a:tc>
-                      <a:txBody>
-                        <a:bodyPr/>
-                        <a:lstStyle/>
-                        <a:p>
-                          <a:r>
-                            <a:rPr lang="en-US" sz="1800" dirty="0" smtClean="0"/>
-                            <a:t>Coefficient</a:t>
-                          </a:r>
-                          <a:endParaRPr lang="en-US" sz="1800" dirty="0"/>
-                        </a:p>
-                      </a:txBody>
-                      <a:tcPr/>
-                    </a:tc>
-                    <a:extLst>
-                      <a:ext uri="{0D108BD9-81ED-4DB2-BD59-A6C34878D82A}">
-                        <a16:rowId xmlns:a16="http://schemas.microsoft.com/office/drawing/2014/main" val="390419479"/>
-                      </a:ext>
-                    </a:extLst>
-                  </a:tr>
-                  <a:tr h="366831">
-                    <a:tc>
-                      <a:txBody>
-                        <a:bodyPr/>
-                        <a:lstStyle/>
-                        <a:p>
-                          <a:r>
-                            <a:rPr lang="en-US" sz="1800" dirty="0" smtClean="0"/>
-                            <a:t>Intercept</a:t>
-                          </a:r>
-                          <a:endParaRPr lang="en-US" sz="1800" dirty="0"/>
-                        </a:p>
-                      </a:txBody>
-                      <a:tcPr/>
-                    </a:tc>
-                    <a:tc>
-                      <a:txBody>
-                        <a:bodyPr/>
-                        <a:lstStyle/>
-                        <a:p>
-                          <a:pPr/>
-                          <a14:m>
-                            <m:oMathPara xmlns:m="http://schemas.openxmlformats.org/officeDocument/2006/math">
-                              <m:oMathParaPr>
-                                <m:jc m:val="centerGroup"/>
-                              </m:oMathParaPr>
-                              <m:oMath xmlns:m="http://schemas.openxmlformats.org/officeDocument/2006/math">
-                                <m:sSub>
-                                  <m:sSubPr>
-                                    <m:ctrlPr>
-                                      <a:rPr lang="en-US" sz="1800" b="0" i="1" smtClean="0">
-                                        <a:latin typeface="Cambria Math" panose="02040503050406030204" pitchFamily="18" charset="0"/>
-                                      </a:rPr>
-                                    </m:ctrlPr>
-                                  </m:sSubPr>
-                                  <m:e>
-                                    <m:r>
-                                      <a:rPr lang="en-US" sz="1800" b="0" i="1" smtClean="0">
-                                        <a:latin typeface="Cambria Math" panose="02040503050406030204" pitchFamily="18" charset="0"/>
-                                      </a:rPr>
-                                      <m:t>𝛽</m:t>
-                                    </m:r>
-                                  </m:e>
-                                  <m:sub>
-                                    <m:r>
-                                      <a:rPr lang="en-US" sz="1800" b="0" i="1" smtClean="0">
-                                        <a:latin typeface="Cambria Math" panose="02040503050406030204" pitchFamily="18" charset="0"/>
-                                      </a:rPr>
-                                      <m:t>0</m:t>
-                                    </m:r>
-                                  </m:sub>
-                                </m:sSub>
-                              </m:oMath>
-                            </m:oMathPara>
-                          </a14:m>
-                          <a:endParaRPr lang="en-US" sz="1800" dirty="0"/>
-                        </a:p>
-                      </a:txBody>
-                      <a:tcPr/>
-                    </a:tc>
-                    <a:tc>
-                      <a:txBody>
-                        <a:bodyPr/>
-                        <a:lstStyle/>
-                        <a:p>
-                          <a:r>
-                            <a:rPr lang="en-US" sz="1800" dirty="0" smtClean="0"/>
-                            <a:t>81,000</a:t>
-                          </a:r>
-                          <a:endParaRPr lang="en-US" sz="1800" dirty="0"/>
-                        </a:p>
-                      </a:txBody>
-                      <a:tcPr/>
-                    </a:tc>
-                    <a:extLst>
-                      <a:ext uri="{0D108BD9-81ED-4DB2-BD59-A6C34878D82A}">
-                        <a16:rowId xmlns:a16="http://schemas.microsoft.com/office/drawing/2014/main" val="291366966"/>
-                      </a:ext>
-                    </a:extLst>
-                  </a:tr>
-                  <a:tr h="366831">
-                    <a:tc>
-                      <a:txBody>
-                        <a:bodyPr/>
-                        <a:lstStyle/>
-                        <a:p>
-                          <a:r>
-                            <a:rPr lang="en-US" sz="1800" dirty="0" err="1" smtClean="0"/>
-                            <a:t>yrs.since.phd</a:t>
-                          </a:r>
-                          <a:endParaRPr lang="en-US" sz="1800" dirty="0"/>
-                        </a:p>
-                      </a:txBody>
-                      <a:tcPr/>
-                    </a:tc>
-                    <a:tc>
-                      <a:txBody>
-                        <a:bodyPr/>
-                        <a:lstStyle/>
-                        <a:p>
-                          <a:pPr/>
-                          <a14:m>
-                            <m:oMathPara xmlns:m="http://schemas.openxmlformats.org/officeDocument/2006/math">
-                              <m:oMathParaPr>
-                                <m:jc m:val="centerGroup"/>
-                              </m:oMathParaPr>
-                              <m:oMath xmlns:m="http://schemas.openxmlformats.org/officeDocument/2006/math">
-                                <m:sSub>
-                                  <m:sSubPr>
-                                    <m:ctrlPr>
-                                      <a:rPr lang="en-US" sz="1800" b="0" i="1" smtClean="0">
-                                        <a:latin typeface="Cambria Math" panose="02040503050406030204" pitchFamily="18" charset="0"/>
-                                      </a:rPr>
-                                    </m:ctrlPr>
-                                  </m:sSubPr>
-                                  <m:e>
-                                    <m:r>
-                                      <a:rPr lang="en-US" sz="1800" b="0" i="1" smtClean="0">
-                                        <a:latin typeface="Cambria Math" panose="02040503050406030204" pitchFamily="18" charset="0"/>
-                                      </a:rPr>
-                                      <m:t>𝛽</m:t>
-                                    </m:r>
-                                  </m:e>
-                                  <m:sub>
-                                    <m:r>
-                                      <a:rPr lang="en-US" sz="1800" b="0" i="1" smtClean="0">
-                                        <a:latin typeface="Cambria Math" panose="02040503050406030204" pitchFamily="18" charset="0"/>
-                                      </a:rPr>
-                                      <m:t>1</m:t>
-                                    </m:r>
-                                  </m:sub>
-                                </m:sSub>
-                              </m:oMath>
-                            </m:oMathPara>
-                          </a14:m>
-                          <a:endParaRPr lang="en-US" sz="1800" dirty="0"/>
-                        </a:p>
-                      </a:txBody>
-                      <a:tcPr/>
-                    </a:tc>
-                    <a:tc>
-                      <a:txBody>
-                        <a:bodyPr/>
-                        <a:lstStyle/>
-                        <a:p>
-                          <a:r>
-                            <a:rPr lang="en-US" sz="1800" dirty="0" smtClean="0"/>
-                            <a:t>1,000</a:t>
-                          </a:r>
-                          <a:endParaRPr lang="en-US" sz="1800" dirty="0"/>
-                        </a:p>
-                      </a:txBody>
-                      <a:tcPr/>
-                    </a:tc>
-                    <a:extLst>
-                      <a:ext uri="{0D108BD9-81ED-4DB2-BD59-A6C34878D82A}">
-                        <a16:rowId xmlns:a16="http://schemas.microsoft.com/office/drawing/2014/main" val="402487520"/>
-                      </a:ext>
-                    </a:extLst>
-                  </a:tr>
-                  <a:tr h="366831">
-                    <a:tc>
-                      <a:txBody>
-                        <a:bodyPr/>
-                        <a:lstStyle/>
-                        <a:p>
-                          <a:r>
-                            <a:rPr lang="en-US" sz="1800" dirty="0" err="1" smtClean="0"/>
-                            <a:t>is.assoc</a:t>
-                          </a:r>
-                          <a:endParaRPr lang="en-US" sz="1800" dirty="0"/>
-                        </a:p>
-                      </a:txBody>
-                      <a:tcPr/>
-                    </a:tc>
-                    <a:tc>
-                      <a:txBody>
-                        <a:bodyPr/>
-                        <a:lstStyle/>
-                        <a:p>
-                          <a:pPr/>
-                          <a14:m>
-                            <m:oMathPara xmlns:m="http://schemas.openxmlformats.org/officeDocument/2006/math">
-                              <m:oMathParaPr>
-                                <m:jc m:val="centerGroup"/>
-                              </m:oMathParaPr>
-                              <m:oMath xmlns:m="http://schemas.openxmlformats.org/officeDocument/2006/math">
-                                <m:sSub>
-                                  <m:sSubPr>
-                                    <m:ctrlPr>
-                                      <a:rPr lang="en-US" sz="1800" b="0" i="1" smtClean="0">
-                                        <a:latin typeface="Cambria Math" panose="02040503050406030204" pitchFamily="18" charset="0"/>
-                                      </a:rPr>
-                                    </m:ctrlPr>
-                                  </m:sSubPr>
-                                  <m:e>
-                                    <m:r>
-                                      <a:rPr lang="en-US" sz="1800" b="0" i="1" smtClean="0">
-                                        <a:latin typeface="Cambria Math" panose="02040503050406030204" pitchFamily="18" charset="0"/>
-                                      </a:rPr>
-                                      <m:t>𝛽</m:t>
-                                    </m:r>
-                                  </m:e>
-                                  <m:sub>
-                                    <m:r>
-                                      <a:rPr lang="en-US" sz="1800" b="0" i="1" smtClean="0">
-                                        <a:latin typeface="Cambria Math" panose="02040503050406030204" pitchFamily="18" charset="0"/>
-                                      </a:rPr>
-                                      <m:t>2</m:t>
-                                    </m:r>
-                                  </m:sub>
-                                </m:sSub>
-                              </m:oMath>
-                            </m:oMathPara>
-                          </a14:m>
-                          <a:endParaRPr lang="en-US" sz="1800" dirty="0"/>
-                        </a:p>
-                      </a:txBody>
-                      <a:tcPr/>
-                    </a:tc>
-                    <a:tc>
-                      <a:txBody>
-                        <a:bodyPr/>
-                        <a:lstStyle/>
-                        <a:p>
-                          <a:r>
-                            <a:rPr lang="en-US" sz="1800" dirty="0" smtClean="0"/>
-                            <a:t>14,000</a:t>
-                          </a:r>
-                          <a:endParaRPr lang="en-US" sz="1800" dirty="0"/>
-                        </a:p>
-                      </a:txBody>
-                      <a:tcPr/>
-                    </a:tc>
-                    <a:extLst>
-                      <a:ext uri="{0D108BD9-81ED-4DB2-BD59-A6C34878D82A}">
-                        <a16:rowId xmlns:a16="http://schemas.microsoft.com/office/drawing/2014/main" val="678565980"/>
-                      </a:ext>
-                    </a:extLst>
-                  </a:tr>
-                  <a:tr h="366831">
-                    <a:tc>
-                      <a:txBody>
-                        <a:bodyPr/>
-                        <a:lstStyle/>
-                        <a:p>
-                          <a:r>
-                            <a:rPr lang="en-US" sz="1800" dirty="0" err="1" smtClean="0"/>
-                            <a:t>is.fullprof</a:t>
-                          </a:r>
-                          <a:endParaRPr lang="en-US" sz="1800" dirty="0"/>
-                        </a:p>
-                      </a:txBody>
-                      <a:tcPr/>
-                    </a:tc>
-                    <a:tc>
-                      <a:txBody>
-                        <a:bodyPr/>
-                        <a:lstStyle/>
-                        <a:p>
-                          <a:pPr/>
-                          <a14:m>
-                            <m:oMathPara xmlns:m="http://schemas.openxmlformats.org/officeDocument/2006/math">
-                              <m:oMathParaPr>
-                                <m:jc m:val="centerGroup"/>
-                              </m:oMathParaPr>
-                              <m:oMath xmlns:m="http://schemas.openxmlformats.org/officeDocument/2006/math">
-                                <m:sSub>
-                                  <m:sSubPr>
-                                    <m:ctrlPr>
-                                      <a:rPr lang="en-US" sz="1800" b="0" i="1" smtClean="0">
-                                        <a:latin typeface="Cambria Math" panose="02040503050406030204" pitchFamily="18" charset="0"/>
-                                      </a:rPr>
-                                    </m:ctrlPr>
-                                  </m:sSubPr>
-                                  <m:e>
-                                    <m:r>
-                                      <a:rPr lang="en-US" sz="1800" b="0" i="1" smtClean="0">
-                                        <a:latin typeface="Cambria Math" panose="02040503050406030204" pitchFamily="18" charset="0"/>
-                                      </a:rPr>
-                                      <m:t>𝛽</m:t>
-                                    </m:r>
-                                  </m:e>
-                                  <m:sub>
-                                    <m:r>
-                                      <a:rPr lang="en-US" sz="1800" b="0" i="1" smtClean="0">
-                                        <a:latin typeface="Cambria Math" panose="02040503050406030204" pitchFamily="18" charset="0"/>
-                                      </a:rPr>
-                                      <m:t>3</m:t>
-                                    </m:r>
-                                  </m:sub>
-                                </m:sSub>
-                              </m:oMath>
-                            </m:oMathPara>
-                          </a14:m>
-                          <a:endParaRPr lang="en-US" sz="1800" dirty="0"/>
-                        </a:p>
-                      </a:txBody>
-                      <a:tcPr/>
-                    </a:tc>
-                    <a:tc>
-                      <a:txBody>
-                        <a:bodyPr/>
-                        <a:lstStyle/>
-                        <a:p>
-                          <a:r>
-                            <a:rPr lang="en-US" sz="1800" dirty="0" smtClean="0"/>
-                            <a:t>49,000</a:t>
-                          </a:r>
-                          <a:endParaRPr lang="en-US" sz="1800" dirty="0"/>
-                        </a:p>
-                      </a:txBody>
-                      <a:tcPr/>
-                    </a:tc>
-                    <a:extLst>
-                      <a:ext uri="{0D108BD9-81ED-4DB2-BD59-A6C34878D82A}">
-                        <a16:rowId xmlns:a16="http://schemas.microsoft.com/office/drawing/2014/main" val="1400199756"/>
-                      </a:ext>
-                    </a:extLst>
-                  </a:tr>
-                </a:tbl>
-              </a:graphicData>
-            </a:graphic>
-          </p:graphicFrame>
-        </mc:Choice>
-        <mc:Fallback>
-          <p:graphicFrame>
-            <p:nvGraphicFramePr>
-              <p:cNvPr id="4" name="Table 3"/>
-              <p:cNvGraphicFramePr>
-                <a:graphicFrameLocks noGrp="1"/>
-              </p:cNvGraphicFramePr>
-              <p:nvPr>
-                <p:extLst>
-                  <p:ext uri="{D42A27DB-BD31-4B8C-83A1-F6EECF244321}">
-                    <p14:modId xmlns:p14="http://schemas.microsoft.com/office/powerpoint/2010/main" val="2269036047"/>
-                  </p:ext>
-                </p:extLst>
-              </p:nvPr>
-            </p:nvGraphicFramePr>
-            <p:xfrm>
-              <a:off x="557844" y="4655045"/>
-              <a:ext cx="5092339" cy="1834155"/>
-            </p:xfrm>
-            <a:graphic>
-              <a:graphicData uri="http://schemas.openxmlformats.org/drawingml/2006/table">
-                <a:tbl>
-                  <a:tblPr firstRow="1" bandRow="1">
-                    <a:tableStyleId>{5C22544A-7EE6-4342-B048-85BDC9FD1C3A}</a:tableStyleId>
-                  </a:tblPr>
-                  <a:tblGrid>
-                    <a:gridCol w="1438503">
-                      <a:extLst>
-                        <a:ext uri="{9D8B030D-6E8A-4147-A177-3AD203B41FA5}">
-                          <a16:colId xmlns:a16="http://schemas.microsoft.com/office/drawing/2014/main" val="3802769981"/>
-                        </a:ext>
-                      </a:extLst>
-                    </a:gridCol>
-                    <a:gridCol w="1053991">
-                      <a:extLst>
-                        <a:ext uri="{9D8B030D-6E8A-4147-A177-3AD203B41FA5}">
-                          <a16:colId xmlns:a16="http://schemas.microsoft.com/office/drawing/2014/main" val="899919064"/>
-                        </a:ext>
-                      </a:extLst>
-                    </a:gridCol>
-                    <a:gridCol w="2599845">
-                      <a:extLst>
-                        <a:ext uri="{9D8B030D-6E8A-4147-A177-3AD203B41FA5}">
-                          <a16:colId xmlns:a16="http://schemas.microsoft.com/office/drawing/2014/main" val="2042402367"/>
-                        </a:ext>
-                      </a:extLst>
-                    </a:gridCol>
-                  </a:tblGrid>
-                  <a:tr h="366831">
-                    <a:tc>
-                      <a:txBody>
-                        <a:bodyPr/>
-                        <a:lstStyle/>
-                        <a:p>
-                          <a:r>
-                            <a:rPr lang="en-US" sz="1800" dirty="0" smtClean="0"/>
-                            <a:t>Covariate</a:t>
-                          </a:r>
-                          <a:endParaRPr lang="en-US" sz="1800" dirty="0"/>
-                        </a:p>
-                      </a:txBody>
-                      <a:tcPr/>
-                    </a:tc>
-                    <a:tc>
-                      <a:txBody>
-                        <a:bodyPr/>
-                        <a:lstStyle/>
-                        <a:p>
-                          <a:r>
-                            <a:rPr lang="en-US" sz="1800" dirty="0" smtClean="0"/>
-                            <a:t>Symbol</a:t>
-                          </a:r>
-                        </a:p>
-                      </a:txBody>
-                      <a:tcPr/>
-                    </a:tc>
-                    <a:tc>
-                      <a:txBody>
-                        <a:bodyPr/>
-                        <a:lstStyle/>
-                        <a:p>
-                          <a:r>
-                            <a:rPr lang="en-US" sz="1800" dirty="0" smtClean="0"/>
-                            <a:t>Coefficient</a:t>
-                          </a:r>
-                          <a:endParaRPr lang="en-US" sz="1800" dirty="0"/>
-                        </a:p>
-                      </a:txBody>
-                      <a:tcPr/>
-                    </a:tc>
-                    <a:extLst>
-                      <a:ext uri="{0D108BD9-81ED-4DB2-BD59-A6C34878D82A}">
-                        <a16:rowId xmlns:a16="http://schemas.microsoft.com/office/drawing/2014/main" val="390419479"/>
-                      </a:ext>
-                    </a:extLst>
-                  </a:tr>
-                  <a:tr h="366831">
-                    <a:tc>
-                      <a:txBody>
-                        <a:bodyPr/>
-                        <a:lstStyle/>
-                        <a:p>
-                          <a:r>
-                            <a:rPr lang="en-US" sz="1800" dirty="0" smtClean="0"/>
-                            <a:t>Intercept</a:t>
-                          </a:r>
-                          <a:endParaRPr lang="en-US" sz="1800" dirty="0"/>
-                        </a:p>
-                      </a:txBody>
-                      <a:tcPr/>
-                    </a:tc>
-                    <a:tc>
-                      <a:txBody>
-                        <a:bodyPr/>
-                        <a:lstStyle/>
-                        <a:p>
-                          <a:endParaRPr lang="en-US"/>
-                        </a:p>
-                      </a:txBody>
-                      <a:tcPr>
-                        <a:blipFill>
-                          <a:blip r:embed="rId3"/>
-                          <a:stretch>
-                            <a:fillRect l="-136994" t="-106557" r="-249711" b="-321311"/>
-                          </a:stretch>
-                        </a:blipFill>
-                      </a:tcPr>
-                    </a:tc>
-                    <a:tc>
-                      <a:txBody>
-                        <a:bodyPr/>
-                        <a:lstStyle/>
-                        <a:p>
-                          <a:r>
-                            <a:rPr lang="en-US" sz="1800" dirty="0" smtClean="0"/>
-                            <a:t>81,000</a:t>
-                          </a:r>
-                          <a:endParaRPr lang="en-US" sz="1800" dirty="0"/>
-                        </a:p>
-                      </a:txBody>
-                      <a:tcPr/>
-                    </a:tc>
-                    <a:extLst>
-                      <a:ext uri="{0D108BD9-81ED-4DB2-BD59-A6C34878D82A}">
-                        <a16:rowId xmlns:a16="http://schemas.microsoft.com/office/drawing/2014/main" val="291366966"/>
-                      </a:ext>
-                    </a:extLst>
-                  </a:tr>
-                  <a:tr h="366831">
-                    <a:tc>
-                      <a:txBody>
-                        <a:bodyPr/>
-                        <a:lstStyle/>
-                        <a:p>
-                          <a:r>
-                            <a:rPr lang="en-US" sz="1800" dirty="0" err="1" smtClean="0"/>
-                            <a:t>yrs.since.phd</a:t>
-                          </a:r>
-                          <a:endParaRPr lang="en-US" sz="1800" dirty="0"/>
-                        </a:p>
-                      </a:txBody>
-                      <a:tcPr/>
-                    </a:tc>
-                    <a:tc>
-                      <a:txBody>
-                        <a:bodyPr/>
-                        <a:lstStyle/>
-                        <a:p>
-                          <a:endParaRPr lang="en-US"/>
-                        </a:p>
-                      </a:txBody>
-                      <a:tcPr>
-                        <a:blipFill>
-                          <a:blip r:embed="rId3"/>
-                          <a:stretch>
-                            <a:fillRect l="-136994" t="-210000" r="-249711" b="-226667"/>
-                          </a:stretch>
-                        </a:blipFill>
-                      </a:tcPr>
-                    </a:tc>
-                    <a:tc>
-                      <a:txBody>
-                        <a:bodyPr/>
-                        <a:lstStyle/>
-                        <a:p>
-                          <a:r>
-                            <a:rPr lang="en-US" sz="1800" dirty="0" smtClean="0"/>
-                            <a:t>1,000</a:t>
-                          </a:r>
-                          <a:endParaRPr lang="en-US" sz="1800" dirty="0"/>
-                        </a:p>
-                      </a:txBody>
-                      <a:tcPr/>
-                    </a:tc>
-                    <a:extLst>
-                      <a:ext uri="{0D108BD9-81ED-4DB2-BD59-A6C34878D82A}">
-                        <a16:rowId xmlns:a16="http://schemas.microsoft.com/office/drawing/2014/main" val="402487520"/>
-                      </a:ext>
-                    </a:extLst>
-                  </a:tr>
-                  <a:tr h="366831">
-                    <a:tc>
-                      <a:txBody>
-                        <a:bodyPr/>
-                        <a:lstStyle/>
-                        <a:p>
-                          <a:r>
-                            <a:rPr lang="en-US" sz="1800" dirty="0" err="1" smtClean="0"/>
-                            <a:t>is.assoc</a:t>
-                          </a:r>
-                          <a:endParaRPr lang="en-US" sz="1800" dirty="0"/>
-                        </a:p>
-                      </a:txBody>
-                      <a:tcPr/>
-                    </a:tc>
-                    <a:tc>
-                      <a:txBody>
-                        <a:bodyPr/>
-                        <a:lstStyle/>
-                        <a:p>
-                          <a:endParaRPr lang="en-US"/>
-                        </a:p>
-                      </a:txBody>
-                      <a:tcPr>
-                        <a:blipFill>
-                          <a:blip r:embed="rId3"/>
-                          <a:stretch>
-                            <a:fillRect l="-136994" t="-304918" r="-249711" b="-122951"/>
-                          </a:stretch>
-                        </a:blipFill>
-                      </a:tcPr>
-                    </a:tc>
-                    <a:tc>
-                      <a:txBody>
-                        <a:bodyPr/>
-                        <a:lstStyle/>
-                        <a:p>
-                          <a:r>
-                            <a:rPr lang="en-US" sz="1800" dirty="0" smtClean="0"/>
-                            <a:t>14,000</a:t>
-                          </a:r>
-                          <a:endParaRPr lang="en-US" sz="1800" dirty="0"/>
-                        </a:p>
-                      </a:txBody>
-                      <a:tcPr/>
-                    </a:tc>
-                    <a:extLst>
-                      <a:ext uri="{0D108BD9-81ED-4DB2-BD59-A6C34878D82A}">
-                        <a16:rowId xmlns:a16="http://schemas.microsoft.com/office/drawing/2014/main" val="678565980"/>
-                      </a:ext>
-                    </a:extLst>
-                  </a:tr>
-                  <a:tr h="366831">
-                    <a:tc>
-                      <a:txBody>
-                        <a:bodyPr/>
-                        <a:lstStyle/>
-                        <a:p>
-                          <a:r>
-                            <a:rPr lang="en-US" sz="1800" dirty="0" err="1" smtClean="0"/>
-                            <a:t>is.fullprof</a:t>
-                          </a:r>
-                          <a:endParaRPr lang="en-US" sz="1800" dirty="0"/>
-                        </a:p>
-                      </a:txBody>
-                      <a:tcPr/>
-                    </a:tc>
-                    <a:tc>
-                      <a:txBody>
-                        <a:bodyPr/>
-                        <a:lstStyle/>
-                        <a:p>
-                          <a:endParaRPr lang="en-US"/>
-                        </a:p>
-                      </a:txBody>
-                      <a:tcPr>
-                        <a:blipFill>
-                          <a:blip r:embed="rId3"/>
-                          <a:stretch>
-                            <a:fillRect l="-136994" t="-411667" r="-249711" b="-25000"/>
-                          </a:stretch>
-                        </a:blipFill>
-                      </a:tcPr>
-                    </a:tc>
-                    <a:tc>
-                      <a:txBody>
-                        <a:bodyPr/>
-                        <a:lstStyle/>
-                        <a:p>
-                          <a:r>
-                            <a:rPr lang="en-US" sz="1800" dirty="0" smtClean="0"/>
-                            <a:t>49,000</a:t>
-                          </a:r>
-                          <a:endParaRPr lang="en-US" sz="1800" dirty="0"/>
-                        </a:p>
-                      </a:txBody>
-                      <a:tcPr/>
-                    </a:tc>
-                    <a:extLst>
-                      <a:ext uri="{0D108BD9-81ED-4DB2-BD59-A6C34878D82A}">
-                        <a16:rowId xmlns:a16="http://schemas.microsoft.com/office/drawing/2014/main" val="1400199756"/>
-                      </a:ext>
-                    </a:extLst>
-                  </a:tr>
-                </a:tbl>
-              </a:graphicData>
-            </a:graphic>
-          </p:graphicFrame>
-        </mc:Fallback>
-      </mc:AlternateContent>
+      <p:pic>
+        <p:nvPicPr>
+          <p:cNvPr id="6" name="Picture 5"/>
+          <p:cNvPicPr>
+            <a:picLocks noChangeAspect="1"/>
+          </p:cNvPicPr>
+          <p:nvPr/>
+        </p:nvPicPr>
+        <p:blipFill>
+          <a:blip r:embed="rId3"/>
+          <a:stretch>
+            <a:fillRect/>
+          </a:stretch>
+        </p:blipFill>
+        <p:spPr>
+          <a:xfrm>
+            <a:off x="650013" y="4729160"/>
+            <a:ext cx="4543425" cy="1685925"/>
+          </a:xfrm>
+          <a:prstGeom prst="rect">
+            <a:avLst/>
+          </a:prstGeom>
+        </p:spPr>
+      </p:pic>
     </p:spTree>
     <p:extLst>
       <p:ext uri="{BB962C8B-B14F-4D97-AF65-F5344CB8AC3E}">
@@ -4758,15 +3326,7 @@
           <a:p>
             <a:r>
               <a:rPr lang="en-US" sz="3600" dirty="0" smtClean="0"/>
-              <a:t>Predicting at 0 </a:t>
-            </a:r>
-            <a:r>
-              <a:rPr lang="en-US" sz="3600" dirty="0" err="1" smtClean="0"/>
-              <a:t>yrs.since.phd</a:t>
-            </a:r>
-            <a:r>
-              <a:rPr lang="en-US" sz="3600" dirty="0" smtClean="0"/>
-              <a:t>: </a:t>
+              <a:t>Predicting at 0 yrs.since.phd: </a:t>
             </a:r>
             <a:r>
               <a:rPr lang="en-US" sz="3600" b="1" dirty="0" smtClean="0"/>
@@ -4806,738 +3366,30 @@
           </a:prstGeom>
         </p:spPr>
       </p:pic>
-      <mc:AlternateContent xmlns:mc="http://schemas.openxmlformats.org/markup-compatibility/2006">
-        <mc:Choice xmlns:a14="http://schemas.microsoft.com/office/drawing/2010/main" Requires="a14">
-          <p:graphicFrame>
-            <p:nvGraphicFramePr>
-              <p:cNvPr id="4" name="Table 3"/>
-              <p:cNvGraphicFramePr>
-                <a:graphicFrameLocks noGrp="1"/>
-              </p:cNvGraphicFramePr>
-              <p:nvPr>
-                <p:extLst>
-                  <p:ext uri="{D42A27DB-BD31-4B8C-83A1-F6EECF244321}">
-                    <p14:modId xmlns:p14="http://schemas.microsoft.com/office/powerpoint/2010/main" val="2269036047"/>
-                  </p:ext>
-                </p:extLst>
-              </p:nvPr>
-            </p:nvGraphicFramePr>
-            <p:xfrm>
-              <a:off x="557844" y="4655045"/>
-              <a:ext cx="5092339" cy="1834155"/>
-            </p:xfrm>
-            <a:graphic>
-              <a:graphicData uri="http://schemas.openxmlformats.org/drawingml/2006/table">
-                <a:tbl>
-                  <a:tblPr firstRow="1" bandRow="1">
-                    <a:tableStyleId>{5C22544A-7EE6-4342-B048-85BDC9FD1C3A}</a:tableStyleId>
-                  </a:tblPr>
-                  <a:tblGrid>
-                    <a:gridCol w="1438503">
-                      <a:extLst>
-                        <a:ext uri="{9D8B030D-6E8A-4147-A177-3AD203B41FA5}">
-                          <a16:colId xmlns:a16="http://schemas.microsoft.com/office/drawing/2014/main" val="3802769981"/>
-                        </a:ext>
-                      </a:extLst>
-                    </a:gridCol>
-                    <a:gridCol w="1053991">
-                      <a:extLst>
-                        <a:ext uri="{9D8B030D-6E8A-4147-A177-3AD203B41FA5}">
-                          <a16:colId xmlns:a16="http://schemas.microsoft.com/office/drawing/2014/main" val="899919064"/>
-                        </a:ext>
-                      </a:extLst>
-                    </a:gridCol>
-                    <a:gridCol w="2599845">
-                      <a:extLst>
-                        <a:ext uri="{9D8B030D-6E8A-4147-A177-3AD203B41FA5}">
-                          <a16:colId xmlns:a16="http://schemas.microsoft.com/office/drawing/2014/main" val="2042402367"/>
-                        </a:ext>
-                      </a:extLst>
-                    </a:gridCol>
-                  </a:tblGrid>
-                  <a:tr h="366831">
-                    <a:tc>
-                      <a:txBody>
-                        <a:bodyPr/>
-                        <a:lstStyle/>
-                        <a:p>
-                          <a:r>
-                            <a:rPr lang="en-US" sz="1800" dirty="0" smtClean="0"/>
-                            <a:t>Covariate</a:t>
-                          </a:r>
-                          <a:endParaRPr lang="en-US" sz="1800" dirty="0"/>
-                        </a:p>
-                      </a:txBody>
-                      <a:tcPr/>
-                    </a:tc>
-                    <a:tc>
-                      <a:txBody>
-                        <a:bodyPr/>
-                        <a:lstStyle/>
-                        <a:p>
-                          <a:r>
-                            <a:rPr lang="en-US" sz="1800" dirty="0" smtClean="0"/>
-                            <a:t>Symbol</a:t>
-                          </a:r>
-                        </a:p>
-                      </a:txBody>
-                      <a:tcPr/>
-                    </a:tc>
-                    <a:tc>
-                      <a:txBody>
-                        <a:bodyPr/>
-                        <a:lstStyle/>
-                        <a:p>
-                          <a:r>
-                            <a:rPr lang="en-US" sz="1800" dirty="0" smtClean="0"/>
-                            <a:t>Coefficient</a:t>
-                          </a:r>
-                          <a:endParaRPr lang="en-US" sz="1800" dirty="0"/>
-                        </a:p>
-                      </a:txBody>
-                      <a:tcPr/>
-                    </a:tc>
-                    <a:extLst>
-                      <a:ext uri="{0D108BD9-81ED-4DB2-BD59-A6C34878D82A}">
-                        <a16:rowId xmlns:a16="http://schemas.microsoft.com/office/drawing/2014/main" val="390419479"/>
-                      </a:ext>
-                    </a:extLst>
-                  </a:tr>
-                  <a:tr h="366831">
-                    <a:tc>
-                      <a:txBody>
-                        <a:bodyPr/>
-                        <a:lstStyle/>
-                        <a:p>
-                          <a:r>
-                            <a:rPr lang="en-US" sz="1800" dirty="0" smtClean="0"/>
-                            <a:t>Intercept</a:t>
-                          </a:r>
-                          <a:endParaRPr lang="en-US" sz="1800" dirty="0"/>
-                        </a:p>
-                      </a:txBody>
-                      <a:tcPr/>
-                    </a:tc>
-                    <a:tc>
-                      <a:txBody>
-                        <a:bodyPr/>
-                        <a:lstStyle/>
-                        <a:p>
-                          <a:pPr/>
-                          <a14:m>
-                            <m:oMathPara xmlns:m="http://schemas.openxmlformats.org/officeDocument/2006/math">
-                              <m:oMathParaPr>
-                                <m:jc m:val="centerGroup"/>
-                              </m:oMathParaPr>
-                              <m:oMath xmlns:m="http://schemas.openxmlformats.org/officeDocument/2006/math">
-                                <m:sSub>
-                                  <m:sSubPr>
-                                    <m:ctrlPr>
-                                      <a:rPr lang="en-US" sz="1800" b="0" i="1" smtClean="0">
-                                        <a:latin typeface="Cambria Math" panose="02040503050406030204" pitchFamily="18" charset="0"/>
-                                      </a:rPr>
-                                    </m:ctrlPr>
-                                  </m:sSubPr>
-                                  <m:e>
-                                    <m:r>
-                                      <a:rPr lang="en-US" sz="1800" b="0" i="1" smtClean="0">
-                                        <a:latin typeface="Cambria Math" panose="02040503050406030204" pitchFamily="18" charset="0"/>
-                                      </a:rPr>
-                                      <m:t>𝛽</m:t>
-                                    </m:r>
-                                  </m:e>
-                                  <m:sub>
-                                    <m:r>
-                                      <a:rPr lang="en-US" sz="1800" b="0" i="1" smtClean="0">
-                                        <a:latin typeface="Cambria Math" panose="02040503050406030204" pitchFamily="18" charset="0"/>
-                                      </a:rPr>
-                                      <m:t>0</m:t>
-                                    </m:r>
-                                  </m:sub>
-                                </m:sSub>
-                              </m:oMath>
-                            </m:oMathPara>
-                          </a14:m>
-                          <a:endParaRPr lang="en-US" sz="1800" dirty="0"/>
-                        </a:p>
-                      </a:txBody>
-                      <a:tcPr/>
-                    </a:tc>
-                    <a:tc>
-                      <a:txBody>
-                        <a:bodyPr/>
-                        <a:lstStyle/>
-                        <a:p>
-                          <a:r>
-                            <a:rPr lang="en-US" sz="1800" dirty="0" smtClean="0"/>
-                            <a:t>81,000</a:t>
-                          </a:r>
-                          <a:endParaRPr lang="en-US" sz="1800" dirty="0"/>
-                        </a:p>
-                      </a:txBody>
-                      <a:tcPr/>
-                    </a:tc>
-                    <a:extLst>
-                      <a:ext uri="{0D108BD9-81ED-4DB2-BD59-A6C34878D82A}">
-                        <a16:rowId xmlns:a16="http://schemas.microsoft.com/office/drawing/2014/main" val="291366966"/>
-                      </a:ext>
-                    </a:extLst>
-                  </a:tr>
-                  <a:tr h="366831">
-                    <a:tc>
-                      <a:txBody>
-                        <a:bodyPr/>
-                        <a:lstStyle/>
-                        <a:p>
-                          <a:r>
-                            <a:rPr lang="en-US" sz="1800" dirty="0" err="1" smtClean="0"/>
-                            <a:t>yrs.since.phd</a:t>
-                          </a:r>
-                          <a:endParaRPr lang="en-US" sz="1800" dirty="0"/>
-                        </a:p>
-                      </a:txBody>
-                      <a:tcPr/>
-                    </a:tc>
-                    <a:tc>
-                      <a:txBody>
-                        <a:bodyPr/>
-                        <a:lstStyle/>
-                        <a:p>
-                          <a:pPr/>
-                          <a14:m>
-                            <m:oMathPara xmlns:m="http://schemas.openxmlformats.org/officeDocument/2006/math">
-                              <m:oMathParaPr>
-                                <m:jc m:val="centerGroup"/>
-                              </m:oMathParaPr>
-                              <m:oMath xmlns:m="http://schemas.openxmlformats.org/officeDocument/2006/math">
-                                <m:sSub>
-                                  <m:sSubPr>
-                                    <m:ctrlPr>
-                                      <a:rPr lang="en-US" sz="1800" b="0" i="1" smtClean="0">
-                                        <a:latin typeface="Cambria Math" panose="02040503050406030204" pitchFamily="18" charset="0"/>
-                                      </a:rPr>
-                                    </m:ctrlPr>
-                                  </m:sSubPr>
-                                  <m:e>
-                                    <m:r>
-                                      <a:rPr lang="en-US" sz="1800" b="0" i="1" smtClean="0">
-                                        <a:latin typeface="Cambria Math" panose="02040503050406030204" pitchFamily="18" charset="0"/>
-                                      </a:rPr>
-                                      <m:t>𝛽</m:t>
-                                    </m:r>
-                                  </m:e>
-                                  <m:sub>
-                                    <m:r>
-                                      <a:rPr lang="en-US" sz="1800" b="0" i="1" smtClean="0">
-                                        <a:latin typeface="Cambria Math" panose="02040503050406030204" pitchFamily="18" charset="0"/>
-                                      </a:rPr>
-                                      <m:t>1</m:t>
-                                    </m:r>
-                                  </m:sub>
-                                </m:sSub>
-                              </m:oMath>
-                            </m:oMathPara>
-                          </a14:m>
-                          <a:endParaRPr lang="en-US" sz="1800" dirty="0"/>
-                        </a:p>
-                      </a:txBody>
-                      <a:tcPr/>
-                    </a:tc>
-                    <a:tc>
-                      <a:txBody>
-                        <a:bodyPr/>
-                        <a:lstStyle/>
-                        <a:p>
-                          <a:r>
-                            <a:rPr lang="en-US" sz="1800" dirty="0" smtClean="0"/>
-                            <a:t>1,000</a:t>
-                          </a:r>
-                          <a:endParaRPr lang="en-US" sz="1800" dirty="0"/>
-                        </a:p>
-                      </a:txBody>
-                      <a:tcPr/>
-                    </a:tc>
-                    <a:extLst>
-                      <a:ext uri="{0D108BD9-81ED-4DB2-BD59-A6C34878D82A}">
-                        <a16:rowId xmlns:a16="http://schemas.microsoft.com/office/drawing/2014/main" val="402487520"/>
-                      </a:ext>
-                    </a:extLst>
-                  </a:tr>
-                  <a:tr h="366831">
-                    <a:tc>
-                      <a:txBody>
-                        <a:bodyPr/>
-                        <a:lstStyle/>
-                        <a:p>
-                          <a:r>
-                            <a:rPr lang="en-US" sz="1800" dirty="0" err="1" smtClean="0"/>
-                            <a:t>is.assoc</a:t>
-                          </a:r>
-                          <a:endParaRPr lang="en-US" sz="1800" dirty="0"/>
-                        </a:p>
-                      </a:txBody>
-                      <a:tcPr/>
-                    </a:tc>
-                    <a:tc>
-                      <a:txBody>
-                        <a:bodyPr/>
-                        <a:lstStyle/>
-                        <a:p>
-                          <a:pPr/>
-                          <a14:m>
-                            <m:oMathPara xmlns:m="http://schemas.openxmlformats.org/officeDocument/2006/math">
-                              <m:oMathParaPr>
-                                <m:jc m:val="centerGroup"/>
-                              </m:oMathParaPr>
-                              <m:oMath xmlns:m="http://schemas.openxmlformats.org/officeDocument/2006/math">
-                                <m:sSub>
-                                  <m:sSubPr>
-                                    <m:ctrlPr>
-                                      <a:rPr lang="en-US" sz="1800" b="0" i="1" smtClean="0">
-                                        <a:latin typeface="Cambria Math" panose="02040503050406030204" pitchFamily="18" charset="0"/>
-                                      </a:rPr>
-                                    </m:ctrlPr>
-                                  </m:sSubPr>
-                                  <m:e>
-                                    <m:r>
-                                      <a:rPr lang="en-US" sz="1800" b="0" i="1" smtClean="0">
-                                        <a:latin typeface="Cambria Math" panose="02040503050406030204" pitchFamily="18" charset="0"/>
-                                      </a:rPr>
-                                      <m:t>𝛽</m:t>
-                                    </m:r>
-                                  </m:e>
-                                  <m:sub>
-                                    <m:r>
-                                      <a:rPr lang="en-US" sz="1800" b="0" i="1" smtClean="0">
-                                        <a:latin typeface="Cambria Math" panose="02040503050406030204" pitchFamily="18" charset="0"/>
-                                      </a:rPr>
-                                      <m:t>2</m:t>
-                                    </m:r>
-                                  </m:sub>
-                                </m:sSub>
-                              </m:oMath>
-                            </m:oMathPara>
-                          </a14:m>
-                          <a:endParaRPr lang="en-US" sz="1800" dirty="0"/>
-                        </a:p>
-                      </a:txBody>
-                      <a:tcPr/>
-                    </a:tc>
-                    <a:tc>
-                      <a:txBody>
-                        <a:bodyPr/>
-                        <a:lstStyle/>
-                        <a:p>
-                          <a:r>
-                            <a:rPr lang="en-US" sz="1800" dirty="0" smtClean="0"/>
-                            <a:t>14,000</a:t>
-                          </a:r>
-                          <a:endParaRPr lang="en-US" sz="1800" dirty="0"/>
-                        </a:p>
-                      </a:txBody>
-                      <a:tcPr/>
-                    </a:tc>
-                    <a:extLst>
-                      <a:ext uri="{0D108BD9-81ED-4DB2-BD59-A6C34878D82A}">
-                        <a16:rowId xmlns:a16="http://schemas.microsoft.com/office/drawing/2014/main" val="678565980"/>
-                      </a:ext>
-                    </a:extLst>
-                  </a:tr>
-                  <a:tr h="366831">
-                    <a:tc>
-                      <a:txBody>
-                        <a:bodyPr/>
-                        <a:lstStyle/>
-                        <a:p>
-                          <a:r>
-                            <a:rPr lang="en-US" sz="1800" dirty="0" err="1" smtClean="0"/>
-                            <a:t>is.fullprof</a:t>
-                          </a:r>
-                          <a:endParaRPr lang="en-US" sz="1800" dirty="0"/>
-                        </a:p>
-                      </a:txBody>
-                      <a:tcPr/>
-                    </a:tc>
-                    <a:tc>
-                      <a:txBody>
-                        <a:bodyPr/>
-                        <a:lstStyle/>
-                        <a:p>
-                          <a:pPr/>
-                          <a14:m>
-                            <m:oMathPara xmlns:m="http://schemas.openxmlformats.org/officeDocument/2006/math">
-                              <m:oMathParaPr>
-                                <m:jc m:val="centerGroup"/>
-                              </m:oMathParaPr>
-                              <m:oMath xmlns:m="http://schemas.openxmlformats.org/officeDocument/2006/math">
-                                <m:sSub>
-                                  <m:sSubPr>
-                                    <m:ctrlPr>
-                                      <a:rPr lang="en-US" sz="1800" b="0" i="1" smtClean="0">
-                                        <a:latin typeface="Cambria Math" panose="02040503050406030204" pitchFamily="18" charset="0"/>
-                                      </a:rPr>
-                                    </m:ctrlPr>
-                                  </m:sSubPr>
-                                  <m:e>
-                                    <m:r>
-                                      <a:rPr lang="en-US" sz="1800" b="0" i="1" smtClean="0">
-                                        <a:latin typeface="Cambria Math" panose="02040503050406030204" pitchFamily="18" charset="0"/>
-                                      </a:rPr>
-                                      <m:t>𝛽</m:t>
-                                    </m:r>
-                                  </m:e>
-                                  <m:sub>
-                                    <m:r>
-                                      <a:rPr lang="en-US" sz="1800" b="0" i="1" smtClean="0">
-                                        <a:latin typeface="Cambria Math" panose="02040503050406030204" pitchFamily="18" charset="0"/>
-                                      </a:rPr>
-                                      <m:t>3</m:t>
-                                    </m:r>
-                                  </m:sub>
-                                </m:sSub>
-                              </m:oMath>
-                            </m:oMathPara>
-                          </a14:m>
-                          <a:endParaRPr lang="en-US" sz="1800" dirty="0"/>
-                        </a:p>
-                      </a:txBody>
-                      <a:tcPr/>
-                    </a:tc>
-                    <a:tc>
-                      <a:txBody>
-                        <a:bodyPr/>
-                        <a:lstStyle/>
-                        <a:p>
-                          <a:r>
-                            <a:rPr lang="en-US" sz="1800" dirty="0" smtClean="0"/>
-                            <a:t>49,000</a:t>
-                          </a:r>
-                          <a:endParaRPr lang="en-US" sz="1800" dirty="0"/>
-                        </a:p>
-                      </a:txBody>
-                      <a:tcPr/>
-                    </a:tc>
-                    <a:extLst>
-                      <a:ext uri="{0D108BD9-81ED-4DB2-BD59-A6C34878D82A}">
-                        <a16:rowId xmlns:a16="http://schemas.microsoft.com/office/drawing/2014/main" val="1400199756"/>
-                      </a:ext>
-                    </a:extLst>
-                  </a:tr>
-                </a:tbl>
-              </a:graphicData>
-            </a:graphic>
-          </p:graphicFrame>
-        </mc:Choice>
-        <mc:Fallback>
-          <p:graphicFrame>
-            <p:nvGraphicFramePr>
-              <p:cNvPr id="4" name="Table 3"/>
-              <p:cNvGraphicFramePr>
-                <a:graphicFrameLocks noGrp="1"/>
-              </p:cNvGraphicFramePr>
-              <p:nvPr>
-                <p:extLst>
-                  <p:ext uri="{D42A27DB-BD31-4B8C-83A1-F6EECF244321}">
-                    <p14:modId xmlns:p14="http://schemas.microsoft.com/office/powerpoint/2010/main" val="2269036047"/>
-                  </p:ext>
-                </p:extLst>
-              </p:nvPr>
-            </p:nvGraphicFramePr>
-            <p:xfrm>
-              <a:off x="557844" y="4655045"/>
-              <a:ext cx="5092339" cy="1834155"/>
-            </p:xfrm>
-            <a:graphic>
-              <a:graphicData uri="http://schemas.openxmlformats.org/drawingml/2006/table">
-                <a:tbl>
-                  <a:tblPr firstRow="1" bandRow="1">
-                    <a:tableStyleId>{5C22544A-7EE6-4342-B048-85BDC9FD1C3A}</a:tableStyleId>
-                  </a:tblPr>
-                  <a:tblGrid>
-                    <a:gridCol w="1438503">
-                      <a:extLst>
-                        <a:ext uri="{9D8B030D-6E8A-4147-A177-3AD203B41FA5}">
-                          <a16:colId xmlns:a16="http://schemas.microsoft.com/office/drawing/2014/main" val="3802769981"/>
-                        </a:ext>
-                      </a:extLst>
-                    </a:gridCol>
-                    <a:gridCol w="1053991">
-                      <a:extLst>
-                        <a:ext uri="{9D8B030D-6E8A-4147-A177-3AD203B41FA5}">
-                          <a16:colId xmlns:a16="http://schemas.microsoft.com/office/drawing/2014/main" val="899919064"/>
-                        </a:ext>
-                      </a:extLst>
-                    </a:gridCol>
-                    <a:gridCol w="2599845">
-                      <a:extLst>
-                        <a:ext uri="{9D8B030D-6E8A-4147-A177-3AD203B41FA5}">
-                          <a16:colId xmlns:a16="http://schemas.microsoft.com/office/drawing/2014/main" val="2042402367"/>
-                        </a:ext>
-                      </a:extLst>
-                    </a:gridCol>
-                  </a:tblGrid>
-                  <a:tr h="366831">
-                    <a:tc>
-                      <a:txBody>
-                        <a:bodyPr/>
-                        <a:lstStyle/>
-                        <a:p>
-                          <a:r>
-                            <a:rPr lang="en-US" sz="1800" dirty="0" smtClean="0"/>
-                            <a:t>Covariate</a:t>
-                          </a:r>
-                          <a:endParaRPr lang="en-US" sz="1800" dirty="0"/>
-                        </a:p>
-                      </a:txBody>
-                      <a:tcPr/>
-                    </a:tc>
-                    <a:tc>
-                      <a:txBody>
-                        <a:bodyPr/>
-                        <a:lstStyle/>
-                        <a:p>
-                          <a:r>
-                            <a:rPr lang="en-US" sz="1800" dirty="0" smtClean="0"/>
-                            <a:t>Symbol</a:t>
-                          </a:r>
-                        </a:p>
-                      </a:txBody>
-                      <a:tcPr/>
-                    </a:tc>
-                    <a:tc>
-                      <a:txBody>
-                        <a:bodyPr/>
-                        <a:lstStyle/>
-                        <a:p>
-                          <a:r>
-                            <a:rPr lang="en-US" sz="1800" dirty="0" smtClean="0"/>
-                            <a:t>Coefficient</a:t>
-                          </a:r>
-                          <a:endParaRPr lang="en-US" sz="1800" dirty="0"/>
-                        </a:p>
-                      </a:txBody>
-                      <a:tcPr/>
-                    </a:tc>
-                    <a:extLst>
-                      <a:ext uri="{0D108BD9-81ED-4DB2-BD59-A6C34878D82A}">
-                        <a16:rowId xmlns:a16="http://schemas.microsoft.com/office/drawing/2014/main" val="390419479"/>
-                      </a:ext>
-                    </a:extLst>
-                  </a:tr>
-                  <a:tr h="366831">
-                    <a:tc>
-                      <a:txBody>
-                        <a:bodyPr/>
-                        <a:lstStyle/>
-                        <a:p>
-                          <a:r>
-                            <a:rPr lang="en-US" sz="1800" dirty="0" smtClean="0"/>
-                            <a:t>Intercept</a:t>
-                          </a:r>
-                          <a:endParaRPr lang="en-US" sz="1800" dirty="0"/>
-                        </a:p>
-                      </a:txBody>
-                      <a:tcPr/>
-                    </a:tc>
-                    <a:tc>
-                      <a:txBody>
-                        <a:bodyPr/>
-                        <a:lstStyle/>
-                        <a:p>
-                          <a:endParaRPr lang="en-US"/>
-                        </a:p>
-                      </a:txBody>
-                      <a:tcPr>
-                        <a:blipFill>
-                          <a:blip r:embed="rId3"/>
-                          <a:stretch>
-                            <a:fillRect l="-136994" t="-106557" r="-249711" b="-321311"/>
-                          </a:stretch>
-                        </a:blipFill>
-                      </a:tcPr>
-                    </a:tc>
-                    <a:tc>
-                      <a:txBody>
-                        <a:bodyPr/>
-                        <a:lstStyle/>
-                        <a:p>
-                          <a:r>
-                            <a:rPr lang="en-US" sz="1800" dirty="0" smtClean="0"/>
-                            <a:t>81,000</a:t>
-                          </a:r>
-                          <a:endParaRPr lang="en-US" sz="1800" dirty="0"/>
-                        </a:p>
-                      </a:txBody>
-                      <a:tcPr/>
-                    </a:tc>
-                    <a:extLst>
-                      <a:ext uri="{0D108BD9-81ED-4DB2-BD59-A6C34878D82A}">
-                        <a16:rowId xmlns:a16="http://schemas.microsoft.com/office/drawing/2014/main" val="291366966"/>
-                      </a:ext>
-                    </a:extLst>
-                  </a:tr>
-                  <a:tr h="366831">
-                    <a:tc>
-                      <a:txBody>
-                        <a:bodyPr/>
-                        <a:lstStyle/>
-                        <a:p>
-                          <a:r>
-                            <a:rPr lang="en-US" sz="1800" dirty="0" err="1" smtClean="0"/>
-                            <a:t>yrs.since.phd</a:t>
-                          </a:r>
-                          <a:endParaRPr lang="en-US" sz="1800" dirty="0"/>
-                        </a:p>
-                      </a:txBody>
-                      <a:tcPr/>
-                    </a:tc>
-                    <a:tc>
-                      <a:txBody>
-                        <a:bodyPr/>
-                        <a:lstStyle/>
-                        <a:p>
-                          <a:endParaRPr lang="en-US"/>
-                        </a:p>
-                      </a:txBody>
-                      <a:tcPr>
-                        <a:blipFill>
-                          <a:blip r:embed="rId3"/>
-                          <a:stretch>
-                            <a:fillRect l="-136994" t="-210000" r="-249711" b="-226667"/>
-                          </a:stretch>
-                        </a:blipFill>
-                      </a:tcPr>
-                    </a:tc>
-                    <a:tc>
-                      <a:txBody>
-                        <a:bodyPr/>
-                        <a:lstStyle/>
-                        <a:p>
-                          <a:r>
-                            <a:rPr lang="en-US" sz="1800" dirty="0" smtClean="0"/>
-                            <a:t>1,000</a:t>
-                          </a:r>
-                          <a:endParaRPr lang="en-US" sz="1800" dirty="0"/>
-                        </a:p>
-                      </a:txBody>
-                      <a:tcPr/>
-                    </a:tc>
-                    <a:extLst>
-                      <a:ext uri="{0D108BD9-81ED-4DB2-BD59-A6C34878D82A}">
-                        <a16:rowId xmlns:a16="http://schemas.microsoft.com/office/drawing/2014/main" val="402487520"/>
-                      </a:ext>
-                    </a:extLst>
-                  </a:tr>
-                  <a:tr h="366831">
-                    <a:tc>
-                      <a:txBody>
-                        <a:bodyPr/>
-                        <a:lstStyle/>
-                        <a:p>
-                          <a:r>
-                            <a:rPr lang="en-US" sz="1800" dirty="0" err="1" smtClean="0"/>
-                            <a:t>is.assoc</a:t>
-                          </a:r>
-                          <a:endParaRPr lang="en-US" sz="1800" dirty="0"/>
-                        </a:p>
-                      </a:txBody>
-                      <a:tcPr/>
-                    </a:tc>
-                    <a:tc>
-                      <a:txBody>
-                        <a:bodyPr/>
-                        <a:lstStyle/>
-                        <a:p>
-                          <a:endParaRPr lang="en-US"/>
-                        </a:p>
-                      </a:txBody>
-                      <a:tcPr>
-                        <a:blipFill>
-                          <a:blip r:embed="rId3"/>
-                          <a:stretch>
-                            <a:fillRect l="-136994" t="-304918" r="-249711" b="-122951"/>
-                          </a:stretch>
-                        </a:blipFill>
-                      </a:tcPr>
-                    </a:tc>
-                    <a:tc>
-                      <a:txBody>
-                        <a:bodyPr/>
-                        <a:lstStyle/>
-                        <a:p>
-                          <a:r>
-                            <a:rPr lang="en-US" sz="1800" dirty="0" smtClean="0"/>
-                            <a:t>14,000</a:t>
-                          </a:r>
-                          <a:endParaRPr lang="en-US" sz="1800" dirty="0"/>
-                        </a:p>
-                      </a:txBody>
-                      <a:tcPr/>
-                    </a:tc>
-                    <a:extLst>
-                      <a:ext uri="{0D108BD9-81ED-4DB2-BD59-A6C34878D82A}">
-                        <a16:rowId xmlns:a16="http://schemas.microsoft.com/office/drawing/2014/main" val="678565980"/>
-                      </a:ext>
-                    </a:extLst>
-                  </a:tr>
-                  <a:tr h="366831">
-                    <a:tc>
-                      <a:txBody>
-                        <a:bodyPr/>
-                        <a:lstStyle/>
-                        <a:p>
-                          <a:r>
-                            <a:rPr lang="en-US" sz="1800" dirty="0" err="1" smtClean="0"/>
-                            <a:t>is.fullprof</a:t>
-                          </a:r>
-                          <a:endParaRPr lang="en-US" sz="1800" dirty="0"/>
-                        </a:p>
-                      </a:txBody>
-                      <a:tcPr/>
-                    </a:tc>
-                    <a:tc>
-                      <a:txBody>
-                        <a:bodyPr/>
-                        <a:lstStyle/>
-                        <a:p>
-                          <a:endParaRPr lang="en-US"/>
-                        </a:p>
-                      </a:txBody>
-                      <a:tcPr>
-                        <a:blipFill>
-                          <a:blip r:embed="rId3"/>
-                          <a:stretch>
-                            <a:fillRect l="-136994" t="-411667" r="-249711" b="-25000"/>
-                          </a:stretch>
-                        </a:blipFill>
-                      </a:tcPr>
-                    </a:tc>
-                    <a:tc>
-                      <a:txBody>
-                        <a:bodyPr/>
-                        <a:lstStyle/>
-                        <a:p>
-                          <a:r>
-                            <a:rPr lang="en-US" sz="1800" dirty="0" smtClean="0"/>
-                            <a:t>49,000</a:t>
-                          </a:r>
-                          <a:endParaRPr lang="en-US" sz="1800" dirty="0"/>
-                        </a:p>
-                      </a:txBody>
-                      <a:tcPr/>
-                    </a:tc>
-                    <a:extLst>
-                      <a:ext uri="{0D108BD9-81ED-4DB2-BD59-A6C34878D82A}">
-                        <a16:rowId xmlns:a16="http://schemas.microsoft.com/office/drawing/2014/main" val="1400199756"/>
-                      </a:ext>
-                    </a:extLst>
-                  </a:tr>
-                </a:tbl>
-              </a:graphicData>
-            </a:graphic>
-          </p:graphicFrame>
-        </mc:Fallback>
-      </mc:AlternateContent>
+      <p:pic>
+        <p:nvPicPr>
+          <p:cNvPr id="6" name="Picture 5"/>
+          <p:cNvPicPr>
+            <a:picLocks noChangeAspect="1"/>
+          </p:cNvPicPr>
+          <p:nvPr/>
+        </p:nvPicPr>
+        <p:blipFill>
+          <a:blip r:embed="rId3"/>
+          <a:stretch>
+            <a:fillRect/>
+          </a:stretch>
+        </p:blipFill>
+        <p:spPr>
+          <a:xfrm>
+            <a:off x="650013" y="4729160"/>
+            <a:ext cx="4543425" cy="1685925"/>
+          </a:xfrm>
+          <a:prstGeom prst="rect">
+            <a:avLst/>
+          </a:prstGeom>
+        </p:spPr>
+      </p:pic>
     </p:spTree>
     <p:extLst>
       <p:ext uri="{BB962C8B-B14F-4D97-AF65-F5344CB8AC3E}">
@@ -5998,7 +3850,19 @@
               <a:rPr lang="en-US" sz="4800" dirty="0" smtClean="0">
                 <a:sym typeface="Wingdings" panose="05000000000000000000" pitchFamily="2" charset="2"/>
               </a:rPr>
-              <a:t>Female, Male  0, 1 </a:t>
+              <a:t>Female, Male </a:t>
+            </a:r>
+            <a:r>
+              <a:rPr lang="en-US" sz="4800" dirty="0" smtClean="0">
+                <a:sym typeface="Wingdings" panose="05000000000000000000" pitchFamily="2" charset="2"/>
+              </a:rPr>
+              <a:t>      </a:t>
+            </a:r>
+            <a:r>
+              <a:rPr lang="en-US" sz="4800" dirty="0" smtClean="0">
+                <a:sym typeface="Wingdings" panose="05000000000000000000" pitchFamily="2" charset="2"/>
+              </a:rPr>
+              <a:t>0, 1 </a:t>
             </a:r>
             <a:endParaRPr lang="en-US" sz="4800" dirty="0"/>
           </a:p>
@@ -6097,9 +3961,117 @@
               <a:rPr lang="en-US" sz="4800" dirty="0" smtClean="0">
                 <a:sym typeface="Wingdings" panose="05000000000000000000" pitchFamily="2" charset="2"/>
               </a:rPr>
-              <a:t>, Prof  0, 1, 2 </a:t>
+              <a:t>, Prof </a:t>
+            </a:r>
+            <a:r>
+              <a:rPr lang="en-US" sz="4800" dirty="0" smtClean="0">
+                <a:sym typeface="Wingdings" panose="05000000000000000000" pitchFamily="2" charset="2"/>
+              </a:rPr>
+              <a:t>      </a:t>
+            </a:r>
+            <a:r>
+              <a:rPr lang="en-US" sz="4800" dirty="0" smtClean="0">
+                <a:sym typeface="Wingdings" panose="05000000000000000000" pitchFamily="2" charset="2"/>
+              </a:rPr>
+              <a:t>0, 1, 2 </a:t>
             </a:r>
             <a:endParaRPr lang="en-US" sz="4800" dirty="0"/>
+          </a:p>
+        </p:txBody>
+      </p:sp>
+      <p:sp>
+        <p:nvSpPr>
+          <p:cNvPr id="3" name="Right Arrow 2"/>
+          <p:cNvSpPr/>
+          <p:nvPr/>
+        </p:nvSpPr>
+        <p:spPr>
+          <a:xfrm>
+            <a:off x="5970814" y="1851262"/>
+            <a:ext cx="574765" cy="378822"/>
+          </a:xfrm>
+          <a:prstGeom prst="rightArrow">
+            <a:avLst/>
+          </a:prstGeom>
+          <a:solidFill>
+            <a:schemeClr val="tx1"/>
+          </a:solidFill>
+          <a:ln>
+            <a:solidFill>
+              <a:schemeClr val="tx1"/>
+            </a:solidFill>
+          </a:ln>
+        </p:spPr>
+        <p:style>
+          <a:lnRef idx="2">
+            <a:schemeClr val="accent1">
+              <a:shade val="50000"/>
+            </a:schemeClr>
+          </a:lnRef>
+          <a:fillRef idx="1">
+            <a:schemeClr val="accent1"/>
+          </a:fillRef>
+          <a:effectRef idx="0">
+            <a:schemeClr val="accent1"/>
+          </a:effectRef>
+          <a:fontRef idx="minor">
+            <a:schemeClr val="lt1"/>
+          </a:fontRef>
+        </p:style>
+        <p:txBody>
+          <a:bodyPr rtlCol="0" anchor="ctr"/>
+          <a:lstStyle/>
+          <a:p>
+            <a:pPr algn="ctr"/>
+            <a:endParaRPr lang="en-US"/>
+          </a:p>
+        </p:txBody>
+      </p:sp>
+      <p:sp>
+        <p:nvSpPr>
+          <p:cNvPr id="8" name="Right Arrow 7"/>
+          <p:cNvSpPr/>
+          <p:nvPr/>
+        </p:nvSpPr>
+        <p:spPr>
+          <a:xfrm>
+            <a:off x="7807235" y="4414948"/>
+            <a:ext cx="574765" cy="378822"/>
+          </a:xfrm>
+          <a:prstGeom prst="rightArrow">
+            <a:avLst/>
+          </a:prstGeom>
+          <a:solidFill>
+            <a:schemeClr val="tx1"/>
+          </a:solidFill>
+          <a:ln>
+            <a:solidFill>
+              <a:schemeClr val="tx1"/>
+            </a:solidFill>
+          </a:ln>
+        </p:spPr>
+        <p:style>
+          <a:lnRef idx="2">
+            <a:schemeClr val="accent1">
+              <a:shade val="50000"/>
+            </a:schemeClr>
+          </a:lnRef>
+          <a:fillRef idx="1">
+            <a:schemeClr val="accent1"/>
+          </a:fillRef>
+          <a:effectRef idx="0">
+            <a:schemeClr val="accent1"/>
+          </a:effectRef>
+          <a:fontRef idx="minor">
+            <a:schemeClr val="lt1"/>
+          </a:fontRef>
+        </p:style>
+        <p:txBody>
+          <a:bodyPr rtlCol="0" anchor="ctr"/>
+          <a:lstStyle/>
+          <a:p>
+            <a:pPr algn="ctr"/>
+            <a:endParaRPr lang="en-US"/>
           </a:p>
         </p:txBody>
       </p:sp>
@@ -6196,7 +4168,19 @@
               <a:rPr lang="en-US" sz="4800" dirty="0" smtClean="0">
                 <a:sym typeface="Wingdings" panose="05000000000000000000" pitchFamily="2" charset="2"/>
               </a:rPr>
-              <a:t>Female, Male  0, 1 </a:t>
+              <a:t>Female, Male </a:t>
+            </a:r>
+            <a:r>
+              <a:rPr lang="en-US" sz="4800" dirty="0" smtClean="0">
+                <a:sym typeface="Wingdings" panose="05000000000000000000" pitchFamily="2" charset="2"/>
+              </a:rPr>
+              <a:t>	   </a:t>
+            </a:r>
+            <a:r>
+              <a:rPr lang="en-US" sz="4800" dirty="0" smtClean="0">
+                <a:sym typeface="Wingdings" panose="05000000000000000000" pitchFamily="2" charset="2"/>
+              </a:rPr>
+              <a:t>0, 1 </a:t>
             </a:r>
             <a:endParaRPr lang="en-US" sz="4800" dirty="0"/>
           </a:p>
@@ -6295,7 +4279,19 @@
               <a:rPr lang="en-US" sz="4800" dirty="0" smtClean="0">
                 <a:sym typeface="Wingdings" panose="05000000000000000000" pitchFamily="2" charset="2"/>
               </a:rPr>
-              <a:t>, Prof  0, 1, 2 </a:t>
+              <a:t>, Prof </a:t>
+            </a:r>
+            <a:r>
+              <a:rPr lang="en-US" sz="4800" dirty="0" smtClean="0">
+                <a:sym typeface="Wingdings" panose="05000000000000000000" pitchFamily="2" charset="2"/>
+              </a:rPr>
+              <a:t>	   </a:t>
+            </a:r>
+            <a:r>
+              <a:rPr lang="en-US" sz="4800" dirty="0" smtClean="0">
+                <a:sym typeface="Wingdings" panose="05000000000000000000" pitchFamily="2" charset="2"/>
+              </a:rPr>
+              <a:t>0, 1, 2 </a:t>
             </a:r>
             <a:endParaRPr lang="en-US" sz="4800" dirty="0"/>
           </a:p>
@@ -6321,6 +4317,102 @@
           <a:ln>
             <a:solidFill>
               <a:srgbClr val="C00000"/>
+            </a:solidFill>
+          </a:ln>
+        </p:spPr>
+        <p:style>
+          <a:lnRef idx="2">
+            <a:schemeClr val="accent1">
+              <a:shade val="50000"/>
+            </a:schemeClr>
+          </a:lnRef>
+          <a:fillRef idx="1">
+            <a:schemeClr val="accent1"/>
+          </a:fillRef>
+          <a:effectRef idx="0">
+            <a:schemeClr val="accent1"/>
+          </a:effectRef>
+          <a:fontRef idx="minor">
+            <a:schemeClr val="lt1"/>
+          </a:fontRef>
+        </p:style>
+        <p:txBody>
+          <a:bodyPr rtlCol="0" anchor="ctr"/>
+          <a:lstStyle/>
+          <a:p>
+            <a:pPr algn="ctr"/>
+            <a:endParaRPr lang="en-US"/>
+          </a:p>
+        </p:txBody>
+      </p:sp>
+      <p:sp>
+        <p:nvSpPr>
+          <p:cNvPr id="8" name="Right Arrow 7"/>
+          <p:cNvSpPr/>
+          <p:nvPr/>
+        </p:nvSpPr>
+        <p:spPr>
+          <a:xfrm>
+            <a:off x="5879374" y="1900348"/>
+            <a:ext cx="574765" cy="378822"/>
+          </a:xfrm>
+          <a:prstGeom prst="rightArrow">
+            <a:avLst/>
+          </a:prstGeom>
+          <a:solidFill>
+            <a:schemeClr val="tx1"/>
+          </a:solidFill>
+          <a:ln>
+            <a:solidFill>
+              <a:schemeClr val="tx1"/>
+            </a:solidFill>
+          </a:ln>
+        </p:spPr>
+        <p:style>
+          <a:lnRef idx="2">
+            <a:schemeClr val="accent1">
+              <a:shade val="50000"/>
+            </a:schemeClr>
+          </a:lnRef>
+          <a:fillRef idx="1">
+            <a:schemeClr val="accent1"/>
+          </a:fillRef>
+          <a:effectRef idx="0">
+            <a:schemeClr val="accent1"/>
+          </a:effectRef>
+          <a:fontRef idx="minor">
+            <a:schemeClr val="lt1"/>
+          </a:fontRef>
+        </p:style>
+        <p:txBody>
+          <a:bodyPr rtlCol="0" anchor="ctr"/>
+          <a:lstStyle/>
+          <a:p>
+            <a:pPr algn="ctr"/>
+            <a:endParaRPr lang="en-US"/>
+          </a:p>
+        </p:txBody>
+      </p:sp>
+      <p:sp>
+        <p:nvSpPr>
+          <p:cNvPr id="9" name="Right Arrow 8"/>
+          <p:cNvSpPr/>
+          <p:nvPr/>
+        </p:nvSpPr>
+        <p:spPr>
+          <a:xfrm>
+            <a:off x="7789083" y="4414948"/>
+            <a:ext cx="574765" cy="378822"/>
+          </a:xfrm>
+          <a:prstGeom prst="rightArrow">
+            <a:avLst/>
+          </a:prstGeom>
+          <a:solidFill>
+            <a:schemeClr val="tx1"/>
+          </a:solidFill>
+          <a:ln>
+            <a:solidFill>
+              <a:schemeClr val="tx1"/>
             </a:solidFill>
           </a:ln>
         </p:spPr>
@@ -6707,738 +4799,30 @@
           </a:p>
         </p:txBody>
       </p:sp>
-      <mc:AlternateContent xmlns:mc="http://schemas.openxmlformats.org/markup-compatibility/2006" xmlns:a14="http://schemas.microsoft.com/office/drawing/2010/main">
-        <mc:Choice Requires="a14">
-          <p:graphicFrame>
-            <p:nvGraphicFramePr>
-              <p:cNvPr id="4" name="Table 3"/>
-              <p:cNvGraphicFramePr>
-                <a:graphicFrameLocks noGrp="1"/>
-              </p:cNvGraphicFramePr>
-              <p:nvPr>
-                <p:extLst>
-                  <p:ext uri="{D42A27DB-BD31-4B8C-83A1-F6EECF244321}">
-                    <p14:modId xmlns:p14="http://schemas.microsoft.com/office/powerpoint/2010/main" val="830646405"/>
-                  </p:ext>
-                </p:extLst>
-              </p:nvPr>
-            </p:nvGraphicFramePr>
-            <p:xfrm>
-              <a:off x="2377441" y="2238224"/>
-              <a:ext cx="6217918" cy="2286000"/>
-            </p:xfrm>
-            <a:graphic>
-              <a:graphicData uri="http://schemas.openxmlformats.org/drawingml/2006/table">
-                <a:tbl>
-                  <a:tblPr firstRow="1" bandRow="1">
-                    <a:tableStyleId>{5C22544A-7EE6-4342-B048-85BDC9FD1C3A}</a:tableStyleId>
-                  </a:tblPr>
-                  <a:tblGrid>
-                    <a:gridCol w="2285999">
-                      <a:extLst>
-                        <a:ext uri="{9D8B030D-6E8A-4147-A177-3AD203B41FA5}">
-                          <a16:colId xmlns:a16="http://schemas.microsoft.com/office/drawing/2014/main" val="3802769981"/>
-                        </a:ext>
-                      </a:extLst>
-                    </a:gridCol>
-                    <a:gridCol w="1697105">
-                      <a:extLst>
-                        <a:ext uri="{9D8B030D-6E8A-4147-A177-3AD203B41FA5}">
-                          <a16:colId xmlns:a16="http://schemas.microsoft.com/office/drawing/2014/main" val="899919064"/>
-                        </a:ext>
-                      </a:extLst>
-                    </a:gridCol>
-                    <a:gridCol w="2234814">
-                      <a:extLst>
-                        <a:ext uri="{9D8B030D-6E8A-4147-A177-3AD203B41FA5}">
-                          <a16:colId xmlns:a16="http://schemas.microsoft.com/office/drawing/2014/main" val="2042402367"/>
-                        </a:ext>
-                      </a:extLst>
-                    </a:gridCol>
-                  </a:tblGrid>
-                  <a:tr h="370840">
-                    <a:tc>
-                      <a:txBody>
-                        <a:bodyPr/>
-                        <a:lstStyle/>
-                        <a:p>
-                          <a:r>
-                            <a:rPr lang="en-US" sz="2400" dirty="0" smtClean="0"/>
-                            <a:t>Covariate</a:t>
-                          </a:r>
-                          <a:endParaRPr lang="en-US" sz="2400" dirty="0"/>
-                        </a:p>
-                      </a:txBody>
-                      <a:tcPr/>
-                    </a:tc>
-                    <a:tc>
-                      <a:txBody>
-                        <a:bodyPr/>
-                        <a:lstStyle/>
-                        <a:p>
-                          <a:r>
-                            <a:rPr lang="en-US" sz="2400" dirty="0" smtClean="0"/>
-                            <a:t>Symbol</a:t>
-                          </a:r>
-                        </a:p>
-                      </a:txBody>
-                      <a:tcPr/>
-                    </a:tc>
-                    <a:tc>
-                      <a:txBody>
-                        <a:bodyPr/>
-                        <a:lstStyle/>
-                        <a:p>
-                          <a:r>
-                            <a:rPr lang="en-US" sz="2400" dirty="0" smtClean="0"/>
-                            <a:t>Coefficient</a:t>
-                          </a:r>
-                          <a:endParaRPr lang="en-US" sz="2400" dirty="0"/>
-                        </a:p>
-                      </a:txBody>
-                      <a:tcPr/>
-                    </a:tc>
-                    <a:extLst>
-                      <a:ext uri="{0D108BD9-81ED-4DB2-BD59-A6C34878D82A}">
-                        <a16:rowId xmlns:a16="http://schemas.microsoft.com/office/drawing/2014/main" val="390419479"/>
-                      </a:ext>
-                    </a:extLst>
-                  </a:tr>
-                  <a:tr h="370840">
-                    <a:tc>
-                      <a:txBody>
-                        <a:bodyPr/>
-                        <a:lstStyle/>
-                        <a:p>
-                          <a:r>
-                            <a:rPr lang="en-US" sz="2400" dirty="0" smtClean="0"/>
-                            <a:t>Intercept</a:t>
-                          </a:r>
-                          <a:endParaRPr lang="en-US" sz="2400" dirty="0"/>
-                        </a:p>
-                      </a:txBody>
-                      <a:tcPr/>
-                    </a:tc>
-                    <a:tc>
-                      <a:txBody>
-                        <a:bodyPr/>
-                        <a:lstStyle/>
-                        <a:p>
-                          <a:pPr/>
-                          <a14:m>
-                            <m:oMathPara xmlns:m="http://schemas.openxmlformats.org/officeDocument/2006/math">
-                              <m:oMathParaPr>
-                                <m:jc m:val="centerGroup"/>
-                              </m:oMathParaPr>
-                              <m:oMath xmlns:m="http://schemas.openxmlformats.org/officeDocument/2006/math">
-                                <m:sSub>
-                                  <m:sSubPr>
-                                    <m:ctrlPr>
-                                      <a:rPr lang="en-US" sz="2400" b="0" i="1" smtClean="0">
-                                        <a:latin typeface="Cambria Math" panose="02040503050406030204" pitchFamily="18" charset="0"/>
-                                      </a:rPr>
-                                    </m:ctrlPr>
-                                  </m:sSubPr>
-                                  <m:e>
-                                    <m:r>
-                                      <a:rPr lang="en-US" sz="2400" b="0" i="1" smtClean="0">
-                                        <a:latin typeface="Cambria Math" panose="02040503050406030204" pitchFamily="18" charset="0"/>
-                                      </a:rPr>
-                                      <m:t>𝛽</m:t>
-                                    </m:r>
-                                  </m:e>
-                                  <m:sub>
-                                    <m:r>
-                                      <a:rPr lang="en-US" sz="2400" b="0" i="1" smtClean="0">
-                                        <a:latin typeface="Cambria Math" panose="02040503050406030204" pitchFamily="18" charset="0"/>
-                                      </a:rPr>
-                                      <m:t>0</m:t>
-                                    </m:r>
-                                  </m:sub>
-                                </m:sSub>
-                              </m:oMath>
-                            </m:oMathPara>
-                          </a14:m>
-                          <a:endParaRPr lang="en-US" sz="2400" dirty="0"/>
-                        </a:p>
-                      </a:txBody>
-                      <a:tcPr/>
-                    </a:tc>
-                    <a:tc>
-                      <a:txBody>
-                        <a:bodyPr/>
-                        <a:lstStyle/>
-                        <a:p>
-                          <a:r>
-                            <a:rPr lang="en-US" sz="2400" dirty="0" smtClean="0"/>
-                            <a:t>81,000</a:t>
-                          </a:r>
-                          <a:endParaRPr lang="en-US" sz="2400" dirty="0"/>
-                        </a:p>
-                      </a:txBody>
-                      <a:tcPr/>
-                    </a:tc>
-                    <a:extLst>
-                      <a:ext uri="{0D108BD9-81ED-4DB2-BD59-A6C34878D82A}">
-                        <a16:rowId xmlns:a16="http://schemas.microsoft.com/office/drawing/2014/main" val="291366966"/>
-                      </a:ext>
-                    </a:extLst>
-                  </a:tr>
-                  <a:tr h="370840">
-                    <a:tc>
-                      <a:txBody>
-                        <a:bodyPr/>
-                        <a:lstStyle/>
-                        <a:p>
-                          <a:r>
-                            <a:rPr lang="en-US" sz="2400" dirty="0" err="1" smtClean="0"/>
-                            <a:t>yrs.since.phd</a:t>
-                          </a:r>
-                          <a:endParaRPr lang="en-US" sz="2400" dirty="0"/>
-                        </a:p>
-                      </a:txBody>
-                      <a:tcPr/>
-                    </a:tc>
-                    <a:tc>
-                      <a:txBody>
-                        <a:bodyPr/>
-                        <a:lstStyle/>
-                        <a:p>
-                          <a:pPr/>
-                          <a14:m>
-                            <m:oMathPara xmlns:m="http://schemas.openxmlformats.org/officeDocument/2006/math">
-                              <m:oMathParaPr>
-                                <m:jc m:val="centerGroup"/>
-                              </m:oMathParaPr>
-                              <m:oMath xmlns:m="http://schemas.openxmlformats.org/officeDocument/2006/math">
-                                <m:sSub>
-                                  <m:sSubPr>
-                                    <m:ctrlPr>
-                                      <a:rPr lang="en-US" sz="2400" b="0" i="1" smtClean="0">
-                                        <a:latin typeface="Cambria Math" panose="02040503050406030204" pitchFamily="18" charset="0"/>
-                                      </a:rPr>
-                                    </m:ctrlPr>
-                                  </m:sSubPr>
-                                  <m:e>
-                                    <m:r>
-                                      <a:rPr lang="en-US" sz="2400" b="0" i="1" smtClean="0">
-                                        <a:latin typeface="Cambria Math" panose="02040503050406030204" pitchFamily="18" charset="0"/>
-                                      </a:rPr>
-                                      <m:t>𝛽</m:t>
-                                    </m:r>
-                                  </m:e>
-                                  <m:sub>
-                                    <m:r>
-                                      <a:rPr lang="en-US" sz="2400" b="0" i="1" smtClean="0">
-                                        <a:latin typeface="Cambria Math" panose="02040503050406030204" pitchFamily="18" charset="0"/>
-                                      </a:rPr>
-                                      <m:t>1</m:t>
-                                    </m:r>
-                                  </m:sub>
-                                </m:sSub>
-                              </m:oMath>
-                            </m:oMathPara>
-                          </a14:m>
-                          <a:endParaRPr lang="en-US" sz="2400" dirty="0"/>
-                        </a:p>
-                      </a:txBody>
-                      <a:tcPr/>
-                    </a:tc>
-                    <a:tc>
-                      <a:txBody>
-                        <a:bodyPr/>
-                        <a:lstStyle/>
-                        <a:p>
-                          <a:r>
-                            <a:rPr lang="en-US" sz="2400" dirty="0" smtClean="0"/>
-                            <a:t>1,000</a:t>
-                          </a:r>
-                          <a:endParaRPr lang="en-US" sz="2400" dirty="0"/>
-                        </a:p>
-                      </a:txBody>
-                      <a:tcPr/>
-                    </a:tc>
-                    <a:extLst>
-                      <a:ext uri="{0D108BD9-81ED-4DB2-BD59-A6C34878D82A}">
-                        <a16:rowId xmlns:a16="http://schemas.microsoft.com/office/drawing/2014/main" val="402487520"/>
-                      </a:ext>
-                    </a:extLst>
-                  </a:tr>
-                  <a:tr h="370840">
-                    <a:tc>
-                      <a:txBody>
-                        <a:bodyPr/>
-                        <a:lstStyle/>
-                        <a:p>
-                          <a:r>
-                            <a:rPr lang="en-US" sz="2400" dirty="0" err="1" smtClean="0"/>
-                            <a:t>is.assoc</a:t>
-                          </a:r>
-                          <a:endParaRPr lang="en-US" sz="2400" dirty="0"/>
-                        </a:p>
-                      </a:txBody>
-                      <a:tcPr/>
-                    </a:tc>
-                    <a:tc>
-                      <a:txBody>
-                        <a:bodyPr/>
-                        <a:lstStyle/>
-                        <a:p>
-                          <a:pPr/>
-                          <a14:m>
-                            <m:oMathPara xmlns:m="http://schemas.openxmlformats.org/officeDocument/2006/math">
-                              <m:oMathParaPr>
-                                <m:jc m:val="centerGroup"/>
-                              </m:oMathParaPr>
-                              <m:oMath xmlns:m="http://schemas.openxmlformats.org/officeDocument/2006/math">
-                                <m:sSub>
-                                  <m:sSubPr>
-                                    <m:ctrlPr>
-                                      <a:rPr lang="en-US" sz="2400" b="0" i="1" smtClean="0">
-                                        <a:latin typeface="Cambria Math" panose="02040503050406030204" pitchFamily="18" charset="0"/>
-                                      </a:rPr>
-                                    </m:ctrlPr>
-                                  </m:sSubPr>
-                                  <m:e>
-                                    <m:r>
-                                      <a:rPr lang="en-US" sz="2400" b="0" i="1" smtClean="0">
-                                        <a:latin typeface="Cambria Math" panose="02040503050406030204" pitchFamily="18" charset="0"/>
-                                      </a:rPr>
-                                      <m:t>𝛽</m:t>
-                                    </m:r>
-                                  </m:e>
-                                  <m:sub>
-                                    <m:r>
-                                      <a:rPr lang="en-US" sz="2400" b="0" i="1" smtClean="0">
-                                        <a:latin typeface="Cambria Math" panose="02040503050406030204" pitchFamily="18" charset="0"/>
-                                      </a:rPr>
-                                      <m:t>2</m:t>
-                                    </m:r>
-                                  </m:sub>
-                                </m:sSub>
-                              </m:oMath>
-                            </m:oMathPara>
-                          </a14:m>
-                          <a:endParaRPr lang="en-US" sz="2400" dirty="0"/>
-                        </a:p>
-                      </a:txBody>
-                      <a:tcPr/>
-                    </a:tc>
-                    <a:tc>
-                      <a:txBody>
-                        <a:bodyPr/>
-                        <a:lstStyle/>
-                        <a:p>
-                          <a:r>
-                            <a:rPr lang="en-US" sz="2400" dirty="0" smtClean="0"/>
-                            <a:t>14,000</a:t>
-                          </a:r>
-                          <a:endParaRPr lang="en-US" sz="2400" dirty="0"/>
-                        </a:p>
-                      </a:txBody>
-                      <a:tcPr/>
-                    </a:tc>
-                    <a:extLst>
-                      <a:ext uri="{0D108BD9-81ED-4DB2-BD59-A6C34878D82A}">
-                        <a16:rowId xmlns:a16="http://schemas.microsoft.com/office/drawing/2014/main" val="678565980"/>
-                      </a:ext>
-                    </a:extLst>
-                  </a:tr>
-                  <a:tr h="370840">
-                    <a:tc>
-                      <a:txBody>
-                        <a:bodyPr/>
-                        <a:lstStyle/>
-                        <a:p>
-                          <a:r>
-                            <a:rPr lang="en-US" sz="2400" dirty="0" err="1" smtClean="0"/>
-                            <a:t>is.fullprof</a:t>
-                          </a:r>
-                          <a:endParaRPr lang="en-US" sz="2400" dirty="0"/>
-                        </a:p>
-                      </a:txBody>
-                      <a:tcPr/>
-                    </a:tc>
-                    <a:tc>
-                      <a:txBody>
-                        <a:bodyPr/>
-                        <a:lstStyle/>
-                        <a:p>
-                          <a:pPr/>
-                          <a14:m>
-                            <m:oMathPara xmlns:m="http://schemas.openxmlformats.org/officeDocument/2006/math">
-                              <m:oMathParaPr>
-                                <m:jc m:val="centerGroup"/>
-                              </m:oMathParaPr>
-                              <m:oMath xmlns:m="http://schemas.openxmlformats.org/officeDocument/2006/math">
-                                <m:sSub>
-                                  <m:sSubPr>
-                                    <m:ctrlPr>
-                                      <a:rPr lang="en-US" sz="2400" b="0" i="1" smtClean="0">
-                                        <a:latin typeface="Cambria Math" panose="02040503050406030204" pitchFamily="18" charset="0"/>
-                                      </a:rPr>
-                                    </m:ctrlPr>
-                                  </m:sSubPr>
-                                  <m:e>
-                                    <m:r>
-                                      <a:rPr lang="en-US" sz="2400" b="0" i="1" smtClean="0">
-                                        <a:latin typeface="Cambria Math" panose="02040503050406030204" pitchFamily="18" charset="0"/>
-                                      </a:rPr>
-                                      <m:t>𝛽</m:t>
-                                    </m:r>
-                                  </m:e>
-                                  <m:sub>
-                                    <m:r>
-                                      <a:rPr lang="en-US" sz="2400" b="0" i="1" smtClean="0">
-                                        <a:latin typeface="Cambria Math" panose="02040503050406030204" pitchFamily="18" charset="0"/>
-                                      </a:rPr>
-                                      <m:t>3</m:t>
-                                    </m:r>
-                                  </m:sub>
-                                </m:sSub>
-                              </m:oMath>
-                            </m:oMathPara>
-                          </a14:m>
-                          <a:endParaRPr lang="en-US" sz="2400" dirty="0"/>
-                        </a:p>
-                      </a:txBody>
-                      <a:tcPr/>
-                    </a:tc>
-                    <a:tc>
-                      <a:txBody>
-                        <a:bodyPr/>
-                        <a:lstStyle/>
-                        <a:p>
-                          <a:r>
-                            <a:rPr lang="en-US" sz="2400" dirty="0" smtClean="0"/>
-                            <a:t>49,000</a:t>
-                          </a:r>
-                          <a:endParaRPr lang="en-US" sz="2400" dirty="0"/>
-                        </a:p>
-                      </a:txBody>
-                      <a:tcPr/>
-                    </a:tc>
-                    <a:extLst>
-                      <a:ext uri="{0D108BD9-81ED-4DB2-BD59-A6C34878D82A}">
-                        <a16:rowId xmlns:a16="http://schemas.microsoft.com/office/drawing/2014/main" val="1400199756"/>
-                      </a:ext>
-                    </a:extLst>
-                  </a:tr>
-                </a:tbl>
-              </a:graphicData>
-            </a:graphic>
-          </p:graphicFrame>
-        </mc:Choice>
-        <mc:Fallback xmlns="">
-          <p:graphicFrame>
-            <p:nvGraphicFramePr>
-              <p:cNvPr id="4" name="Table 3"/>
-              <p:cNvGraphicFramePr>
-                <a:graphicFrameLocks noGrp="1"/>
-              </p:cNvGraphicFramePr>
-              <p:nvPr>
-                <p:extLst>
-                  <p:ext uri="{D42A27DB-BD31-4B8C-83A1-F6EECF244321}">
-                    <p14:modId xmlns:p14="http://schemas.microsoft.com/office/powerpoint/2010/main" val="830646405"/>
-                  </p:ext>
-                </p:extLst>
-              </p:nvPr>
-            </p:nvGraphicFramePr>
-            <p:xfrm>
-              <a:off x="2377441" y="2238224"/>
-              <a:ext cx="6217918" cy="2286000"/>
-            </p:xfrm>
-            <a:graphic>
-              <a:graphicData uri="http://schemas.openxmlformats.org/drawingml/2006/table">
-                <a:tbl>
-                  <a:tblPr firstRow="1" bandRow="1">
-                    <a:tableStyleId>{5C22544A-7EE6-4342-B048-85BDC9FD1C3A}</a:tableStyleId>
-                  </a:tblPr>
-                  <a:tblGrid>
-                    <a:gridCol w="2285999">
-                      <a:extLst>
-                        <a:ext uri="{9D8B030D-6E8A-4147-A177-3AD203B41FA5}">
-                          <a16:colId xmlns:a16="http://schemas.microsoft.com/office/drawing/2014/main" val="3802769981"/>
-                        </a:ext>
-                      </a:extLst>
-                    </a:gridCol>
-                    <a:gridCol w="1697105">
-                      <a:extLst>
-                        <a:ext uri="{9D8B030D-6E8A-4147-A177-3AD203B41FA5}">
-                          <a16:colId xmlns:a16="http://schemas.microsoft.com/office/drawing/2014/main" val="899919064"/>
-                        </a:ext>
-                      </a:extLst>
-                    </a:gridCol>
-                    <a:gridCol w="2234814">
-                      <a:extLst>
-                        <a:ext uri="{9D8B030D-6E8A-4147-A177-3AD203B41FA5}">
-                          <a16:colId xmlns:a16="http://schemas.microsoft.com/office/drawing/2014/main" val="2042402367"/>
-                        </a:ext>
-                      </a:extLst>
-                    </a:gridCol>
-                  </a:tblGrid>
-                  <a:tr h="457200">
-                    <a:tc>
-                      <a:txBody>
-                        <a:bodyPr/>
-                        <a:lstStyle/>
-                        <a:p>
-                          <a:r>
-                            <a:rPr lang="en-US" sz="2400" dirty="0" smtClean="0"/>
-                            <a:t>Covariate</a:t>
-                          </a:r>
-                          <a:endParaRPr lang="en-US" sz="2400" dirty="0"/>
-                        </a:p>
-                      </a:txBody>
-                      <a:tcPr/>
-                    </a:tc>
-                    <a:tc>
-                      <a:txBody>
-                        <a:bodyPr/>
-                        <a:lstStyle/>
-                        <a:p>
-                          <a:r>
-                            <a:rPr lang="en-US" sz="2400" dirty="0" smtClean="0"/>
-                            <a:t>Symbol</a:t>
-                          </a:r>
-                        </a:p>
-                      </a:txBody>
-                      <a:tcPr/>
-                    </a:tc>
-                    <a:tc>
-                      <a:txBody>
-                        <a:bodyPr/>
-                        <a:lstStyle/>
-                        <a:p>
-                          <a:r>
-                            <a:rPr lang="en-US" sz="2400" dirty="0" smtClean="0"/>
-                            <a:t>Coefficient</a:t>
-                          </a:r>
-                          <a:endParaRPr lang="en-US" sz="2400" dirty="0"/>
-                        </a:p>
-                      </a:txBody>
-                      <a:tcPr/>
-                    </a:tc>
-                    <a:extLst>
-                      <a:ext uri="{0D108BD9-81ED-4DB2-BD59-A6C34878D82A}">
-                        <a16:rowId xmlns:a16="http://schemas.microsoft.com/office/drawing/2014/main" val="390419479"/>
-                      </a:ext>
-                    </a:extLst>
-                  </a:tr>
-                  <a:tr h="457200">
-                    <a:tc>
-                      <a:txBody>
-                        <a:bodyPr/>
-                        <a:lstStyle/>
-                        <a:p>
-                          <a:r>
-                            <a:rPr lang="en-US" sz="2400" dirty="0" smtClean="0"/>
-                            <a:t>Intercept</a:t>
-                          </a:r>
-                          <a:endParaRPr lang="en-US" sz="2400" dirty="0"/>
-                        </a:p>
-                      </a:txBody>
-                      <a:tcPr/>
-                    </a:tc>
-                    <a:tc>
-                      <a:txBody>
-                        <a:bodyPr/>
-                        <a:lstStyle/>
-                        <a:p>
-                          <a:endParaRPr lang="en-US"/>
-                        </a:p>
-                      </a:txBody>
-                      <a:tcPr>
-                        <a:blipFill>
-                          <a:blip r:embed="rId2"/>
-                          <a:stretch>
-                            <a:fillRect l="-135612" t="-110667" r="-133813" b="-330667"/>
-                          </a:stretch>
-                        </a:blipFill>
-                      </a:tcPr>
-                    </a:tc>
-                    <a:tc>
-                      <a:txBody>
-                        <a:bodyPr/>
-                        <a:lstStyle/>
-                        <a:p>
-                          <a:r>
-                            <a:rPr lang="en-US" sz="2400" dirty="0" smtClean="0"/>
-                            <a:t>81,000</a:t>
-                          </a:r>
-                          <a:endParaRPr lang="en-US" sz="2400" dirty="0"/>
-                        </a:p>
-                      </a:txBody>
-                      <a:tcPr/>
-                    </a:tc>
-                    <a:extLst>
-                      <a:ext uri="{0D108BD9-81ED-4DB2-BD59-A6C34878D82A}">
-                        <a16:rowId xmlns:a16="http://schemas.microsoft.com/office/drawing/2014/main" val="291366966"/>
-                      </a:ext>
-                    </a:extLst>
-                  </a:tr>
-                  <a:tr h="457200">
-                    <a:tc>
-                      <a:txBody>
-                        <a:bodyPr/>
-                        <a:lstStyle/>
-                        <a:p>
-                          <a:r>
-                            <a:rPr lang="en-US" sz="2400" dirty="0" err="1" smtClean="0"/>
-                            <a:t>yrs.since.phd</a:t>
-                          </a:r>
-                          <a:endParaRPr lang="en-US" sz="2400" dirty="0"/>
-                        </a:p>
-                      </a:txBody>
-                      <a:tcPr/>
-                    </a:tc>
-                    <a:tc>
-                      <a:txBody>
-                        <a:bodyPr/>
-                        <a:lstStyle/>
-                        <a:p>
-                          <a:endParaRPr lang="en-US"/>
-                        </a:p>
-                      </a:txBody>
-                      <a:tcPr>
-                        <a:blipFill>
-                          <a:blip r:embed="rId2"/>
-                          <a:stretch>
-                            <a:fillRect l="-135612" t="-207895" r="-133813" b="-226316"/>
-                          </a:stretch>
-                        </a:blipFill>
-                      </a:tcPr>
-                    </a:tc>
-                    <a:tc>
-                      <a:txBody>
-                        <a:bodyPr/>
-                        <a:lstStyle/>
-                        <a:p>
-                          <a:r>
-                            <a:rPr lang="en-US" sz="2400" dirty="0" smtClean="0"/>
-                            <a:t>1,000</a:t>
-                          </a:r>
-                          <a:endParaRPr lang="en-US" sz="2400" dirty="0"/>
-                        </a:p>
-                      </a:txBody>
-                      <a:tcPr/>
-                    </a:tc>
-                    <a:extLst>
-                      <a:ext uri="{0D108BD9-81ED-4DB2-BD59-A6C34878D82A}">
-                        <a16:rowId xmlns:a16="http://schemas.microsoft.com/office/drawing/2014/main" val="402487520"/>
-                      </a:ext>
-                    </a:extLst>
-                  </a:tr>
-                  <a:tr h="457200">
-                    <a:tc>
-                      <a:txBody>
-                        <a:bodyPr/>
-                        <a:lstStyle/>
-                        <a:p>
-                          <a:r>
-                            <a:rPr lang="en-US" sz="2400" dirty="0" err="1" smtClean="0"/>
-                            <a:t>is.assoc</a:t>
-                          </a:r>
-                          <a:endParaRPr lang="en-US" sz="2400" dirty="0"/>
-                        </a:p>
-                      </a:txBody>
-                      <a:tcPr/>
-                    </a:tc>
-                    <a:tc>
-                      <a:txBody>
-                        <a:bodyPr/>
-                        <a:lstStyle/>
-                        <a:p>
-                          <a:endParaRPr lang="en-US"/>
-                        </a:p>
-                      </a:txBody>
-                      <a:tcPr>
-                        <a:blipFill>
-                          <a:blip r:embed="rId2"/>
-                          <a:stretch>
-                            <a:fillRect l="-135612" t="-312000" r="-133813" b="-129333"/>
-                          </a:stretch>
-                        </a:blipFill>
-                      </a:tcPr>
-                    </a:tc>
-                    <a:tc>
-                      <a:txBody>
-                        <a:bodyPr/>
-                        <a:lstStyle/>
-                        <a:p>
-                          <a:r>
-                            <a:rPr lang="en-US" sz="2400" dirty="0" smtClean="0"/>
-                            <a:t>14,000</a:t>
-                          </a:r>
-                          <a:endParaRPr lang="en-US" sz="2400" dirty="0"/>
-                        </a:p>
-                      </a:txBody>
-                      <a:tcPr/>
-                    </a:tc>
-                    <a:extLst>
-                      <a:ext uri="{0D108BD9-81ED-4DB2-BD59-A6C34878D82A}">
-                        <a16:rowId xmlns:a16="http://schemas.microsoft.com/office/drawing/2014/main" val="678565980"/>
-                      </a:ext>
-                    </a:extLst>
-                  </a:tr>
-                  <a:tr h="457200">
-                    <a:tc>
-                      <a:txBody>
-                        <a:bodyPr/>
-                        <a:lstStyle/>
-                        <a:p>
-                          <a:r>
-                            <a:rPr lang="en-US" sz="2400" dirty="0" err="1" smtClean="0"/>
-                            <a:t>is.fullprof</a:t>
-                          </a:r>
-                          <a:endParaRPr lang="en-US" sz="2400" dirty="0"/>
-                        </a:p>
-                      </a:txBody>
-                      <a:tcPr/>
-                    </a:tc>
-                    <a:tc>
-                      <a:txBody>
-                        <a:bodyPr/>
-                        <a:lstStyle/>
-                        <a:p>
-                          <a:endParaRPr lang="en-US"/>
-                        </a:p>
-                      </a:txBody>
-                      <a:tcPr>
-                        <a:blipFill>
-                          <a:blip r:embed="rId2"/>
-                          <a:stretch>
-                            <a:fillRect l="-135612" t="-412000" r="-133813" b="-29333"/>
-                          </a:stretch>
-                        </a:blipFill>
-                      </a:tcPr>
-                    </a:tc>
-                    <a:tc>
-                      <a:txBody>
-                        <a:bodyPr/>
-                        <a:lstStyle/>
-                        <a:p>
-                          <a:r>
-                            <a:rPr lang="en-US" sz="2400" dirty="0" smtClean="0"/>
-                            <a:t>49,000</a:t>
-                          </a:r>
-                          <a:endParaRPr lang="en-US" sz="2400" dirty="0"/>
-                        </a:p>
-                      </a:txBody>
-                      <a:tcPr/>
-                    </a:tc>
-                    <a:extLst>
-                      <a:ext uri="{0D108BD9-81ED-4DB2-BD59-A6C34878D82A}">
-                        <a16:rowId xmlns:a16="http://schemas.microsoft.com/office/drawing/2014/main" val="1400199756"/>
-                      </a:ext>
-                    </a:extLst>
-                  </a:tr>
-                </a:tbl>
-              </a:graphicData>
-            </a:graphic>
-          </p:graphicFrame>
-        </mc:Fallback>
-      </mc:AlternateContent>
+      <p:pic>
+        <p:nvPicPr>
+          <p:cNvPr id="5" name="Picture 4"/>
+          <p:cNvPicPr>
+            <a:picLocks noChangeAspect="1"/>
+          </p:cNvPicPr>
+          <p:nvPr/>
+        </p:nvPicPr>
+        <p:blipFill>
+          <a:blip r:embed="rId2"/>
+          <a:stretch>
+            <a:fillRect/>
+          </a:stretch>
+        </p:blipFill>
+        <p:spPr>
+          <a:xfrm>
+            <a:off x="2074184" y="2220276"/>
+            <a:ext cx="7182571" cy="2665231"/>
+          </a:xfrm>
+          <a:prstGeom prst="rect">
+            <a:avLst/>
+          </a:prstGeom>
+        </p:spPr>
+      </p:pic>
     </p:spTree>
     <p:extLst>
       <p:ext uri="{BB962C8B-B14F-4D97-AF65-F5344CB8AC3E}">

</xml_diff>